<commit_message>
[Open/Closed] First requirement: print PDF (the principle is not being fulfilled)
</commit_message>
<xml_diff>
--- a/SOLID/SOLID.pptx
+++ b/SOLID/SOLID.pptx
@@ -6,7 +6,7 @@
     <p:sldMasterId id="2147483673" r:id="rId2"/>
   </p:sldMasterIdLst>
   <p:notesMasterIdLst>
-    <p:notesMasterId r:id="rId16"/>
+    <p:notesMasterId r:id="rId19"/>
   </p:notesMasterIdLst>
   <p:sldIdLst>
     <p:sldId id="256" r:id="rId3"/>
@@ -20,44 +20,47 @@
     <p:sldId id="266" r:id="rId11"/>
     <p:sldId id="263" r:id="rId12"/>
     <p:sldId id="267" r:id="rId13"/>
-    <p:sldId id="269" r:id="rId14"/>
-    <p:sldId id="270" r:id="rId15"/>
+    <p:sldId id="271" r:id="rId14"/>
+    <p:sldId id="269" r:id="rId15"/>
+    <p:sldId id="272" r:id="rId16"/>
+    <p:sldId id="270" r:id="rId17"/>
+    <p:sldId id="273" r:id="rId18"/>
   </p:sldIdLst>
   <p:sldSz cx="9144000" cy="5143500" type="screen16x9"/>
   <p:notesSz cx="6858000" cy="9144000"/>
   <p:embeddedFontLst>
     <p:embeddedFont>
       <p:font typeface="Calibri" panose="020F0502020204030204" pitchFamily="34" charset="0"/>
-      <p:regular r:id="rId17"/>
-      <p:bold r:id="rId18"/>
-      <p:italic r:id="rId19"/>
-      <p:boldItalic r:id="rId20"/>
+      <p:regular r:id="rId20"/>
+      <p:bold r:id="rId21"/>
+      <p:italic r:id="rId22"/>
+      <p:boldItalic r:id="rId23"/>
     </p:embeddedFont>
     <p:embeddedFont>
       <p:font typeface="Dosis" panose="020B0604020202020204" charset="0"/>
-      <p:regular r:id="rId21"/>
-      <p:bold r:id="rId22"/>
+      <p:regular r:id="rId24"/>
+      <p:bold r:id="rId25"/>
     </p:embeddedFont>
     <p:embeddedFont>
       <p:font typeface="Montserrat" panose="020B0604020202020204" charset="0"/>
-      <p:regular r:id="rId23"/>
-      <p:bold r:id="rId24"/>
-      <p:italic r:id="rId25"/>
-      <p:boldItalic r:id="rId26"/>
+      <p:regular r:id="rId26"/>
+      <p:bold r:id="rId27"/>
+      <p:italic r:id="rId28"/>
+      <p:boldItalic r:id="rId29"/>
     </p:embeddedFont>
     <p:embeddedFont>
       <p:font typeface="Nunito Sans" panose="020B0604020202020204" charset="0"/>
-      <p:regular r:id="rId27"/>
-      <p:bold r:id="rId28"/>
-      <p:italic r:id="rId29"/>
-      <p:boldItalic r:id="rId30"/>
+      <p:regular r:id="rId30"/>
+      <p:bold r:id="rId31"/>
+      <p:italic r:id="rId32"/>
+      <p:boldItalic r:id="rId33"/>
     </p:embeddedFont>
     <p:embeddedFont>
       <p:font typeface="Roboto Condensed" panose="020B0604020202020204" charset="0"/>
-      <p:regular r:id="rId31"/>
-      <p:bold r:id="rId32"/>
-      <p:italic r:id="rId33"/>
-      <p:boldItalic r:id="rId34"/>
+      <p:regular r:id="rId34"/>
+      <p:bold r:id="rId35"/>
+      <p:italic r:id="rId36"/>
+      <p:boldItalic r:id="rId37"/>
     </p:embeddedFont>
   </p:embeddedFontLst>
   <p:defaultTextStyle>
@@ -1150,14 +1153,14 @@
               </a:spcAft>
               <a:buNone/>
             </a:pPr>
-            <a:endParaRPr/>
+            <a:endParaRPr dirty="0"/>
           </a:p>
         </p:txBody>
       </p:sp>
     </p:spTree>
     <p:extLst>
       <p:ext uri="{BB962C8B-B14F-4D97-AF65-F5344CB8AC3E}">
-        <p14:creationId xmlns:p14="http://schemas.microsoft.com/office/powerpoint/2010/main" val="2947236882"/>
+        <p14:creationId xmlns:p14="http://schemas.microsoft.com/office/powerpoint/2010/main" val="3731625650"/>
       </p:ext>
     </p:extLst>
   </p:cSld>
@@ -1266,7 +1269,334 @@
     </p:spTree>
     <p:extLst>
       <p:ext uri="{BB962C8B-B14F-4D97-AF65-F5344CB8AC3E}">
+        <p14:creationId xmlns:p14="http://schemas.microsoft.com/office/powerpoint/2010/main" val="2947236882"/>
+      </p:ext>
+    </p:extLst>
+  </p:cSld>
+  <p:clrMapOvr>
+    <a:masterClrMapping/>
+  </p:clrMapOvr>
+</p:notes>
+</file>
+
+<file path=ppt/notesSlides/notesSlide14.xml><?xml version="1.0" encoding="utf-8"?>
+<p:notes xmlns:a="http://schemas.openxmlformats.org/drawingml/2006/main" xmlns:r="http://schemas.openxmlformats.org/officeDocument/2006/relationships" xmlns:p="http://schemas.openxmlformats.org/presentationml/2006/main" showMasterSp="0" showMasterPhAnim="0">
+  <p:cSld>
+    <p:spTree>
+      <p:nvGrpSpPr>
+        <p:cNvPr id="1" name="Shape 114"/>
+        <p:cNvGrpSpPr/>
+        <p:nvPr/>
+      </p:nvGrpSpPr>
+      <p:grpSpPr>
+        <a:xfrm>
+          <a:off x="0" y="0"/>
+          <a:ext cx="0" cy="0"/>
+          <a:chOff x="0" y="0"/>
+          <a:chExt cx="0" cy="0"/>
+        </a:xfrm>
+      </p:grpSpPr>
+      <p:sp>
+        <p:nvSpPr>
+          <p:cNvPr id="115" name="Google Shape;115;g297a9bff03_0_0:notes"/>
+          <p:cNvSpPr>
+            <a:spLocks noGrp="1" noRot="1" noChangeAspect="1"/>
+          </p:cNvSpPr>
+          <p:nvPr>
+            <p:ph type="sldImg" idx="2"/>
+          </p:nvPr>
+        </p:nvSpPr>
+        <p:spPr>
+          <a:xfrm>
+            <a:off x="381000" y="685800"/>
+            <a:ext cx="6096000" cy="3429000"/>
+          </a:xfrm>
+          <a:custGeom>
+            <a:avLst/>
+            <a:gdLst/>
+            <a:ahLst/>
+            <a:cxnLst/>
+            <a:rect l="l" t="t" r="r" b="b"/>
+            <a:pathLst>
+              <a:path w="120000" h="120000" extrusionOk="0">
+                <a:moveTo>
+                  <a:pt x="0" y="0"/>
+                </a:moveTo>
+                <a:lnTo>
+                  <a:pt x="120000" y="0"/>
+                </a:lnTo>
+                <a:lnTo>
+                  <a:pt x="120000" y="120000"/>
+                </a:lnTo>
+                <a:lnTo>
+                  <a:pt x="0" y="120000"/>
+                </a:lnTo>
+                <a:close/>
+              </a:path>
+            </a:pathLst>
+          </a:custGeom>
+        </p:spPr>
+      </p:sp>
+      <p:sp>
+        <p:nvSpPr>
+          <p:cNvPr id="116" name="Google Shape;116;g297a9bff03_0_0:notes"/>
+          <p:cNvSpPr txBox="1">
+            <a:spLocks noGrp="1"/>
+          </p:cNvSpPr>
+          <p:nvPr>
+            <p:ph type="body" idx="1"/>
+          </p:nvPr>
+        </p:nvSpPr>
+        <p:spPr>
+          <a:xfrm>
+            <a:off x="685800" y="4343400"/>
+            <a:ext cx="5486400" cy="4114800"/>
+          </a:xfrm>
+          <a:prstGeom prst="rect">
+            <a:avLst/>
+          </a:prstGeom>
+        </p:spPr>
+        <p:txBody>
+          <a:bodyPr spcFirstLastPara="1" wrap="square" lIns="91425" tIns="91425" rIns="91425" bIns="91425" anchor="t" anchorCtr="0">
+            <a:noAutofit/>
+          </a:bodyPr>
+          <a:lstStyle/>
+          <a:p>
+            <a:pPr marL="0" lvl="0" indent="0" algn="l" rtl="0">
+              <a:spcBef>
+                <a:spcPts val="0"/>
+              </a:spcBef>
+              <a:spcAft>
+                <a:spcPts val="0"/>
+              </a:spcAft>
+              <a:buNone/>
+            </a:pPr>
+            <a:endParaRPr/>
+          </a:p>
+        </p:txBody>
+      </p:sp>
+    </p:spTree>
+    <p:extLst>
+      <p:ext uri="{BB962C8B-B14F-4D97-AF65-F5344CB8AC3E}">
+        <p14:creationId xmlns:p14="http://schemas.microsoft.com/office/powerpoint/2010/main" val="429685392"/>
+      </p:ext>
+    </p:extLst>
+  </p:cSld>
+  <p:clrMapOvr>
+    <a:masterClrMapping/>
+  </p:clrMapOvr>
+</p:notes>
+</file>
+
+<file path=ppt/notesSlides/notesSlide15.xml><?xml version="1.0" encoding="utf-8"?>
+<p:notes xmlns:a="http://schemas.openxmlformats.org/drawingml/2006/main" xmlns:r="http://schemas.openxmlformats.org/officeDocument/2006/relationships" xmlns:p="http://schemas.openxmlformats.org/presentationml/2006/main" showMasterSp="0" showMasterPhAnim="0">
+  <p:cSld>
+    <p:spTree>
+      <p:nvGrpSpPr>
+        <p:cNvPr id="1" name="Shape 114"/>
+        <p:cNvGrpSpPr/>
+        <p:nvPr/>
+      </p:nvGrpSpPr>
+      <p:grpSpPr>
+        <a:xfrm>
+          <a:off x="0" y="0"/>
+          <a:ext cx="0" cy="0"/>
+          <a:chOff x="0" y="0"/>
+          <a:chExt cx="0" cy="0"/>
+        </a:xfrm>
+      </p:grpSpPr>
+      <p:sp>
+        <p:nvSpPr>
+          <p:cNvPr id="115" name="Google Shape;115;g297a9bff03_0_0:notes"/>
+          <p:cNvSpPr>
+            <a:spLocks noGrp="1" noRot="1" noChangeAspect="1"/>
+          </p:cNvSpPr>
+          <p:nvPr>
+            <p:ph type="sldImg" idx="2"/>
+          </p:nvPr>
+        </p:nvSpPr>
+        <p:spPr>
+          <a:xfrm>
+            <a:off x="381000" y="685800"/>
+            <a:ext cx="6096000" cy="3429000"/>
+          </a:xfrm>
+          <a:custGeom>
+            <a:avLst/>
+            <a:gdLst/>
+            <a:ahLst/>
+            <a:cxnLst/>
+            <a:rect l="l" t="t" r="r" b="b"/>
+            <a:pathLst>
+              <a:path w="120000" h="120000" extrusionOk="0">
+                <a:moveTo>
+                  <a:pt x="0" y="0"/>
+                </a:moveTo>
+                <a:lnTo>
+                  <a:pt x="120000" y="0"/>
+                </a:lnTo>
+                <a:lnTo>
+                  <a:pt x="120000" y="120000"/>
+                </a:lnTo>
+                <a:lnTo>
+                  <a:pt x="0" y="120000"/>
+                </a:lnTo>
+                <a:close/>
+              </a:path>
+            </a:pathLst>
+          </a:custGeom>
+        </p:spPr>
+      </p:sp>
+      <p:sp>
+        <p:nvSpPr>
+          <p:cNvPr id="116" name="Google Shape;116;g297a9bff03_0_0:notes"/>
+          <p:cNvSpPr txBox="1">
+            <a:spLocks noGrp="1"/>
+          </p:cNvSpPr>
+          <p:nvPr>
+            <p:ph type="body" idx="1"/>
+          </p:nvPr>
+        </p:nvSpPr>
+        <p:spPr>
+          <a:xfrm>
+            <a:off x="685800" y="4343400"/>
+            <a:ext cx="5486400" cy="4114800"/>
+          </a:xfrm>
+          <a:prstGeom prst="rect">
+            <a:avLst/>
+          </a:prstGeom>
+        </p:spPr>
+        <p:txBody>
+          <a:bodyPr spcFirstLastPara="1" wrap="square" lIns="91425" tIns="91425" rIns="91425" bIns="91425" anchor="t" anchorCtr="0">
+            <a:noAutofit/>
+          </a:bodyPr>
+          <a:lstStyle/>
+          <a:p>
+            <a:pPr marL="0" lvl="0" indent="0" algn="l" rtl="0">
+              <a:spcBef>
+                <a:spcPts val="0"/>
+              </a:spcBef>
+              <a:spcAft>
+                <a:spcPts val="0"/>
+              </a:spcAft>
+              <a:buNone/>
+            </a:pPr>
+            <a:endParaRPr/>
+          </a:p>
+        </p:txBody>
+      </p:sp>
+    </p:spTree>
+    <p:extLst>
+      <p:ext uri="{BB962C8B-B14F-4D97-AF65-F5344CB8AC3E}">
         <p14:creationId xmlns:p14="http://schemas.microsoft.com/office/powerpoint/2010/main" val="3985986597"/>
+      </p:ext>
+    </p:extLst>
+  </p:cSld>
+  <p:clrMapOvr>
+    <a:masterClrMapping/>
+  </p:clrMapOvr>
+</p:notes>
+</file>
+
+<file path=ppt/notesSlides/notesSlide16.xml><?xml version="1.0" encoding="utf-8"?>
+<p:notes xmlns:a="http://schemas.openxmlformats.org/drawingml/2006/main" xmlns:r="http://schemas.openxmlformats.org/officeDocument/2006/relationships" xmlns:p="http://schemas.openxmlformats.org/presentationml/2006/main" showMasterSp="0" showMasterPhAnim="0">
+  <p:cSld>
+    <p:spTree>
+      <p:nvGrpSpPr>
+        <p:cNvPr id="1" name="Shape 114"/>
+        <p:cNvGrpSpPr/>
+        <p:nvPr/>
+      </p:nvGrpSpPr>
+      <p:grpSpPr>
+        <a:xfrm>
+          <a:off x="0" y="0"/>
+          <a:ext cx="0" cy="0"/>
+          <a:chOff x="0" y="0"/>
+          <a:chExt cx="0" cy="0"/>
+        </a:xfrm>
+      </p:grpSpPr>
+      <p:sp>
+        <p:nvSpPr>
+          <p:cNvPr id="115" name="Google Shape;115;g297a9bff03_0_0:notes"/>
+          <p:cNvSpPr>
+            <a:spLocks noGrp="1" noRot="1" noChangeAspect="1"/>
+          </p:cNvSpPr>
+          <p:nvPr>
+            <p:ph type="sldImg" idx="2"/>
+          </p:nvPr>
+        </p:nvSpPr>
+        <p:spPr>
+          <a:xfrm>
+            <a:off x="381000" y="685800"/>
+            <a:ext cx="6096000" cy="3429000"/>
+          </a:xfrm>
+          <a:custGeom>
+            <a:avLst/>
+            <a:gdLst/>
+            <a:ahLst/>
+            <a:cxnLst/>
+            <a:rect l="l" t="t" r="r" b="b"/>
+            <a:pathLst>
+              <a:path w="120000" h="120000" extrusionOk="0">
+                <a:moveTo>
+                  <a:pt x="0" y="0"/>
+                </a:moveTo>
+                <a:lnTo>
+                  <a:pt x="120000" y="0"/>
+                </a:lnTo>
+                <a:lnTo>
+                  <a:pt x="120000" y="120000"/>
+                </a:lnTo>
+                <a:lnTo>
+                  <a:pt x="0" y="120000"/>
+                </a:lnTo>
+                <a:close/>
+              </a:path>
+            </a:pathLst>
+          </a:custGeom>
+        </p:spPr>
+      </p:sp>
+      <p:sp>
+        <p:nvSpPr>
+          <p:cNvPr id="116" name="Google Shape;116;g297a9bff03_0_0:notes"/>
+          <p:cNvSpPr txBox="1">
+            <a:spLocks noGrp="1"/>
+          </p:cNvSpPr>
+          <p:nvPr>
+            <p:ph type="body" idx="1"/>
+          </p:nvPr>
+        </p:nvSpPr>
+        <p:spPr>
+          <a:xfrm>
+            <a:off x="685800" y="4343400"/>
+            <a:ext cx="5486400" cy="4114800"/>
+          </a:xfrm>
+          <a:prstGeom prst="rect">
+            <a:avLst/>
+          </a:prstGeom>
+        </p:spPr>
+        <p:txBody>
+          <a:bodyPr spcFirstLastPara="1" wrap="square" lIns="91425" tIns="91425" rIns="91425" bIns="91425" anchor="t" anchorCtr="0">
+            <a:noAutofit/>
+          </a:bodyPr>
+          <a:lstStyle/>
+          <a:p>
+            <a:pPr marL="0" lvl="0" indent="0" algn="l" rtl="0">
+              <a:spcBef>
+                <a:spcPts val="0"/>
+              </a:spcBef>
+              <a:spcAft>
+                <a:spcPts val="0"/>
+              </a:spcAft>
+              <a:buNone/>
+            </a:pPr>
+            <a:endParaRPr/>
+          </a:p>
+        </p:txBody>
+      </p:sp>
+    </p:spTree>
+    <p:extLst>
+      <p:ext uri="{BB962C8B-B14F-4D97-AF65-F5344CB8AC3E}">
+        <p14:creationId xmlns:p14="http://schemas.microsoft.com/office/powerpoint/2010/main" val="4234560576"/>
       </p:ext>
     </p:extLst>
   </p:cSld>
@@ -15864,6 +16194,66 @@
           </a:p>
         </p:txBody>
       </p:sp>
+      <p:pic>
+        <p:nvPicPr>
+          <p:cNvPr id="2" name="Picture 1">
+            <a:extLst>
+              <a:ext uri="{FF2B5EF4-FFF2-40B4-BE49-F238E27FC236}">
+                <a16:creationId xmlns:a16="http://schemas.microsoft.com/office/drawing/2014/main" id="{219DEC4D-474C-4F53-935B-75240B33A462}"/>
+              </a:ext>
+            </a:extLst>
+          </p:cNvPr>
+          <p:cNvPicPr>
+            <a:picLocks noChangeAspect="1"/>
+          </p:cNvPicPr>
+          <p:nvPr/>
+        </p:nvPicPr>
+        <p:blipFill>
+          <a:blip r:embed="rId3"/>
+          <a:stretch>
+            <a:fillRect/>
+          </a:stretch>
+        </p:blipFill>
+        <p:spPr>
+          <a:xfrm>
+            <a:off x="0" y="1250156"/>
+            <a:ext cx="4605339" cy="2136497"/>
+          </a:xfrm>
+          <a:prstGeom prst="rect">
+            <a:avLst/>
+          </a:prstGeom>
+        </p:spPr>
+      </p:pic>
+      <p:pic>
+        <p:nvPicPr>
+          <p:cNvPr id="3" name="Picture 2">
+            <a:extLst>
+              <a:ext uri="{FF2B5EF4-FFF2-40B4-BE49-F238E27FC236}">
+                <a16:creationId xmlns:a16="http://schemas.microsoft.com/office/drawing/2014/main" id="{781A4C4F-E014-4A9C-B177-BEE6BC5C4ED7}"/>
+              </a:ext>
+            </a:extLst>
+          </p:cNvPr>
+          <p:cNvPicPr>
+            <a:picLocks noChangeAspect="1"/>
+          </p:cNvPicPr>
+          <p:nvPr/>
+        </p:nvPicPr>
+        <p:blipFill>
+          <a:blip r:embed="rId4"/>
+          <a:stretch>
+            <a:fillRect/>
+          </a:stretch>
+        </p:blipFill>
+        <p:spPr>
+          <a:xfrm>
+            <a:off x="3495951" y="1769505"/>
+            <a:ext cx="5509938" cy="3234296"/>
+          </a:xfrm>
+          <a:prstGeom prst="rect">
+            <a:avLst/>
+          </a:prstGeom>
+        </p:spPr>
+      </p:pic>
     </p:spTree>
     <p:extLst>
       <p:ext uri="{BB962C8B-B14F-4D97-AF65-F5344CB8AC3E}">
@@ -15958,6 +16348,275 @@
                 <a:cs typeface="Montserrat"/>
                 <a:sym typeface="Montserrat"/>
               </a:rPr>
+              <a:t>Sometimes, we forgot Open/Closed</a:t>
+            </a:r>
+            <a:r>
+              <a:rPr lang="en" sz="3200" b="1" dirty="0">
+                <a:solidFill>
+                  <a:schemeClr val="lt1"/>
+                </a:solidFill>
+                <a:effectLst>
+                  <a:outerShdw blurRad="38100" dist="38100" dir="2700000" algn="tl">
+                    <a:srgbClr val="000000">
+                      <a:alpha val="43137"/>
+                    </a:srgbClr>
+                  </a:outerShdw>
+                </a:effectLst>
+                <a:latin typeface="Montserrat"/>
+                <a:ea typeface="Montserrat"/>
+                <a:cs typeface="Montserrat"/>
+                <a:sym typeface="Montserrat"/>
+              </a:rPr>
+              <a:t> Principle </a:t>
+            </a:r>
+            <a:r>
+              <a:rPr lang="en" sz="3200" b="1" dirty="0">
+                <a:solidFill>
+                  <a:schemeClr val="lt1"/>
+                </a:solidFill>
+                <a:effectLst>
+                  <a:outerShdw blurRad="38100" dist="38100" dir="2700000" algn="tl">
+                    <a:srgbClr val="000000">
+                      <a:alpha val="43137"/>
+                    </a:srgbClr>
+                  </a:outerShdw>
+                </a:effectLst>
+                <a:latin typeface="Montserrat"/>
+                <a:ea typeface="Montserrat"/>
+                <a:cs typeface="Montserrat"/>
+                <a:sym typeface="Wingdings" panose="05000000000000000000" pitchFamily="2" charset="2"/>
+              </a:rPr>
+              <a:t> </a:t>
+            </a:r>
+            <a:endParaRPr sz="2000" b="1" dirty="0">
+              <a:solidFill>
+                <a:srgbClr val="C1D82F"/>
+              </a:solidFill>
+              <a:effectLst>
+                <a:outerShdw blurRad="38100" dist="38100" dir="2700000" algn="tl">
+                  <a:srgbClr val="000000">
+                    <a:alpha val="43137"/>
+                  </a:srgbClr>
+                </a:outerShdw>
+              </a:effectLst>
+              <a:latin typeface="Montserrat"/>
+              <a:ea typeface="Montserrat"/>
+              <a:cs typeface="Montserrat"/>
+              <a:sym typeface="Montserrat"/>
+            </a:endParaRPr>
+          </a:p>
+        </p:txBody>
+      </p:sp>
+      <p:sp>
+        <p:nvSpPr>
+          <p:cNvPr id="120" name="Google Shape;120;p28"/>
+          <p:cNvSpPr/>
+          <p:nvPr/>
+        </p:nvSpPr>
+        <p:spPr>
+          <a:xfrm>
+            <a:off x="-5" y="5118630"/>
+            <a:ext cx="9144000" cy="33600"/>
+          </a:xfrm>
+          <a:prstGeom prst="rect">
+            <a:avLst/>
+          </a:prstGeom>
+          <a:solidFill>
+            <a:srgbClr val="C1D82F"/>
+          </a:solidFill>
+          <a:ln>
+            <a:noFill/>
+          </a:ln>
+        </p:spPr>
+        <p:txBody>
+          <a:bodyPr spcFirstLastPara="1" wrap="square" lIns="91425" tIns="91425" rIns="91425" bIns="91425" anchor="ctr" anchorCtr="0">
+            <a:noAutofit/>
+          </a:bodyPr>
+          <a:lstStyle/>
+          <a:p>
+            <a:pPr marL="0" lvl="0" indent="0" algn="l" rtl="0">
+              <a:spcBef>
+                <a:spcPts val="0"/>
+              </a:spcBef>
+              <a:spcAft>
+                <a:spcPts val="0"/>
+              </a:spcAft>
+              <a:buNone/>
+            </a:pPr>
+            <a:endParaRPr/>
+          </a:p>
+        </p:txBody>
+      </p:sp>
+      <p:pic>
+        <p:nvPicPr>
+          <p:cNvPr id="4" name="Picture 3">
+            <a:extLst>
+              <a:ext uri="{FF2B5EF4-FFF2-40B4-BE49-F238E27FC236}">
+                <a16:creationId xmlns:a16="http://schemas.microsoft.com/office/drawing/2014/main" id="{E31152C4-61FB-4512-AE35-284ACFA30CA7}"/>
+              </a:ext>
+            </a:extLst>
+          </p:cNvPr>
+          <p:cNvPicPr>
+            <a:picLocks noChangeAspect="1"/>
+          </p:cNvPicPr>
+          <p:nvPr/>
+        </p:nvPicPr>
+        <p:blipFill>
+          <a:blip r:embed="rId3"/>
+          <a:stretch>
+            <a:fillRect/>
+          </a:stretch>
+        </p:blipFill>
+        <p:spPr>
+          <a:xfrm>
+            <a:off x="-21431" y="824157"/>
+            <a:ext cx="9144000" cy="3986205"/>
+          </a:xfrm>
+          <a:prstGeom prst="rect">
+            <a:avLst/>
+          </a:prstGeom>
+        </p:spPr>
+      </p:pic>
+      <p:sp>
+        <p:nvSpPr>
+          <p:cNvPr id="5" name="Arrow: Right 4">
+            <a:extLst>
+              <a:ext uri="{FF2B5EF4-FFF2-40B4-BE49-F238E27FC236}">
+                <a16:creationId xmlns:a16="http://schemas.microsoft.com/office/drawing/2014/main" id="{0C99756B-3B25-43AA-8217-B3DDF0F59CB9}"/>
+              </a:ext>
+            </a:extLst>
+          </p:cNvPr>
+          <p:cNvSpPr/>
+          <p:nvPr/>
+        </p:nvSpPr>
+        <p:spPr>
+          <a:xfrm>
+            <a:off x="3378994" y="2450306"/>
+            <a:ext cx="1250156" cy="209288"/>
+          </a:xfrm>
+          <a:prstGeom prst="rightArrow">
+            <a:avLst/>
+          </a:prstGeom>
+        </p:spPr>
+        <p:style>
+          <a:lnRef idx="2">
+            <a:schemeClr val="accent1">
+              <a:shade val="50000"/>
+            </a:schemeClr>
+          </a:lnRef>
+          <a:fillRef idx="1">
+            <a:schemeClr val="accent1"/>
+          </a:fillRef>
+          <a:effectRef idx="0">
+            <a:schemeClr val="accent1"/>
+          </a:effectRef>
+          <a:fontRef idx="minor">
+            <a:schemeClr val="lt1"/>
+          </a:fontRef>
+        </p:style>
+        <p:txBody>
+          <a:bodyPr rtlCol="0" anchor="ctr"/>
+          <a:lstStyle/>
+          <a:p>
+            <a:pPr algn="ctr"/>
+            <a:endParaRPr lang="en-US"/>
+          </a:p>
+        </p:txBody>
+      </p:sp>
+    </p:spTree>
+    <p:extLst>
+      <p:ext uri="{BB962C8B-B14F-4D97-AF65-F5344CB8AC3E}">
+        <p14:creationId xmlns:p14="http://schemas.microsoft.com/office/powerpoint/2010/main" val="3755147707"/>
+      </p:ext>
+    </p:extLst>
+  </p:cSld>
+  <p:clrMapOvr>
+    <a:masterClrMapping/>
+  </p:clrMapOvr>
+</p:sld>
+</file>
+
+<file path=ppt/slides/slide13.xml><?xml version="1.0" encoding="utf-8"?>
+<p:sld xmlns:a="http://schemas.openxmlformats.org/drawingml/2006/main" xmlns:r="http://schemas.openxmlformats.org/officeDocument/2006/relationships" xmlns:p="http://schemas.openxmlformats.org/presentationml/2006/main">
+  <p:cSld>
+    <p:bg>
+      <p:bgPr>
+        <a:solidFill>
+          <a:srgbClr val="000000"/>
+        </a:solidFill>
+        <a:effectLst/>
+      </p:bgPr>
+    </p:bg>
+    <p:spTree>
+      <p:nvGrpSpPr>
+        <p:cNvPr id="1" name="Shape 117"/>
+        <p:cNvGrpSpPr/>
+        <p:nvPr/>
+      </p:nvGrpSpPr>
+      <p:grpSpPr>
+        <a:xfrm>
+          <a:off x="0" y="0"/>
+          <a:ext cx="0" cy="0"/>
+          <a:chOff x="0" y="0"/>
+          <a:chExt cx="0" cy="0"/>
+        </a:xfrm>
+      </p:grpSpPr>
+      <p:sp>
+        <p:nvSpPr>
+          <p:cNvPr id="119" name="Google Shape;119;p28"/>
+          <p:cNvSpPr txBox="1"/>
+          <p:nvPr/>
+        </p:nvSpPr>
+        <p:spPr>
+          <a:xfrm>
+            <a:off x="0" y="185106"/>
+            <a:ext cx="9122569" cy="639051"/>
+          </a:xfrm>
+          <a:prstGeom prst="rect">
+            <a:avLst/>
+          </a:prstGeom>
+          <a:noFill/>
+          <a:ln>
+            <a:noFill/>
+          </a:ln>
+        </p:spPr>
+        <p:txBody>
+          <a:bodyPr spcFirstLastPara="1" wrap="square" lIns="91425" tIns="91425" rIns="91425" bIns="91425" anchor="t" anchorCtr="0">
+            <a:noAutofit/>
+          </a:bodyPr>
+          <a:lstStyle/>
+          <a:p>
+            <a:pPr marL="0" lvl="0" indent="0" algn="ctr" rtl="0">
+              <a:spcBef>
+                <a:spcPts val="0"/>
+              </a:spcBef>
+              <a:spcAft>
+                <a:spcPts val="0"/>
+              </a:spcAft>
+              <a:buClr>
+                <a:schemeClr val="dk1"/>
+              </a:buClr>
+              <a:buSzPts val="1100"/>
+              <a:buFont typeface="Arial"/>
+              <a:buNone/>
+            </a:pPr>
+            <a:r>
+              <a:rPr lang="en-US" sz="3200" b="1" dirty="0">
+                <a:solidFill>
+                  <a:schemeClr val="lt1"/>
+                </a:solidFill>
+                <a:effectLst>
+                  <a:outerShdw blurRad="38100" dist="38100" dir="2700000" algn="tl">
+                    <a:srgbClr val="000000">
+                      <a:alpha val="43137"/>
+                    </a:srgbClr>
+                  </a:outerShdw>
+                </a:effectLst>
+                <a:latin typeface="Montserrat"/>
+                <a:ea typeface="Montserrat"/>
+                <a:cs typeface="Montserrat"/>
+                <a:sym typeface="Montserrat"/>
+              </a:rPr>
               <a:t>Sometimes, we remember Open/Closed</a:t>
             </a:r>
             <a:r>
@@ -16057,6 +16716,36 @@
           </a:p>
         </p:txBody>
       </p:sp>
+      <p:pic>
+        <p:nvPicPr>
+          <p:cNvPr id="2" name="Picture 1">
+            <a:extLst>
+              <a:ext uri="{FF2B5EF4-FFF2-40B4-BE49-F238E27FC236}">
+                <a16:creationId xmlns:a16="http://schemas.microsoft.com/office/drawing/2014/main" id="{6D7C6010-5806-430A-B09E-714898F8CFC6}"/>
+              </a:ext>
+            </a:extLst>
+          </p:cNvPr>
+          <p:cNvPicPr>
+            <a:picLocks noChangeAspect="1"/>
+          </p:cNvPicPr>
+          <p:nvPr/>
+        </p:nvPicPr>
+        <p:blipFill>
+          <a:blip r:embed="rId3"/>
+          <a:stretch>
+            <a:fillRect/>
+          </a:stretch>
+        </p:blipFill>
+        <p:spPr>
+          <a:xfrm>
+            <a:off x="0" y="1276590"/>
+            <a:ext cx="9144000" cy="2590319"/>
+          </a:xfrm>
+          <a:prstGeom prst="rect">
+            <a:avLst/>
+          </a:prstGeom>
+        </p:spPr>
+      </p:pic>
     </p:spTree>
     <p:extLst>
       <p:ext uri="{BB962C8B-B14F-4D97-AF65-F5344CB8AC3E}">
@@ -16070,7 +16759,230 @@
 </p:sld>
 </file>
 
-<file path=ppt/slides/slide13.xml><?xml version="1.0" encoding="utf-8"?>
+<file path=ppt/slides/slide14.xml><?xml version="1.0" encoding="utf-8"?>
+<p:sld xmlns:a="http://schemas.openxmlformats.org/drawingml/2006/main" xmlns:r="http://schemas.openxmlformats.org/officeDocument/2006/relationships" xmlns:p="http://schemas.openxmlformats.org/presentationml/2006/main">
+  <p:cSld>
+    <p:bg>
+      <p:bgPr>
+        <a:solidFill>
+          <a:srgbClr val="000000"/>
+        </a:solidFill>
+        <a:effectLst/>
+      </p:bgPr>
+    </p:bg>
+    <p:spTree>
+      <p:nvGrpSpPr>
+        <p:cNvPr id="1" name="Shape 117"/>
+        <p:cNvGrpSpPr/>
+        <p:nvPr/>
+      </p:nvGrpSpPr>
+      <p:grpSpPr>
+        <a:xfrm>
+          <a:off x="0" y="0"/>
+          <a:ext cx="0" cy="0"/>
+          <a:chOff x="0" y="0"/>
+          <a:chExt cx="0" cy="0"/>
+        </a:xfrm>
+      </p:grpSpPr>
+      <p:sp>
+        <p:nvSpPr>
+          <p:cNvPr id="119" name="Google Shape;119;p28"/>
+          <p:cNvSpPr txBox="1"/>
+          <p:nvPr/>
+        </p:nvSpPr>
+        <p:spPr>
+          <a:xfrm>
+            <a:off x="0" y="185106"/>
+            <a:ext cx="9122569" cy="639051"/>
+          </a:xfrm>
+          <a:prstGeom prst="rect">
+            <a:avLst/>
+          </a:prstGeom>
+          <a:noFill/>
+          <a:ln>
+            <a:noFill/>
+          </a:ln>
+        </p:spPr>
+        <p:txBody>
+          <a:bodyPr spcFirstLastPara="1" wrap="square" lIns="91425" tIns="91425" rIns="91425" bIns="91425" anchor="t" anchorCtr="0">
+            <a:noAutofit/>
+          </a:bodyPr>
+          <a:lstStyle/>
+          <a:p>
+            <a:pPr marL="0" lvl="0" indent="0" algn="ctr" rtl="0">
+              <a:spcBef>
+                <a:spcPts val="0"/>
+              </a:spcBef>
+              <a:spcAft>
+                <a:spcPts val="0"/>
+              </a:spcAft>
+              <a:buClr>
+                <a:schemeClr val="dk1"/>
+              </a:buClr>
+              <a:buSzPts val="1100"/>
+              <a:buFont typeface="Arial"/>
+              <a:buNone/>
+            </a:pPr>
+            <a:r>
+              <a:rPr lang="en-US" sz="3200" b="1" dirty="0">
+                <a:solidFill>
+                  <a:schemeClr val="lt1"/>
+                </a:solidFill>
+                <a:effectLst>
+                  <a:outerShdw blurRad="38100" dist="38100" dir="2700000" algn="tl">
+                    <a:srgbClr val="000000">
+                      <a:alpha val="43137"/>
+                    </a:srgbClr>
+                  </a:outerShdw>
+                </a:effectLst>
+                <a:latin typeface="Montserrat"/>
+                <a:ea typeface="Montserrat"/>
+                <a:cs typeface="Montserrat"/>
+                <a:sym typeface="Montserrat"/>
+              </a:rPr>
+              <a:t>Sometimes, we remember Open/Closed</a:t>
+            </a:r>
+            <a:r>
+              <a:rPr lang="en" sz="3200" b="1" dirty="0">
+                <a:solidFill>
+                  <a:schemeClr val="lt1"/>
+                </a:solidFill>
+                <a:effectLst>
+                  <a:outerShdw blurRad="38100" dist="38100" dir="2700000" algn="tl">
+                    <a:srgbClr val="000000">
+                      <a:alpha val="43137"/>
+                    </a:srgbClr>
+                  </a:outerShdw>
+                </a:effectLst>
+                <a:latin typeface="Montserrat"/>
+                <a:ea typeface="Montserrat"/>
+                <a:cs typeface="Montserrat"/>
+                <a:sym typeface="Montserrat"/>
+              </a:rPr>
+              <a:t> Principle </a:t>
+            </a:r>
+            <a:r>
+              <a:rPr lang="en" sz="3200" b="1" dirty="0">
+                <a:solidFill>
+                  <a:schemeClr val="lt1"/>
+                </a:solidFill>
+                <a:effectLst>
+                  <a:outerShdw blurRad="38100" dist="38100" dir="2700000" algn="tl">
+                    <a:srgbClr val="000000">
+                      <a:alpha val="43137"/>
+                    </a:srgbClr>
+                  </a:outerShdw>
+                </a:effectLst>
+                <a:latin typeface="Montserrat"/>
+                <a:ea typeface="Montserrat"/>
+                <a:cs typeface="Montserrat"/>
+                <a:sym typeface="Wingdings" panose="05000000000000000000" pitchFamily="2" charset="2"/>
+              </a:rPr>
+              <a:t>  </a:t>
+            </a:r>
+            <a:endParaRPr sz="2000" b="1" dirty="0">
+              <a:solidFill>
+                <a:srgbClr val="C1D82F"/>
+              </a:solidFill>
+              <a:effectLst>
+                <a:outerShdw blurRad="38100" dist="38100" dir="2700000" algn="tl">
+                  <a:srgbClr val="000000">
+                    <a:alpha val="43137"/>
+                  </a:srgbClr>
+                </a:outerShdw>
+              </a:effectLst>
+              <a:latin typeface="Montserrat"/>
+              <a:ea typeface="Montserrat"/>
+              <a:cs typeface="Montserrat"/>
+              <a:sym typeface="Montserrat"/>
+            </a:endParaRPr>
+          </a:p>
+        </p:txBody>
+      </p:sp>
+      <p:sp>
+        <p:nvSpPr>
+          <p:cNvPr id="120" name="Google Shape;120;p28"/>
+          <p:cNvSpPr/>
+          <p:nvPr/>
+        </p:nvSpPr>
+        <p:spPr>
+          <a:xfrm>
+            <a:off x="-5" y="5118630"/>
+            <a:ext cx="9144000" cy="33600"/>
+          </a:xfrm>
+          <a:prstGeom prst="rect">
+            <a:avLst/>
+          </a:prstGeom>
+          <a:solidFill>
+            <a:srgbClr val="C1D82F"/>
+          </a:solidFill>
+          <a:ln>
+            <a:noFill/>
+          </a:ln>
+        </p:spPr>
+        <p:txBody>
+          <a:bodyPr spcFirstLastPara="1" wrap="square" lIns="91425" tIns="91425" rIns="91425" bIns="91425" anchor="ctr" anchorCtr="0">
+            <a:noAutofit/>
+          </a:bodyPr>
+          <a:lstStyle/>
+          <a:p>
+            <a:pPr marL="0" lvl="0" indent="0" algn="l" rtl="0">
+              <a:spcBef>
+                <a:spcPts val="0"/>
+              </a:spcBef>
+              <a:spcAft>
+                <a:spcPts val="0"/>
+              </a:spcAft>
+              <a:buNone/>
+            </a:pPr>
+            <a:endParaRPr/>
+          </a:p>
+        </p:txBody>
+      </p:sp>
+      <p:pic>
+        <p:nvPicPr>
+          <p:cNvPr id="3" name="Picture 2">
+            <a:extLst>
+              <a:ext uri="{FF2B5EF4-FFF2-40B4-BE49-F238E27FC236}">
+                <a16:creationId xmlns:a16="http://schemas.microsoft.com/office/drawing/2014/main" id="{7551C84C-AA9C-4A4E-A47E-DBAD1F9B0B3F}"/>
+              </a:ext>
+            </a:extLst>
+          </p:cNvPr>
+          <p:cNvPicPr>
+            <a:picLocks noChangeAspect="1"/>
+          </p:cNvPicPr>
+          <p:nvPr/>
+        </p:nvPicPr>
+        <p:blipFill>
+          <a:blip r:embed="rId3"/>
+          <a:stretch>
+            <a:fillRect/>
+          </a:stretch>
+        </p:blipFill>
+        <p:spPr>
+          <a:xfrm>
+            <a:off x="476249" y="1454944"/>
+            <a:ext cx="8334375" cy="3190875"/>
+          </a:xfrm>
+          <a:prstGeom prst="rect">
+            <a:avLst/>
+          </a:prstGeom>
+        </p:spPr>
+      </p:pic>
+    </p:spTree>
+    <p:extLst>
+      <p:ext uri="{BB962C8B-B14F-4D97-AF65-F5344CB8AC3E}">
+        <p14:creationId xmlns:p14="http://schemas.microsoft.com/office/powerpoint/2010/main" val="1626847343"/>
+      </p:ext>
+    </p:extLst>
+  </p:cSld>
+  <p:clrMapOvr>
+    <a:masterClrMapping/>
+  </p:clrMapOvr>
+</p:sld>
+</file>
+
+<file path=ppt/slides/slide15.xml><?xml version="1.0" encoding="utf-8"?>
 <p:sld xmlns:a="http://schemas.openxmlformats.org/drawingml/2006/main" xmlns:r="http://schemas.openxmlformats.org/officeDocument/2006/relationships" xmlns:p="http://schemas.openxmlformats.org/presentationml/2006/main">
   <p:cSld>
     <p:bg>
@@ -16415,6 +17327,251 @@
     <p:extLst>
       <p:ext uri="{BB962C8B-B14F-4D97-AF65-F5344CB8AC3E}">
         <p14:creationId xmlns:p14="http://schemas.microsoft.com/office/powerpoint/2010/main" val="3787100910"/>
+      </p:ext>
+    </p:extLst>
+  </p:cSld>
+  <p:clrMapOvr>
+    <a:masterClrMapping/>
+  </p:clrMapOvr>
+</p:sld>
+</file>
+
+<file path=ppt/slides/slide16.xml><?xml version="1.0" encoding="utf-8"?>
+<p:sld xmlns:a="http://schemas.openxmlformats.org/drawingml/2006/main" xmlns:r="http://schemas.openxmlformats.org/officeDocument/2006/relationships" xmlns:p="http://schemas.openxmlformats.org/presentationml/2006/main">
+  <p:cSld>
+    <p:bg>
+      <p:bgPr>
+        <a:solidFill>
+          <a:srgbClr val="000000"/>
+        </a:solidFill>
+        <a:effectLst/>
+      </p:bgPr>
+    </p:bg>
+    <p:spTree>
+      <p:nvGrpSpPr>
+        <p:cNvPr id="1" name="Shape 117"/>
+        <p:cNvGrpSpPr/>
+        <p:nvPr/>
+      </p:nvGrpSpPr>
+      <p:grpSpPr>
+        <a:xfrm>
+          <a:off x="0" y="0"/>
+          <a:ext cx="0" cy="0"/>
+          <a:chOff x="0" y="0"/>
+          <a:chExt cx="0" cy="0"/>
+        </a:xfrm>
+      </p:grpSpPr>
+      <p:sp>
+        <p:nvSpPr>
+          <p:cNvPr id="120" name="Google Shape;120;p28"/>
+          <p:cNvSpPr/>
+          <p:nvPr/>
+        </p:nvSpPr>
+        <p:spPr>
+          <a:xfrm>
+            <a:off x="-5" y="5118630"/>
+            <a:ext cx="9144000" cy="33600"/>
+          </a:xfrm>
+          <a:prstGeom prst="rect">
+            <a:avLst/>
+          </a:prstGeom>
+          <a:solidFill>
+            <a:srgbClr val="C1D82F"/>
+          </a:solidFill>
+          <a:ln>
+            <a:noFill/>
+          </a:ln>
+        </p:spPr>
+        <p:txBody>
+          <a:bodyPr spcFirstLastPara="1" wrap="square" lIns="91425" tIns="91425" rIns="91425" bIns="91425" anchor="ctr" anchorCtr="0">
+            <a:noAutofit/>
+          </a:bodyPr>
+          <a:lstStyle/>
+          <a:p>
+            <a:pPr marL="0" lvl="0" indent="0" algn="l" rtl="0">
+              <a:spcBef>
+                <a:spcPts val="0"/>
+              </a:spcBef>
+              <a:spcAft>
+                <a:spcPts val="0"/>
+              </a:spcAft>
+              <a:buNone/>
+            </a:pPr>
+            <a:endParaRPr/>
+          </a:p>
+        </p:txBody>
+      </p:sp>
+      <p:sp>
+        <p:nvSpPr>
+          <p:cNvPr id="8" name="Google Shape;119;p28">
+            <a:extLst>
+              <a:ext uri="{FF2B5EF4-FFF2-40B4-BE49-F238E27FC236}">
+                <a16:creationId xmlns:a16="http://schemas.microsoft.com/office/drawing/2014/main" id="{10097979-2EAB-4D16-BB1B-760958684724}"/>
+              </a:ext>
+            </a:extLst>
+          </p:cNvPr>
+          <p:cNvSpPr txBox="1"/>
+          <p:nvPr/>
+        </p:nvSpPr>
+        <p:spPr>
+          <a:xfrm>
+            <a:off x="-4" y="78241"/>
+            <a:ext cx="9144004" cy="661278"/>
+          </a:xfrm>
+          <a:prstGeom prst="rect">
+            <a:avLst/>
+          </a:prstGeom>
+          <a:noFill/>
+          <a:ln>
+            <a:noFill/>
+          </a:ln>
+        </p:spPr>
+        <p:txBody>
+          <a:bodyPr spcFirstLastPara="1" wrap="square" lIns="91425" tIns="91425" rIns="91425" bIns="91425" anchor="t" anchorCtr="0">
+            <a:noAutofit/>
+          </a:bodyPr>
+          <a:lstStyle/>
+          <a:p>
+            <a:pPr marL="0" lvl="0" indent="0" algn="ctr" rtl="0">
+              <a:spcBef>
+                <a:spcPts val="0"/>
+              </a:spcBef>
+              <a:spcAft>
+                <a:spcPts val="0"/>
+              </a:spcAft>
+              <a:buClr>
+                <a:schemeClr val="dk1"/>
+              </a:buClr>
+              <a:buSzPts val="1100"/>
+              <a:buFont typeface="Arial"/>
+              <a:buNone/>
+            </a:pPr>
+            <a:r>
+              <a:rPr lang="en-US" sz="3200" b="1" dirty="0">
+                <a:solidFill>
+                  <a:schemeClr val="lt1"/>
+                </a:solidFill>
+                <a:effectLst>
+                  <a:outerShdw blurRad="38100" dist="38100" dir="2700000" algn="tl">
+                    <a:srgbClr val="000000">
+                      <a:alpha val="43137"/>
+                    </a:srgbClr>
+                  </a:outerShdw>
+                </a:effectLst>
+                <a:latin typeface="Montserrat"/>
+                <a:ea typeface="Montserrat"/>
+                <a:cs typeface="Montserrat"/>
+                <a:sym typeface="Montserrat"/>
+              </a:rPr>
+              <a:t>File Printer Sample</a:t>
+            </a:r>
+            <a:endParaRPr lang="en-US" sz="2000" b="1" dirty="0">
+              <a:solidFill>
+                <a:srgbClr val="C1D82F"/>
+              </a:solidFill>
+              <a:effectLst>
+                <a:outerShdw blurRad="38100" dist="38100" dir="2700000" algn="tl">
+                  <a:srgbClr val="000000">
+                    <a:alpha val="43137"/>
+                  </a:srgbClr>
+                </a:outerShdw>
+              </a:effectLst>
+              <a:latin typeface="Montserrat"/>
+              <a:ea typeface="Montserrat"/>
+              <a:cs typeface="Montserrat"/>
+              <a:sym typeface="Montserrat"/>
+            </a:endParaRPr>
+          </a:p>
+        </p:txBody>
+      </p:sp>
+      <p:pic>
+        <p:nvPicPr>
+          <p:cNvPr id="4" name="Picture 3" descr="A close up of a antenna&#10;&#10;Description automatically generated">
+            <a:extLst>
+              <a:ext uri="{FF2B5EF4-FFF2-40B4-BE49-F238E27FC236}">
+                <a16:creationId xmlns:a16="http://schemas.microsoft.com/office/drawing/2014/main" id="{8930167D-05D4-4036-B108-E66D374AF90C}"/>
+              </a:ext>
+            </a:extLst>
+          </p:cNvPr>
+          <p:cNvPicPr>
+            <a:picLocks noChangeAspect="1"/>
+          </p:cNvPicPr>
+          <p:nvPr/>
+        </p:nvPicPr>
+        <p:blipFill>
+          <a:blip r:embed="rId3"/>
+          <a:stretch>
+            <a:fillRect/>
+          </a:stretch>
+        </p:blipFill>
+        <p:spPr>
+          <a:xfrm>
+            <a:off x="346131" y="1550194"/>
+            <a:ext cx="8294564" cy="946020"/>
+          </a:xfrm>
+          <a:prstGeom prst="rect">
+            <a:avLst/>
+          </a:prstGeom>
+        </p:spPr>
+      </p:pic>
+      <p:sp>
+        <p:nvSpPr>
+          <p:cNvPr id="10" name="Google Shape;118;p28">
+            <a:extLst>
+              <a:ext uri="{FF2B5EF4-FFF2-40B4-BE49-F238E27FC236}">
+                <a16:creationId xmlns:a16="http://schemas.microsoft.com/office/drawing/2014/main" id="{97AED5D8-366C-458A-A931-C3DD1F88998C}"/>
+              </a:ext>
+            </a:extLst>
+          </p:cNvPr>
+          <p:cNvSpPr txBox="1"/>
+          <p:nvPr/>
+        </p:nvSpPr>
+        <p:spPr>
+          <a:xfrm>
+            <a:off x="200023" y="955869"/>
+            <a:ext cx="4543427" cy="594325"/>
+          </a:xfrm>
+          <a:prstGeom prst="rect">
+            <a:avLst/>
+          </a:prstGeom>
+          <a:noFill/>
+          <a:ln>
+            <a:noFill/>
+          </a:ln>
+        </p:spPr>
+        <p:txBody>
+          <a:bodyPr spcFirstLastPara="1" wrap="square" lIns="91425" tIns="91425" rIns="91425" bIns="91425" anchor="t" anchorCtr="0">
+            <a:noAutofit/>
+          </a:bodyPr>
+          <a:lstStyle/>
+          <a:p>
+            <a:pPr marL="146050" lvl="0" algn="just">
+              <a:buClr>
+                <a:srgbClr val="FFFFFF"/>
+              </a:buClr>
+              <a:buSzPts val="1300"/>
+            </a:pPr>
+            <a:r>
+              <a:rPr lang="en-US" b="1" dirty="0">
+                <a:solidFill>
+                  <a:schemeClr val="bg1"/>
+                </a:solidFill>
+              </a:rPr>
+              <a:t>Simple program that allows to “print” a PDF file </a:t>
+            </a:r>
+            <a:endParaRPr lang="en-US" sz="900" dirty="0">
+              <a:solidFill>
+                <a:schemeClr val="bg1"/>
+              </a:solidFill>
+              <a:sym typeface="Nunito Sans"/>
+            </a:endParaRPr>
+          </a:p>
+        </p:txBody>
+      </p:sp>
+    </p:spTree>
+    <p:extLst>
+      <p:ext uri="{BB962C8B-B14F-4D97-AF65-F5344CB8AC3E}">
+        <p14:creationId xmlns:p14="http://schemas.microsoft.com/office/powerpoint/2010/main" val="3064259329"/>
       </p:ext>
     </p:extLst>
   </p:cSld>

</xml_diff>

<commit_message>
[Open/Closed] Third requirement: use a both message (the principle is being fulfilled)
</commit_message>
<xml_diff>
--- a/SOLID/SOLID.pptx
+++ b/SOLID/SOLID.pptx
@@ -6,7 +6,7 @@
     <p:sldMasterId id="2147483673" r:id="rId2"/>
   </p:sldMasterIdLst>
   <p:notesMasterIdLst>
-    <p:notesMasterId r:id="rId19"/>
+    <p:notesMasterId r:id="rId21"/>
   </p:notesMasterIdLst>
   <p:sldIdLst>
     <p:sldId id="256" r:id="rId3"/>
@@ -25,42 +25,44 @@
     <p:sldId id="272" r:id="rId16"/>
     <p:sldId id="270" r:id="rId17"/>
     <p:sldId id="273" r:id="rId18"/>
+    <p:sldId id="274" r:id="rId19"/>
+    <p:sldId id="275" r:id="rId20"/>
   </p:sldIdLst>
   <p:sldSz cx="9144000" cy="5143500" type="screen16x9"/>
   <p:notesSz cx="6858000" cy="9144000"/>
   <p:embeddedFontLst>
     <p:embeddedFont>
       <p:font typeface="Calibri" panose="020F0502020204030204" pitchFamily="34" charset="0"/>
-      <p:regular r:id="rId20"/>
-      <p:bold r:id="rId21"/>
-      <p:italic r:id="rId22"/>
-      <p:boldItalic r:id="rId23"/>
+      <p:regular r:id="rId22"/>
+      <p:bold r:id="rId23"/>
+      <p:italic r:id="rId24"/>
+      <p:boldItalic r:id="rId25"/>
     </p:embeddedFont>
     <p:embeddedFont>
       <p:font typeface="Dosis" panose="020B0604020202020204" charset="0"/>
-      <p:regular r:id="rId24"/>
-      <p:bold r:id="rId25"/>
+      <p:regular r:id="rId26"/>
+      <p:bold r:id="rId27"/>
     </p:embeddedFont>
     <p:embeddedFont>
       <p:font typeface="Montserrat" panose="020B0604020202020204" charset="0"/>
-      <p:regular r:id="rId26"/>
-      <p:bold r:id="rId27"/>
-      <p:italic r:id="rId28"/>
-      <p:boldItalic r:id="rId29"/>
+      <p:regular r:id="rId28"/>
+      <p:bold r:id="rId29"/>
+      <p:italic r:id="rId30"/>
+      <p:boldItalic r:id="rId31"/>
     </p:embeddedFont>
     <p:embeddedFont>
       <p:font typeface="Nunito Sans" panose="020B0604020202020204" charset="0"/>
-      <p:regular r:id="rId30"/>
-      <p:bold r:id="rId31"/>
-      <p:italic r:id="rId32"/>
-      <p:boldItalic r:id="rId33"/>
+      <p:regular r:id="rId32"/>
+      <p:bold r:id="rId33"/>
+      <p:italic r:id="rId34"/>
+      <p:boldItalic r:id="rId35"/>
     </p:embeddedFont>
     <p:embeddedFont>
       <p:font typeface="Roboto Condensed" panose="020B0604020202020204" charset="0"/>
-      <p:regular r:id="rId34"/>
-      <p:bold r:id="rId35"/>
-      <p:italic r:id="rId36"/>
-      <p:boldItalic r:id="rId37"/>
+      <p:regular r:id="rId36"/>
+      <p:bold r:id="rId37"/>
+      <p:italic r:id="rId38"/>
+      <p:boldItalic r:id="rId39"/>
     </p:embeddedFont>
   </p:embeddedFontLst>
   <p:defaultTextStyle>
@@ -1597,6 +1599,224 @@
     <p:extLst>
       <p:ext uri="{BB962C8B-B14F-4D97-AF65-F5344CB8AC3E}">
         <p14:creationId xmlns:p14="http://schemas.microsoft.com/office/powerpoint/2010/main" val="4234560576"/>
+      </p:ext>
+    </p:extLst>
+  </p:cSld>
+  <p:clrMapOvr>
+    <a:masterClrMapping/>
+  </p:clrMapOvr>
+</p:notes>
+</file>
+
+<file path=ppt/notesSlides/notesSlide17.xml><?xml version="1.0" encoding="utf-8"?>
+<p:notes xmlns:a="http://schemas.openxmlformats.org/drawingml/2006/main" xmlns:r="http://schemas.openxmlformats.org/officeDocument/2006/relationships" xmlns:p="http://schemas.openxmlformats.org/presentationml/2006/main" showMasterSp="0" showMasterPhAnim="0">
+  <p:cSld>
+    <p:spTree>
+      <p:nvGrpSpPr>
+        <p:cNvPr id="1" name="Shape 114"/>
+        <p:cNvGrpSpPr/>
+        <p:nvPr/>
+      </p:nvGrpSpPr>
+      <p:grpSpPr>
+        <a:xfrm>
+          <a:off x="0" y="0"/>
+          <a:ext cx="0" cy="0"/>
+          <a:chOff x="0" y="0"/>
+          <a:chExt cx="0" cy="0"/>
+        </a:xfrm>
+      </p:grpSpPr>
+      <p:sp>
+        <p:nvSpPr>
+          <p:cNvPr id="115" name="Google Shape;115;g297a9bff03_0_0:notes"/>
+          <p:cNvSpPr>
+            <a:spLocks noGrp="1" noRot="1" noChangeAspect="1"/>
+          </p:cNvSpPr>
+          <p:nvPr>
+            <p:ph type="sldImg" idx="2"/>
+          </p:nvPr>
+        </p:nvSpPr>
+        <p:spPr>
+          <a:xfrm>
+            <a:off x="381000" y="685800"/>
+            <a:ext cx="6096000" cy="3429000"/>
+          </a:xfrm>
+          <a:custGeom>
+            <a:avLst/>
+            <a:gdLst/>
+            <a:ahLst/>
+            <a:cxnLst/>
+            <a:rect l="l" t="t" r="r" b="b"/>
+            <a:pathLst>
+              <a:path w="120000" h="120000" extrusionOk="0">
+                <a:moveTo>
+                  <a:pt x="0" y="0"/>
+                </a:moveTo>
+                <a:lnTo>
+                  <a:pt x="120000" y="0"/>
+                </a:lnTo>
+                <a:lnTo>
+                  <a:pt x="120000" y="120000"/>
+                </a:lnTo>
+                <a:lnTo>
+                  <a:pt x="0" y="120000"/>
+                </a:lnTo>
+                <a:close/>
+              </a:path>
+            </a:pathLst>
+          </a:custGeom>
+        </p:spPr>
+      </p:sp>
+      <p:sp>
+        <p:nvSpPr>
+          <p:cNvPr id="116" name="Google Shape;116;g297a9bff03_0_0:notes"/>
+          <p:cNvSpPr txBox="1">
+            <a:spLocks noGrp="1"/>
+          </p:cNvSpPr>
+          <p:nvPr>
+            <p:ph type="body" idx="1"/>
+          </p:nvPr>
+        </p:nvSpPr>
+        <p:spPr>
+          <a:xfrm>
+            <a:off x="685800" y="4343400"/>
+            <a:ext cx="5486400" cy="4114800"/>
+          </a:xfrm>
+          <a:prstGeom prst="rect">
+            <a:avLst/>
+          </a:prstGeom>
+        </p:spPr>
+        <p:txBody>
+          <a:bodyPr spcFirstLastPara="1" wrap="square" lIns="91425" tIns="91425" rIns="91425" bIns="91425" anchor="t" anchorCtr="0">
+            <a:noAutofit/>
+          </a:bodyPr>
+          <a:lstStyle/>
+          <a:p>
+            <a:pPr marL="0" lvl="0" indent="0" algn="l" rtl="0">
+              <a:spcBef>
+                <a:spcPts val="0"/>
+              </a:spcBef>
+              <a:spcAft>
+                <a:spcPts val="0"/>
+              </a:spcAft>
+              <a:buNone/>
+            </a:pPr>
+            <a:endParaRPr/>
+          </a:p>
+        </p:txBody>
+      </p:sp>
+    </p:spTree>
+    <p:extLst>
+      <p:ext uri="{BB962C8B-B14F-4D97-AF65-F5344CB8AC3E}">
+        <p14:creationId xmlns:p14="http://schemas.microsoft.com/office/powerpoint/2010/main" val="3571040725"/>
+      </p:ext>
+    </p:extLst>
+  </p:cSld>
+  <p:clrMapOvr>
+    <a:masterClrMapping/>
+  </p:clrMapOvr>
+</p:notes>
+</file>
+
+<file path=ppt/notesSlides/notesSlide18.xml><?xml version="1.0" encoding="utf-8"?>
+<p:notes xmlns:a="http://schemas.openxmlformats.org/drawingml/2006/main" xmlns:r="http://schemas.openxmlformats.org/officeDocument/2006/relationships" xmlns:p="http://schemas.openxmlformats.org/presentationml/2006/main" showMasterSp="0" showMasterPhAnim="0">
+  <p:cSld>
+    <p:spTree>
+      <p:nvGrpSpPr>
+        <p:cNvPr id="1" name="Shape 114"/>
+        <p:cNvGrpSpPr/>
+        <p:nvPr/>
+      </p:nvGrpSpPr>
+      <p:grpSpPr>
+        <a:xfrm>
+          <a:off x="0" y="0"/>
+          <a:ext cx="0" cy="0"/>
+          <a:chOff x="0" y="0"/>
+          <a:chExt cx="0" cy="0"/>
+        </a:xfrm>
+      </p:grpSpPr>
+      <p:sp>
+        <p:nvSpPr>
+          <p:cNvPr id="115" name="Google Shape;115;g297a9bff03_0_0:notes"/>
+          <p:cNvSpPr>
+            <a:spLocks noGrp="1" noRot="1" noChangeAspect="1"/>
+          </p:cNvSpPr>
+          <p:nvPr>
+            <p:ph type="sldImg" idx="2"/>
+          </p:nvPr>
+        </p:nvSpPr>
+        <p:spPr>
+          <a:xfrm>
+            <a:off x="381000" y="685800"/>
+            <a:ext cx="6096000" cy="3429000"/>
+          </a:xfrm>
+          <a:custGeom>
+            <a:avLst/>
+            <a:gdLst/>
+            <a:ahLst/>
+            <a:cxnLst/>
+            <a:rect l="l" t="t" r="r" b="b"/>
+            <a:pathLst>
+              <a:path w="120000" h="120000" extrusionOk="0">
+                <a:moveTo>
+                  <a:pt x="0" y="0"/>
+                </a:moveTo>
+                <a:lnTo>
+                  <a:pt x="120000" y="0"/>
+                </a:lnTo>
+                <a:lnTo>
+                  <a:pt x="120000" y="120000"/>
+                </a:lnTo>
+                <a:lnTo>
+                  <a:pt x="0" y="120000"/>
+                </a:lnTo>
+                <a:close/>
+              </a:path>
+            </a:pathLst>
+          </a:custGeom>
+        </p:spPr>
+      </p:sp>
+      <p:sp>
+        <p:nvSpPr>
+          <p:cNvPr id="116" name="Google Shape;116;g297a9bff03_0_0:notes"/>
+          <p:cNvSpPr txBox="1">
+            <a:spLocks noGrp="1"/>
+          </p:cNvSpPr>
+          <p:nvPr>
+            <p:ph type="body" idx="1"/>
+          </p:nvPr>
+        </p:nvSpPr>
+        <p:spPr>
+          <a:xfrm>
+            <a:off x="685800" y="4343400"/>
+            <a:ext cx="5486400" cy="4114800"/>
+          </a:xfrm>
+          <a:prstGeom prst="rect">
+            <a:avLst/>
+          </a:prstGeom>
+        </p:spPr>
+        <p:txBody>
+          <a:bodyPr spcFirstLastPara="1" wrap="square" lIns="91425" tIns="91425" rIns="91425" bIns="91425" anchor="t" anchorCtr="0">
+            <a:noAutofit/>
+          </a:bodyPr>
+          <a:lstStyle/>
+          <a:p>
+            <a:pPr marL="0" lvl="0" indent="0" algn="l" rtl="0">
+              <a:spcBef>
+                <a:spcPts val="0"/>
+              </a:spcBef>
+              <a:spcAft>
+                <a:spcPts val="0"/>
+              </a:spcAft>
+              <a:buNone/>
+            </a:pPr>
+            <a:endParaRPr/>
+          </a:p>
+        </p:txBody>
+      </p:sp>
+    </p:spTree>
+    <p:extLst>
+      <p:ext uri="{BB962C8B-B14F-4D97-AF65-F5344CB8AC3E}">
+        <p14:creationId xmlns:p14="http://schemas.microsoft.com/office/powerpoint/2010/main" val="3345720522"/>
       </p:ext>
     </p:extLst>
   </p:cSld>
@@ -17506,7 +17726,7 @@
         </p:blipFill>
         <p:spPr>
           <a:xfrm>
-            <a:off x="346131" y="1550194"/>
+            <a:off x="539012" y="1456365"/>
             <a:ext cx="8294564" cy="946020"/>
           </a:xfrm>
           <a:prstGeom prst="rect">
@@ -17572,6 +17792,805 @@
     <p:extLst>
       <p:ext uri="{BB962C8B-B14F-4D97-AF65-F5344CB8AC3E}">
         <p14:creationId xmlns:p14="http://schemas.microsoft.com/office/powerpoint/2010/main" val="3064259329"/>
+      </p:ext>
+    </p:extLst>
+  </p:cSld>
+  <p:clrMapOvr>
+    <a:masterClrMapping/>
+  </p:clrMapOvr>
+</p:sld>
+</file>
+
+<file path=ppt/slides/slide17.xml><?xml version="1.0" encoding="utf-8"?>
+<p:sld xmlns:a="http://schemas.openxmlformats.org/drawingml/2006/main" xmlns:r="http://schemas.openxmlformats.org/officeDocument/2006/relationships" xmlns:p="http://schemas.openxmlformats.org/presentationml/2006/main">
+  <p:cSld>
+    <p:bg>
+      <p:bgPr>
+        <a:solidFill>
+          <a:srgbClr val="000000"/>
+        </a:solidFill>
+        <a:effectLst/>
+      </p:bgPr>
+    </p:bg>
+    <p:spTree>
+      <p:nvGrpSpPr>
+        <p:cNvPr id="1" name="Shape 117"/>
+        <p:cNvGrpSpPr/>
+        <p:nvPr/>
+      </p:nvGrpSpPr>
+      <p:grpSpPr>
+        <a:xfrm>
+          <a:off x="0" y="0"/>
+          <a:ext cx="0" cy="0"/>
+          <a:chOff x="0" y="0"/>
+          <a:chExt cx="0" cy="0"/>
+        </a:xfrm>
+      </p:grpSpPr>
+      <p:sp>
+        <p:nvSpPr>
+          <p:cNvPr id="120" name="Google Shape;120;p28"/>
+          <p:cNvSpPr/>
+          <p:nvPr/>
+        </p:nvSpPr>
+        <p:spPr>
+          <a:xfrm>
+            <a:off x="-5" y="5118630"/>
+            <a:ext cx="9144000" cy="33600"/>
+          </a:xfrm>
+          <a:prstGeom prst="rect">
+            <a:avLst/>
+          </a:prstGeom>
+          <a:solidFill>
+            <a:srgbClr val="C1D82F"/>
+          </a:solidFill>
+          <a:ln>
+            <a:noFill/>
+          </a:ln>
+        </p:spPr>
+        <p:txBody>
+          <a:bodyPr spcFirstLastPara="1" wrap="square" lIns="91425" tIns="91425" rIns="91425" bIns="91425" anchor="ctr" anchorCtr="0">
+            <a:noAutofit/>
+          </a:bodyPr>
+          <a:lstStyle/>
+          <a:p>
+            <a:pPr marL="0" lvl="0" indent="0" algn="l" rtl="0">
+              <a:spcBef>
+                <a:spcPts val="0"/>
+              </a:spcBef>
+              <a:spcAft>
+                <a:spcPts val="0"/>
+              </a:spcAft>
+              <a:buNone/>
+            </a:pPr>
+            <a:endParaRPr/>
+          </a:p>
+        </p:txBody>
+      </p:sp>
+      <p:sp>
+        <p:nvSpPr>
+          <p:cNvPr id="8" name="Google Shape;119;p28">
+            <a:extLst>
+              <a:ext uri="{FF2B5EF4-FFF2-40B4-BE49-F238E27FC236}">
+                <a16:creationId xmlns:a16="http://schemas.microsoft.com/office/drawing/2014/main" id="{10097979-2EAB-4D16-BB1B-760958684724}"/>
+              </a:ext>
+            </a:extLst>
+          </p:cNvPr>
+          <p:cNvSpPr txBox="1"/>
+          <p:nvPr/>
+        </p:nvSpPr>
+        <p:spPr>
+          <a:xfrm>
+            <a:off x="-4" y="78241"/>
+            <a:ext cx="9144004" cy="661278"/>
+          </a:xfrm>
+          <a:prstGeom prst="rect">
+            <a:avLst/>
+          </a:prstGeom>
+          <a:noFill/>
+          <a:ln>
+            <a:noFill/>
+          </a:ln>
+        </p:spPr>
+        <p:txBody>
+          <a:bodyPr spcFirstLastPara="1" wrap="square" lIns="91425" tIns="91425" rIns="91425" bIns="91425" anchor="t" anchorCtr="0">
+            <a:noAutofit/>
+          </a:bodyPr>
+          <a:lstStyle/>
+          <a:p>
+            <a:pPr marL="0" lvl="0" indent="0" algn="ctr" rtl="0">
+              <a:spcBef>
+                <a:spcPts val="0"/>
+              </a:spcBef>
+              <a:spcAft>
+                <a:spcPts val="0"/>
+              </a:spcAft>
+              <a:buClr>
+                <a:schemeClr val="dk1"/>
+              </a:buClr>
+              <a:buSzPts val="1100"/>
+              <a:buFont typeface="Arial"/>
+              <a:buNone/>
+            </a:pPr>
+            <a:r>
+              <a:rPr lang="en-US" sz="3200" b="1" dirty="0">
+                <a:solidFill>
+                  <a:schemeClr val="lt1"/>
+                </a:solidFill>
+                <a:effectLst>
+                  <a:outerShdw blurRad="38100" dist="38100" dir="2700000" algn="tl">
+                    <a:srgbClr val="000000">
+                      <a:alpha val="43137"/>
+                    </a:srgbClr>
+                  </a:outerShdw>
+                </a:effectLst>
+                <a:latin typeface="Montserrat"/>
+                <a:ea typeface="Montserrat"/>
+                <a:cs typeface="Montserrat"/>
+                <a:sym typeface="Montserrat"/>
+              </a:rPr>
+              <a:t>File Printer Sample</a:t>
+            </a:r>
+            <a:endParaRPr lang="en-US" sz="2000" b="1" dirty="0">
+              <a:solidFill>
+                <a:srgbClr val="C1D82F"/>
+              </a:solidFill>
+              <a:effectLst>
+                <a:outerShdw blurRad="38100" dist="38100" dir="2700000" algn="tl">
+                  <a:srgbClr val="000000">
+                    <a:alpha val="43137"/>
+                  </a:srgbClr>
+                </a:outerShdw>
+              </a:effectLst>
+              <a:latin typeface="Montserrat"/>
+              <a:ea typeface="Montserrat"/>
+              <a:cs typeface="Montserrat"/>
+              <a:sym typeface="Montserrat"/>
+            </a:endParaRPr>
+          </a:p>
+        </p:txBody>
+      </p:sp>
+      <p:pic>
+        <p:nvPicPr>
+          <p:cNvPr id="4" name="Picture 3" descr="A close up of a antenna&#10;&#10;Description automatically generated">
+            <a:extLst>
+              <a:ext uri="{FF2B5EF4-FFF2-40B4-BE49-F238E27FC236}">
+                <a16:creationId xmlns:a16="http://schemas.microsoft.com/office/drawing/2014/main" id="{8930167D-05D4-4036-B108-E66D374AF90C}"/>
+              </a:ext>
+            </a:extLst>
+          </p:cNvPr>
+          <p:cNvPicPr>
+            <a:picLocks noChangeAspect="1"/>
+          </p:cNvPicPr>
+          <p:nvPr/>
+        </p:nvPicPr>
+        <p:blipFill>
+          <a:blip r:embed="rId3"/>
+          <a:stretch>
+            <a:fillRect/>
+          </a:stretch>
+        </p:blipFill>
+        <p:spPr>
+          <a:xfrm>
+            <a:off x="539012" y="1456365"/>
+            <a:ext cx="8294564" cy="946020"/>
+          </a:xfrm>
+          <a:prstGeom prst="rect">
+            <a:avLst/>
+          </a:prstGeom>
+        </p:spPr>
+      </p:pic>
+      <p:sp>
+        <p:nvSpPr>
+          <p:cNvPr id="10" name="Google Shape;118;p28">
+            <a:extLst>
+              <a:ext uri="{FF2B5EF4-FFF2-40B4-BE49-F238E27FC236}">
+                <a16:creationId xmlns:a16="http://schemas.microsoft.com/office/drawing/2014/main" id="{97AED5D8-366C-458A-A931-C3DD1F88998C}"/>
+              </a:ext>
+            </a:extLst>
+          </p:cNvPr>
+          <p:cNvSpPr txBox="1"/>
+          <p:nvPr/>
+        </p:nvSpPr>
+        <p:spPr>
+          <a:xfrm>
+            <a:off x="200023" y="955869"/>
+            <a:ext cx="4543427" cy="594325"/>
+          </a:xfrm>
+          <a:prstGeom prst="rect">
+            <a:avLst/>
+          </a:prstGeom>
+          <a:noFill/>
+          <a:ln>
+            <a:noFill/>
+          </a:ln>
+        </p:spPr>
+        <p:txBody>
+          <a:bodyPr spcFirstLastPara="1" wrap="square" lIns="91425" tIns="91425" rIns="91425" bIns="91425" anchor="t" anchorCtr="0">
+            <a:noAutofit/>
+          </a:bodyPr>
+          <a:lstStyle/>
+          <a:p>
+            <a:pPr marL="146050" lvl="0" algn="just">
+              <a:buClr>
+                <a:srgbClr val="FFFFFF"/>
+              </a:buClr>
+              <a:buSzPts val="1300"/>
+            </a:pPr>
+            <a:r>
+              <a:rPr lang="en-US" b="1" dirty="0">
+                <a:solidFill>
+                  <a:schemeClr val="bg1"/>
+                </a:solidFill>
+              </a:rPr>
+              <a:t>Simple program that allows to “print” a PDF file </a:t>
+            </a:r>
+            <a:endParaRPr lang="en-US" sz="900" dirty="0">
+              <a:solidFill>
+                <a:schemeClr val="bg1"/>
+              </a:solidFill>
+              <a:sym typeface="Nunito Sans"/>
+            </a:endParaRPr>
+          </a:p>
+        </p:txBody>
+      </p:sp>
+      <p:sp>
+        <p:nvSpPr>
+          <p:cNvPr id="12" name="Google Shape;118;p28">
+            <a:extLst>
+              <a:ext uri="{FF2B5EF4-FFF2-40B4-BE49-F238E27FC236}">
+                <a16:creationId xmlns:a16="http://schemas.microsoft.com/office/drawing/2014/main" id="{98731A4F-9B69-46CC-B1A8-F83717DDD68C}"/>
+              </a:ext>
+            </a:extLst>
+          </p:cNvPr>
+          <p:cNvSpPr txBox="1"/>
+          <p:nvPr/>
+        </p:nvSpPr>
+        <p:spPr>
+          <a:xfrm>
+            <a:off x="200023" y="2594824"/>
+            <a:ext cx="8743954" cy="594325"/>
+          </a:xfrm>
+          <a:prstGeom prst="rect">
+            <a:avLst/>
+          </a:prstGeom>
+          <a:noFill/>
+          <a:ln>
+            <a:noFill/>
+          </a:ln>
+        </p:spPr>
+        <p:txBody>
+          <a:bodyPr spcFirstLastPara="1" wrap="square" lIns="91425" tIns="91425" rIns="91425" bIns="91425" anchor="t" anchorCtr="0">
+            <a:noAutofit/>
+          </a:bodyPr>
+          <a:lstStyle/>
+          <a:p>
+            <a:pPr marL="146050" lvl="0" algn="just">
+              <a:buClr>
+                <a:srgbClr val="FFFFFF"/>
+              </a:buClr>
+              <a:buSzPts val="1300"/>
+            </a:pPr>
+            <a:r>
+              <a:rPr lang="en-US" b="1" dirty="0">
+                <a:solidFill>
+                  <a:schemeClr val="bg1"/>
+                </a:solidFill>
+              </a:rPr>
+              <a:t>Now the client wants to “print” a friendly message while the PDF is been generating</a:t>
+            </a:r>
+            <a:endParaRPr lang="en-US" sz="900" dirty="0">
+              <a:solidFill>
+                <a:schemeClr val="bg1"/>
+              </a:solidFill>
+              <a:sym typeface="Nunito Sans"/>
+            </a:endParaRPr>
+          </a:p>
+        </p:txBody>
+      </p:sp>
+      <p:sp>
+        <p:nvSpPr>
+          <p:cNvPr id="15" name="Google Shape;118;p28">
+            <a:extLst>
+              <a:ext uri="{FF2B5EF4-FFF2-40B4-BE49-F238E27FC236}">
+                <a16:creationId xmlns:a16="http://schemas.microsoft.com/office/drawing/2014/main" id="{DAEBD1F0-2432-45D9-BF41-18AF63607761}"/>
+              </a:ext>
+            </a:extLst>
+          </p:cNvPr>
+          <p:cNvSpPr txBox="1"/>
+          <p:nvPr/>
+        </p:nvSpPr>
+        <p:spPr>
+          <a:xfrm>
+            <a:off x="5356620" y="3033355"/>
+            <a:ext cx="3555210" cy="1407986"/>
+          </a:xfrm>
+          <a:prstGeom prst="rect">
+            <a:avLst/>
+          </a:prstGeom>
+          <a:noFill/>
+          <a:ln>
+            <a:noFill/>
+          </a:ln>
+        </p:spPr>
+        <p:txBody>
+          <a:bodyPr spcFirstLastPara="1" wrap="square" lIns="91425" tIns="91425" rIns="91425" bIns="91425" anchor="t" anchorCtr="0">
+            <a:noAutofit/>
+          </a:bodyPr>
+          <a:lstStyle/>
+          <a:p>
+            <a:pPr marL="146050" lvl="0" algn="just">
+              <a:buClr>
+                <a:srgbClr val="FFFFFF"/>
+              </a:buClr>
+              <a:buSzPts val="1300"/>
+            </a:pPr>
+            <a:r>
+              <a:rPr lang="en-US" b="1" dirty="0">
+                <a:solidFill>
+                  <a:schemeClr val="bg1"/>
+                </a:solidFill>
+              </a:rPr>
+              <a:t>Single responsibility AWESOME!!!</a:t>
+            </a:r>
+          </a:p>
+          <a:p>
+            <a:pPr marL="146050" lvl="0" algn="just">
+              <a:buClr>
+                <a:srgbClr val="FFFFFF"/>
+              </a:buClr>
+              <a:buSzPts val="1300"/>
+            </a:pPr>
+            <a:endParaRPr lang="en-US" b="1" dirty="0">
+              <a:solidFill>
+                <a:schemeClr val="bg1"/>
+              </a:solidFill>
+            </a:endParaRPr>
+          </a:p>
+          <a:p>
+            <a:pPr marL="146050" lvl="0" algn="just">
+              <a:buClr>
+                <a:srgbClr val="FFFFFF"/>
+              </a:buClr>
+              <a:buSzPts val="1300"/>
+            </a:pPr>
+            <a:r>
+              <a:rPr lang="en-US" b="1" dirty="0">
+                <a:solidFill>
+                  <a:schemeClr val="bg1"/>
+                </a:solidFill>
+              </a:rPr>
+              <a:t>But what happens with the Open/Closed principle? </a:t>
+            </a:r>
+            <a:endParaRPr lang="en-US" sz="900" b="1" dirty="0">
+              <a:solidFill>
+                <a:schemeClr val="bg1"/>
+              </a:solidFill>
+              <a:sym typeface="Nunito Sans"/>
+            </a:endParaRPr>
+          </a:p>
+        </p:txBody>
+      </p:sp>
+      <p:pic>
+        <p:nvPicPr>
+          <p:cNvPr id="1026" name="Picture 2" descr="Image result for emoji thinking">
+            <a:extLst>
+              <a:ext uri="{FF2B5EF4-FFF2-40B4-BE49-F238E27FC236}">
+                <a16:creationId xmlns:a16="http://schemas.microsoft.com/office/drawing/2014/main" id="{0858F406-86E5-4057-8514-1C10DD75D314}"/>
+              </a:ext>
+            </a:extLst>
+          </p:cNvPr>
+          <p:cNvPicPr>
+            <a:picLocks noChangeAspect="1" noChangeArrowheads="1"/>
+          </p:cNvPicPr>
+          <p:nvPr/>
+        </p:nvPicPr>
+        <p:blipFill>
+          <a:blip r:embed="rId4">
+            <a:extLst>
+              <a:ext uri="{28A0092B-C50C-407E-A947-70E740481C1C}">
+                <a14:useLocalDpi xmlns:a14="http://schemas.microsoft.com/office/drawing/2010/main" val="0"/>
+              </a:ext>
+            </a:extLst>
+          </a:blip>
+          <a:srcRect/>
+          <a:stretch>
+            <a:fillRect/>
+          </a:stretch>
+        </p:blipFill>
+        <p:spPr bwMode="auto">
+          <a:xfrm>
+            <a:off x="7422408" y="3863888"/>
+            <a:ext cx="1073893" cy="1073893"/>
+          </a:xfrm>
+          <a:prstGeom prst="rect">
+            <a:avLst/>
+          </a:prstGeom>
+          <a:noFill/>
+          <a:extLst>
+            <a:ext uri="{909E8E84-426E-40DD-AFC4-6F175D3DCCD1}">
+              <a14:hiddenFill xmlns:a14="http://schemas.microsoft.com/office/drawing/2010/main">
+                <a:solidFill>
+                  <a:srgbClr val="FFFFFF"/>
+                </a:solidFill>
+              </a14:hiddenFill>
+            </a:ext>
+          </a:extLst>
+        </p:spPr>
+      </p:pic>
+      <p:pic>
+        <p:nvPicPr>
+          <p:cNvPr id="17" name="Picture 16" descr="A close up of a antenna&#10;&#10;Description automatically generated">
+            <a:extLst>
+              <a:ext uri="{FF2B5EF4-FFF2-40B4-BE49-F238E27FC236}">
+                <a16:creationId xmlns:a16="http://schemas.microsoft.com/office/drawing/2014/main" id="{7B3A953D-9F37-4000-AD70-7E10FF810530}"/>
+              </a:ext>
+            </a:extLst>
+          </p:cNvPr>
+          <p:cNvPicPr>
+            <a:picLocks noChangeAspect="1"/>
+          </p:cNvPicPr>
+          <p:nvPr/>
+        </p:nvPicPr>
+        <p:blipFill>
+          <a:blip r:embed="rId3"/>
+          <a:stretch>
+            <a:fillRect/>
+          </a:stretch>
+        </p:blipFill>
+        <p:spPr>
+          <a:xfrm>
+            <a:off x="647699" y="4129285"/>
+            <a:ext cx="5472115" cy="624111"/>
+          </a:xfrm>
+          <a:prstGeom prst="rect">
+            <a:avLst/>
+          </a:prstGeom>
+        </p:spPr>
+      </p:pic>
+    </p:spTree>
+    <p:extLst>
+      <p:ext uri="{BB962C8B-B14F-4D97-AF65-F5344CB8AC3E}">
+        <p14:creationId xmlns:p14="http://schemas.microsoft.com/office/powerpoint/2010/main" val="2362505422"/>
+      </p:ext>
+    </p:extLst>
+  </p:cSld>
+  <p:clrMapOvr>
+    <a:masterClrMapping/>
+  </p:clrMapOvr>
+</p:sld>
+</file>
+
+<file path=ppt/slides/slide18.xml><?xml version="1.0" encoding="utf-8"?>
+<p:sld xmlns:a="http://schemas.openxmlformats.org/drawingml/2006/main" xmlns:r="http://schemas.openxmlformats.org/officeDocument/2006/relationships" xmlns:p="http://schemas.openxmlformats.org/presentationml/2006/main">
+  <p:cSld>
+    <p:bg>
+      <p:bgPr>
+        <a:solidFill>
+          <a:srgbClr val="000000"/>
+        </a:solidFill>
+        <a:effectLst/>
+      </p:bgPr>
+    </p:bg>
+    <p:spTree>
+      <p:nvGrpSpPr>
+        <p:cNvPr id="1" name="Shape 117"/>
+        <p:cNvGrpSpPr/>
+        <p:nvPr/>
+      </p:nvGrpSpPr>
+      <p:grpSpPr>
+        <a:xfrm>
+          <a:off x="0" y="0"/>
+          <a:ext cx="0" cy="0"/>
+          <a:chOff x="0" y="0"/>
+          <a:chExt cx="0" cy="0"/>
+        </a:xfrm>
+      </p:grpSpPr>
+      <p:sp>
+        <p:nvSpPr>
+          <p:cNvPr id="120" name="Google Shape;120;p28"/>
+          <p:cNvSpPr/>
+          <p:nvPr/>
+        </p:nvSpPr>
+        <p:spPr>
+          <a:xfrm>
+            <a:off x="-5" y="5118630"/>
+            <a:ext cx="9144000" cy="33600"/>
+          </a:xfrm>
+          <a:prstGeom prst="rect">
+            <a:avLst/>
+          </a:prstGeom>
+          <a:solidFill>
+            <a:srgbClr val="C1D82F"/>
+          </a:solidFill>
+          <a:ln>
+            <a:noFill/>
+          </a:ln>
+        </p:spPr>
+        <p:txBody>
+          <a:bodyPr spcFirstLastPara="1" wrap="square" lIns="91425" tIns="91425" rIns="91425" bIns="91425" anchor="ctr" anchorCtr="0">
+            <a:noAutofit/>
+          </a:bodyPr>
+          <a:lstStyle/>
+          <a:p>
+            <a:pPr marL="0" lvl="0" indent="0" algn="l" rtl="0">
+              <a:spcBef>
+                <a:spcPts val="0"/>
+              </a:spcBef>
+              <a:spcAft>
+                <a:spcPts val="0"/>
+              </a:spcAft>
+              <a:buNone/>
+            </a:pPr>
+            <a:endParaRPr/>
+          </a:p>
+        </p:txBody>
+      </p:sp>
+      <p:sp>
+        <p:nvSpPr>
+          <p:cNvPr id="8" name="Google Shape;119;p28">
+            <a:extLst>
+              <a:ext uri="{FF2B5EF4-FFF2-40B4-BE49-F238E27FC236}">
+                <a16:creationId xmlns:a16="http://schemas.microsoft.com/office/drawing/2014/main" id="{10097979-2EAB-4D16-BB1B-760958684724}"/>
+              </a:ext>
+            </a:extLst>
+          </p:cNvPr>
+          <p:cNvSpPr txBox="1"/>
+          <p:nvPr/>
+        </p:nvSpPr>
+        <p:spPr>
+          <a:xfrm>
+            <a:off x="-4" y="78241"/>
+            <a:ext cx="9144004" cy="661278"/>
+          </a:xfrm>
+          <a:prstGeom prst="rect">
+            <a:avLst/>
+          </a:prstGeom>
+          <a:noFill/>
+          <a:ln>
+            <a:noFill/>
+          </a:ln>
+        </p:spPr>
+        <p:txBody>
+          <a:bodyPr spcFirstLastPara="1" wrap="square" lIns="91425" tIns="91425" rIns="91425" bIns="91425" anchor="t" anchorCtr="0">
+            <a:noAutofit/>
+          </a:bodyPr>
+          <a:lstStyle/>
+          <a:p>
+            <a:pPr marL="0" lvl="0" indent="0" algn="ctr" rtl="0">
+              <a:spcBef>
+                <a:spcPts val="0"/>
+              </a:spcBef>
+              <a:spcAft>
+                <a:spcPts val="0"/>
+              </a:spcAft>
+              <a:buClr>
+                <a:schemeClr val="dk1"/>
+              </a:buClr>
+              <a:buSzPts val="1100"/>
+              <a:buFont typeface="Arial"/>
+              <a:buNone/>
+            </a:pPr>
+            <a:r>
+              <a:rPr lang="en-US" sz="3200" b="1" dirty="0">
+                <a:solidFill>
+                  <a:schemeClr val="lt1"/>
+                </a:solidFill>
+                <a:effectLst>
+                  <a:outerShdw blurRad="38100" dist="38100" dir="2700000" algn="tl">
+                    <a:srgbClr val="000000">
+                      <a:alpha val="43137"/>
+                    </a:srgbClr>
+                  </a:outerShdw>
+                </a:effectLst>
+                <a:latin typeface="Montserrat"/>
+                <a:ea typeface="Montserrat"/>
+                <a:cs typeface="Montserrat"/>
+                <a:sym typeface="Montserrat"/>
+              </a:rPr>
+              <a:t>File Printer Sample</a:t>
+            </a:r>
+            <a:endParaRPr lang="en-US" sz="2000" b="1" dirty="0">
+              <a:solidFill>
+                <a:srgbClr val="C1D82F"/>
+              </a:solidFill>
+              <a:effectLst>
+                <a:outerShdw blurRad="38100" dist="38100" dir="2700000" algn="tl">
+                  <a:srgbClr val="000000">
+                    <a:alpha val="43137"/>
+                  </a:srgbClr>
+                </a:outerShdw>
+              </a:effectLst>
+              <a:latin typeface="Montserrat"/>
+              <a:ea typeface="Montserrat"/>
+              <a:cs typeface="Montserrat"/>
+              <a:sym typeface="Montserrat"/>
+            </a:endParaRPr>
+          </a:p>
+        </p:txBody>
+      </p:sp>
+      <p:sp>
+        <p:nvSpPr>
+          <p:cNvPr id="12" name="Google Shape;118;p28">
+            <a:extLst>
+              <a:ext uri="{FF2B5EF4-FFF2-40B4-BE49-F238E27FC236}">
+                <a16:creationId xmlns:a16="http://schemas.microsoft.com/office/drawing/2014/main" id="{98731A4F-9B69-46CC-B1A8-F83717DDD68C}"/>
+              </a:ext>
+            </a:extLst>
+          </p:cNvPr>
+          <p:cNvSpPr txBox="1"/>
+          <p:nvPr/>
+        </p:nvSpPr>
+        <p:spPr>
+          <a:xfrm>
+            <a:off x="89622" y="779620"/>
+            <a:ext cx="8743954" cy="594325"/>
+          </a:xfrm>
+          <a:prstGeom prst="rect">
+            <a:avLst/>
+          </a:prstGeom>
+          <a:noFill/>
+          <a:ln>
+            <a:noFill/>
+          </a:ln>
+        </p:spPr>
+        <p:txBody>
+          <a:bodyPr spcFirstLastPara="1" wrap="square" lIns="91425" tIns="91425" rIns="91425" bIns="91425" anchor="t" anchorCtr="0">
+            <a:noAutofit/>
+          </a:bodyPr>
+          <a:lstStyle/>
+          <a:p>
+            <a:pPr marL="146050" lvl="0" algn="just">
+              <a:buClr>
+                <a:srgbClr val="FFFFFF"/>
+              </a:buClr>
+              <a:buSzPts val="1300"/>
+            </a:pPr>
+            <a:r>
+              <a:rPr lang="en-US" b="1" dirty="0">
+                <a:solidFill>
+                  <a:schemeClr val="bg1"/>
+                </a:solidFill>
+              </a:rPr>
+              <a:t>Now the client wants both message and they are thinking about the third one</a:t>
+            </a:r>
+            <a:endParaRPr lang="en-US" sz="900" dirty="0">
+              <a:solidFill>
+                <a:schemeClr val="bg1"/>
+              </a:solidFill>
+              <a:sym typeface="Nunito Sans"/>
+            </a:endParaRPr>
+          </a:p>
+        </p:txBody>
+      </p:sp>
+      <p:sp>
+        <p:nvSpPr>
+          <p:cNvPr id="15" name="Google Shape;118;p28">
+            <a:extLst>
+              <a:ext uri="{FF2B5EF4-FFF2-40B4-BE49-F238E27FC236}">
+                <a16:creationId xmlns:a16="http://schemas.microsoft.com/office/drawing/2014/main" id="{DAEBD1F0-2432-45D9-BF41-18AF63607761}"/>
+              </a:ext>
+            </a:extLst>
+          </p:cNvPr>
+          <p:cNvSpPr txBox="1"/>
+          <p:nvPr/>
+        </p:nvSpPr>
+        <p:spPr>
+          <a:xfrm>
+            <a:off x="5076822" y="4382396"/>
+            <a:ext cx="3555210" cy="744397"/>
+          </a:xfrm>
+          <a:prstGeom prst="rect">
+            <a:avLst/>
+          </a:prstGeom>
+          <a:noFill/>
+          <a:ln>
+            <a:noFill/>
+          </a:ln>
+        </p:spPr>
+        <p:txBody>
+          <a:bodyPr spcFirstLastPara="1" wrap="square" lIns="91425" tIns="91425" rIns="91425" bIns="91425" anchor="t" anchorCtr="0">
+            <a:noAutofit/>
+          </a:bodyPr>
+          <a:lstStyle/>
+          <a:p>
+            <a:pPr marL="146050" lvl="0" algn="just">
+              <a:buClr>
+                <a:srgbClr val="FFFFFF"/>
+              </a:buClr>
+              <a:buSzPts val="1300"/>
+            </a:pPr>
+            <a:r>
+              <a:rPr lang="en-US" b="1" dirty="0">
+                <a:solidFill>
+                  <a:schemeClr val="bg1"/>
+                </a:solidFill>
+              </a:rPr>
+              <a:t>Let’s keep Single responsibility and Open/closed principles</a:t>
+            </a:r>
+          </a:p>
+        </p:txBody>
+      </p:sp>
+      <p:pic>
+        <p:nvPicPr>
+          <p:cNvPr id="1026" name="Picture 2" descr="Image result for emoji thinking">
+            <a:extLst>
+              <a:ext uri="{FF2B5EF4-FFF2-40B4-BE49-F238E27FC236}">
+                <a16:creationId xmlns:a16="http://schemas.microsoft.com/office/drawing/2014/main" id="{0858F406-86E5-4057-8514-1C10DD75D314}"/>
+              </a:ext>
+            </a:extLst>
+          </p:cNvPr>
+          <p:cNvPicPr>
+            <a:picLocks noChangeAspect="1" noChangeArrowheads="1"/>
+          </p:cNvPicPr>
+          <p:nvPr/>
+        </p:nvPicPr>
+        <p:blipFill>
+          <a:blip r:embed="rId3">
+            <a:extLst>
+              <a:ext uri="{28A0092B-C50C-407E-A947-70E740481C1C}">
+                <a14:useLocalDpi xmlns:a14="http://schemas.microsoft.com/office/drawing/2010/main" val="0"/>
+              </a:ext>
+            </a:extLst>
+          </a:blip>
+          <a:srcRect/>
+          <a:stretch>
+            <a:fillRect/>
+          </a:stretch>
+        </p:blipFill>
+        <p:spPr bwMode="auto">
+          <a:xfrm>
+            <a:off x="7486702" y="1175643"/>
+            <a:ext cx="1073893" cy="1073893"/>
+          </a:xfrm>
+          <a:prstGeom prst="rect">
+            <a:avLst/>
+          </a:prstGeom>
+          <a:noFill/>
+          <a:extLst>
+            <a:ext uri="{909E8E84-426E-40DD-AFC4-6F175D3DCCD1}">
+              <a14:hiddenFill xmlns:a14="http://schemas.microsoft.com/office/drawing/2010/main">
+                <a:solidFill>
+                  <a:srgbClr val="FFFFFF"/>
+                </a:solidFill>
+              </a14:hiddenFill>
+            </a:ext>
+          </a:extLst>
+        </p:spPr>
+      </p:pic>
+      <p:pic>
+        <p:nvPicPr>
+          <p:cNvPr id="3" name="Picture 2">
+            <a:extLst>
+              <a:ext uri="{FF2B5EF4-FFF2-40B4-BE49-F238E27FC236}">
+                <a16:creationId xmlns:a16="http://schemas.microsoft.com/office/drawing/2014/main" id="{2E71AEE3-5FF2-42A9-B796-07E7C660803A}"/>
+              </a:ext>
+            </a:extLst>
+          </p:cNvPr>
+          <p:cNvPicPr>
+            <a:picLocks noChangeAspect="1"/>
+          </p:cNvPicPr>
+          <p:nvPr/>
+        </p:nvPicPr>
+        <p:blipFill>
+          <a:blip r:embed="rId4"/>
+          <a:stretch>
+            <a:fillRect/>
+          </a:stretch>
+        </p:blipFill>
+        <p:spPr>
+          <a:xfrm>
+            <a:off x="409575" y="1977940"/>
+            <a:ext cx="6880175" cy="2036339"/>
+          </a:xfrm>
+          <a:prstGeom prst="rect">
+            <a:avLst/>
+          </a:prstGeom>
+        </p:spPr>
+      </p:pic>
+    </p:spTree>
+    <p:extLst>
+      <p:ext uri="{BB962C8B-B14F-4D97-AF65-F5344CB8AC3E}">
+        <p14:creationId xmlns:p14="http://schemas.microsoft.com/office/powerpoint/2010/main" val="1501302412"/>
       </p:ext>
     </p:extLst>
   </p:cSld>

</xml_diff>

<commit_message>
Add Liskov content, presentation and example. Please see "Liskov" folder in code.
</commit_message>
<xml_diff>
--- a/SOLID/SOLID.pptx
+++ b/SOLID/SOLID.pptx
@@ -6,7 +6,7 @@
     <p:sldMasterId id="2147483673" r:id="rId2"/>
   </p:sldMasterIdLst>
   <p:notesMasterIdLst>
-    <p:notesMasterId r:id="rId21"/>
+    <p:notesMasterId r:id="rId24"/>
   </p:notesMasterIdLst>
   <p:sldIdLst>
     <p:sldId id="256" r:id="rId3"/>
@@ -27,42 +27,45 @@
     <p:sldId id="273" r:id="rId18"/>
     <p:sldId id="274" r:id="rId19"/>
     <p:sldId id="275" r:id="rId20"/>
+    <p:sldId id="276" r:id="rId21"/>
+    <p:sldId id="277" r:id="rId22"/>
+    <p:sldId id="278" r:id="rId23"/>
   </p:sldIdLst>
   <p:sldSz cx="9144000" cy="5143500" type="screen16x9"/>
   <p:notesSz cx="6858000" cy="9144000"/>
   <p:embeddedFontLst>
     <p:embeddedFont>
-      <p:font typeface="Calibri" panose="020F0502020204030204" pitchFamily="34" charset="0"/>
-      <p:regular r:id="rId22"/>
-      <p:bold r:id="rId23"/>
-      <p:italic r:id="rId24"/>
-      <p:boldItalic r:id="rId25"/>
+      <p:font typeface="Nunito Sans" panose="020B0604020202020204" charset="0"/>
+      <p:regular r:id="rId25"/>
+      <p:bold r:id="rId26"/>
+      <p:italic r:id="rId27"/>
+      <p:boldItalic r:id="rId28"/>
     </p:embeddedFont>
     <p:embeddedFont>
       <p:font typeface="Dosis" panose="020B0604020202020204" charset="0"/>
-      <p:regular r:id="rId26"/>
-      <p:bold r:id="rId27"/>
+      <p:regular r:id="rId29"/>
+      <p:bold r:id="rId30"/>
+    </p:embeddedFont>
+    <p:embeddedFont>
+      <p:font typeface="Calibri" panose="020F0502020204030204" pitchFamily="34" charset="0"/>
+      <p:regular r:id="rId31"/>
+      <p:bold r:id="rId32"/>
+      <p:italic r:id="rId33"/>
+      <p:boldItalic r:id="rId34"/>
     </p:embeddedFont>
     <p:embeddedFont>
       <p:font typeface="Montserrat" panose="020B0604020202020204" charset="0"/>
-      <p:regular r:id="rId28"/>
-      <p:bold r:id="rId29"/>
-      <p:italic r:id="rId30"/>
-      <p:boldItalic r:id="rId31"/>
-    </p:embeddedFont>
-    <p:embeddedFont>
-      <p:font typeface="Nunito Sans" panose="020B0604020202020204" charset="0"/>
-      <p:regular r:id="rId32"/>
-      <p:bold r:id="rId33"/>
-      <p:italic r:id="rId34"/>
-      <p:boldItalic r:id="rId35"/>
+      <p:regular r:id="rId35"/>
+      <p:bold r:id="rId36"/>
+      <p:italic r:id="rId37"/>
+      <p:boldItalic r:id="rId38"/>
     </p:embeddedFont>
     <p:embeddedFont>
       <p:font typeface="Roboto Condensed" panose="020B0604020202020204" charset="0"/>
-      <p:regular r:id="rId36"/>
-      <p:bold r:id="rId37"/>
-      <p:italic r:id="rId38"/>
-      <p:boldItalic r:id="rId39"/>
+      <p:regular r:id="rId39"/>
+      <p:bold r:id="rId40"/>
+      <p:italic r:id="rId41"/>
+      <p:boldItalic r:id="rId42"/>
     </p:embeddedFont>
   </p:embeddedFontLst>
   <p:defaultTextStyle>
@@ -507,6 +510,11 @@
         </p:txBody>
       </p:sp>
     </p:spTree>
+    <p:extLst>
+      <p:ext uri="{BB962C8B-B14F-4D97-AF65-F5344CB8AC3E}">
+        <p14:creationId xmlns:p14="http://schemas.microsoft.com/office/powerpoint/2010/main" val="429197972"/>
+      </p:ext>
+    </p:extLst>
   </p:cSld>
   <p:clrMap bg1="lt1" tx1="dk1" bg2="dk2" tx2="lt2" accent1="accent1" accent2="accent2" accent3="accent3" accent4="accent4" accent5="accent5" accent6="accent6" hlink="hlink" folHlink="folHlink"/>
   <p:notesStyle>
@@ -838,6 +846,11 @@
         </p:txBody>
       </p:sp>
     </p:spTree>
+    <p:extLst>
+      <p:ext uri="{BB962C8B-B14F-4D97-AF65-F5344CB8AC3E}">
+        <p14:creationId xmlns:p14="http://schemas.microsoft.com/office/powerpoint/2010/main" val="1930578529"/>
+      </p:ext>
+    </p:extLst>
   </p:cSld>
   <p:clrMapOvr>
     <a:masterClrMapping/>
@@ -1826,6 +1839,115 @@
 </p:notes>
 </file>
 
+<file path=ppt/notesSlides/notesSlide19.xml><?xml version="1.0" encoding="utf-8"?>
+<p:notes xmlns:a="http://schemas.openxmlformats.org/drawingml/2006/main" xmlns:r="http://schemas.openxmlformats.org/officeDocument/2006/relationships" xmlns:p="http://schemas.openxmlformats.org/presentationml/2006/main" showMasterSp="0" showMasterPhAnim="0">
+  <p:cSld>
+    <p:spTree>
+      <p:nvGrpSpPr>
+        <p:cNvPr id="1" name="Shape 107"/>
+        <p:cNvGrpSpPr/>
+        <p:nvPr/>
+      </p:nvGrpSpPr>
+      <p:grpSpPr>
+        <a:xfrm>
+          <a:off x="0" y="0"/>
+          <a:ext cx="0" cy="0"/>
+          <a:chOff x="0" y="0"/>
+          <a:chExt cx="0" cy="0"/>
+        </a:xfrm>
+      </p:grpSpPr>
+      <p:sp>
+        <p:nvSpPr>
+          <p:cNvPr id="108" name="Google Shape;108;g297a9bff03_0_66:notes"/>
+          <p:cNvSpPr>
+            <a:spLocks noGrp="1" noRot="1" noChangeAspect="1"/>
+          </p:cNvSpPr>
+          <p:nvPr>
+            <p:ph type="sldImg" idx="2"/>
+          </p:nvPr>
+        </p:nvSpPr>
+        <p:spPr>
+          <a:xfrm>
+            <a:off x="381000" y="685800"/>
+            <a:ext cx="6096000" cy="3429000"/>
+          </a:xfrm>
+          <a:custGeom>
+            <a:avLst/>
+            <a:gdLst/>
+            <a:ahLst/>
+            <a:cxnLst/>
+            <a:rect l="l" t="t" r="r" b="b"/>
+            <a:pathLst>
+              <a:path w="120000" h="120000" extrusionOk="0">
+                <a:moveTo>
+                  <a:pt x="0" y="0"/>
+                </a:moveTo>
+                <a:lnTo>
+                  <a:pt x="120000" y="0"/>
+                </a:lnTo>
+                <a:lnTo>
+                  <a:pt x="120000" y="120000"/>
+                </a:lnTo>
+                <a:lnTo>
+                  <a:pt x="0" y="120000"/>
+                </a:lnTo>
+                <a:close/>
+              </a:path>
+            </a:pathLst>
+          </a:custGeom>
+        </p:spPr>
+      </p:sp>
+      <p:sp>
+        <p:nvSpPr>
+          <p:cNvPr id="109" name="Google Shape;109;g297a9bff03_0_66:notes"/>
+          <p:cNvSpPr txBox="1">
+            <a:spLocks noGrp="1"/>
+          </p:cNvSpPr>
+          <p:nvPr>
+            <p:ph type="body" idx="1"/>
+          </p:nvPr>
+        </p:nvSpPr>
+        <p:spPr>
+          <a:xfrm>
+            <a:off x="685800" y="4343400"/>
+            <a:ext cx="5486400" cy="4114800"/>
+          </a:xfrm>
+          <a:prstGeom prst="rect">
+            <a:avLst/>
+          </a:prstGeom>
+        </p:spPr>
+        <p:txBody>
+          <a:bodyPr spcFirstLastPara="1" wrap="square" lIns="91425" tIns="91425" rIns="91425" bIns="91425" anchor="t" anchorCtr="0">
+            <a:noAutofit/>
+          </a:bodyPr>
+          <a:lstStyle/>
+          <a:p>
+            <a:pPr marL="0" lvl="0" indent="0" algn="l" rtl="0">
+              <a:spcBef>
+                <a:spcPts val="0"/>
+              </a:spcBef>
+              <a:spcAft>
+                <a:spcPts val="0"/>
+              </a:spcAft>
+              <a:buNone/>
+            </a:pPr>
+            <a:endParaRPr dirty="0"/>
+          </a:p>
+        </p:txBody>
+      </p:sp>
+    </p:spTree>
+    <p:extLst>
+      <p:ext uri="{BB962C8B-B14F-4D97-AF65-F5344CB8AC3E}">
+        <p14:creationId xmlns:p14="http://schemas.microsoft.com/office/powerpoint/2010/main" val="2216960707"/>
+      </p:ext>
+    </p:extLst>
+  </p:cSld>
+  <p:clrMapOvr>
+    <a:masterClrMapping/>
+  </p:clrMapOvr>
+</p:notes>
+</file>
+
 <file path=ppt/notesSlides/notesSlide2.xml><?xml version="1.0" encoding="utf-8"?>
 <p:notes xmlns:a="http://schemas.openxmlformats.org/drawingml/2006/main" xmlns:r="http://schemas.openxmlformats.org/officeDocument/2006/relationships" xmlns:p="http://schemas.openxmlformats.org/presentationml/2006/main" showMasterSp="0" showMasterPhAnim="0">
   <p:cSld>
@@ -1926,6 +2048,224 @@
     <p:extLst>
       <p:ext uri="{BB962C8B-B14F-4D97-AF65-F5344CB8AC3E}">
         <p14:creationId xmlns:p14="http://schemas.microsoft.com/office/powerpoint/2010/main" val="1039612539"/>
+      </p:ext>
+    </p:extLst>
+  </p:cSld>
+  <p:clrMapOvr>
+    <a:masterClrMapping/>
+  </p:clrMapOvr>
+</p:notes>
+</file>
+
+<file path=ppt/notesSlides/notesSlide20.xml><?xml version="1.0" encoding="utf-8"?>
+<p:notes xmlns:a="http://schemas.openxmlformats.org/drawingml/2006/main" xmlns:r="http://schemas.openxmlformats.org/officeDocument/2006/relationships" xmlns:p="http://schemas.openxmlformats.org/presentationml/2006/main" showMasterSp="0" showMasterPhAnim="0">
+  <p:cSld>
+    <p:spTree>
+      <p:nvGrpSpPr>
+        <p:cNvPr id="1" name="Shape 114"/>
+        <p:cNvGrpSpPr/>
+        <p:nvPr/>
+      </p:nvGrpSpPr>
+      <p:grpSpPr>
+        <a:xfrm>
+          <a:off x="0" y="0"/>
+          <a:ext cx="0" cy="0"/>
+          <a:chOff x="0" y="0"/>
+          <a:chExt cx="0" cy="0"/>
+        </a:xfrm>
+      </p:grpSpPr>
+      <p:sp>
+        <p:nvSpPr>
+          <p:cNvPr id="115" name="Google Shape;115;g297a9bff03_0_0:notes"/>
+          <p:cNvSpPr>
+            <a:spLocks noGrp="1" noRot="1" noChangeAspect="1"/>
+          </p:cNvSpPr>
+          <p:nvPr>
+            <p:ph type="sldImg" idx="2"/>
+          </p:nvPr>
+        </p:nvSpPr>
+        <p:spPr>
+          <a:xfrm>
+            <a:off x="381000" y="685800"/>
+            <a:ext cx="6096000" cy="3429000"/>
+          </a:xfrm>
+          <a:custGeom>
+            <a:avLst/>
+            <a:gdLst/>
+            <a:ahLst/>
+            <a:cxnLst/>
+            <a:rect l="l" t="t" r="r" b="b"/>
+            <a:pathLst>
+              <a:path w="120000" h="120000" extrusionOk="0">
+                <a:moveTo>
+                  <a:pt x="0" y="0"/>
+                </a:moveTo>
+                <a:lnTo>
+                  <a:pt x="120000" y="0"/>
+                </a:lnTo>
+                <a:lnTo>
+                  <a:pt x="120000" y="120000"/>
+                </a:lnTo>
+                <a:lnTo>
+                  <a:pt x="0" y="120000"/>
+                </a:lnTo>
+                <a:close/>
+              </a:path>
+            </a:pathLst>
+          </a:custGeom>
+        </p:spPr>
+      </p:sp>
+      <p:sp>
+        <p:nvSpPr>
+          <p:cNvPr id="116" name="Google Shape;116;g297a9bff03_0_0:notes"/>
+          <p:cNvSpPr txBox="1">
+            <a:spLocks noGrp="1"/>
+          </p:cNvSpPr>
+          <p:nvPr>
+            <p:ph type="body" idx="1"/>
+          </p:nvPr>
+        </p:nvSpPr>
+        <p:spPr>
+          <a:xfrm>
+            <a:off x="685800" y="4343400"/>
+            <a:ext cx="5486400" cy="4114800"/>
+          </a:xfrm>
+          <a:prstGeom prst="rect">
+            <a:avLst/>
+          </a:prstGeom>
+        </p:spPr>
+        <p:txBody>
+          <a:bodyPr spcFirstLastPara="1" wrap="square" lIns="91425" tIns="91425" rIns="91425" bIns="91425" anchor="t" anchorCtr="0">
+            <a:noAutofit/>
+          </a:bodyPr>
+          <a:lstStyle/>
+          <a:p>
+            <a:pPr marL="0" lvl="0" indent="0" algn="l" rtl="0">
+              <a:spcBef>
+                <a:spcPts val="0"/>
+              </a:spcBef>
+              <a:spcAft>
+                <a:spcPts val="0"/>
+              </a:spcAft>
+              <a:buNone/>
+            </a:pPr>
+            <a:endParaRPr/>
+          </a:p>
+        </p:txBody>
+      </p:sp>
+    </p:spTree>
+    <p:extLst>
+      <p:ext uri="{BB962C8B-B14F-4D97-AF65-F5344CB8AC3E}">
+        <p14:creationId xmlns:p14="http://schemas.microsoft.com/office/powerpoint/2010/main" val="8035450"/>
+      </p:ext>
+    </p:extLst>
+  </p:cSld>
+  <p:clrMapOvr>
+    <a:masterClrMapping/>
+  </p:clrMapOvr>
+</p:notes>
+</file>
+
+<file path=ppt/notesSlides/notesSlide21.xml><?xml version="1.0" encoding="utf-8"?>
+<p:notes xmlns:a="http://schemas.openxmlformats.org/drawingml/2006/main" xmlns:r="http://schemas.openxmlformats.org/officeDocument/2006/relationships" xmlns:p="http://schemas.openxmlformats.org/presentationml/2006/main" showMasterSp="0" showMasterPhAnim="0">
+  <p:cSld>
+    <p:spTree>
+      <p:nvGrpSpPr>
+        <p:cNvPr id="1" name="Shape 114"/>
+        <p:cNvGrpSpPr/>
+        <p:nvPr/>
+      </p:nvGrpSpPr>
+      <p:grpSpPr>
+        <a:xfrm>
+          <a:off x="0" y="0"/>
+          <a:ext cx="0" cy="0"/>
+          <a:chOff x="0" y="0"/>
+          <a:chExt cx="0" cy="0"/>
+        </a:xfrm>
+      </p:grpSpPr>
+      <p:sp>
+        <p:nvSpPr>
+          <p:cNvPr id="115" name="Google Shape;115;g297a9bff03_0_0:notes"/>
+          <p:cNvSpPr>
+            <a:spLocks noGrp="1" noRot="1" noChangeAspect="1"/>
+          </p:cNvSpPr>
+          <p:nvPr>
+            <p:ph type="sldImg" idx="2"/>
+          </p:nvPr>
+        </p:nvSpPr>
+        <p:spPr>
+          <a:xfrm>
+            <a:off x="381000" y="685800"/>
+            <a:ext cx="6096000" cy="3429000"/>
+          </a:xfrm>
+          <a:custGeom>
+            <a:avLst/>
+            <a:gdLst/>
+            <a:ahLst/>
+            <a:cxnLst/>
+            <a:rect l="l" t="t" r="r" b="b"/>
+            <a:pathLst>
+              <a:path w="120000" h="120000" extrusionOk="0">
+                <a:moveTo>
+                  <a:pt x="0" y="0"/>
+                </a:moveTo>
+                <a:lnTo>
+                  <a:pt x="120000" y="0"/>
+                </a:lnTo>
+                <a:lnTo>
+                  <a:pt x="120000" y="120000"/>
+                </a:lnTo>
+                <a:lnTo>
+                  <a:pt x="0" y="120000"/>
+                </a:lnTo>
+                <a:close/>
+              </a:path>
+            </a:pathLst>
+          </a:custGeom>
+        </p:spPr>
+      </p:sp>
+      <p:sp>
+        <p:nvSpPr>
+          <p:cNvPr id="116" name="Google Shape;116;g297a9bff03_0_0:notes"/>
+          <p:cNvSpPr txBox="1">
+            <a:spLocks noGrp="1"/>
+          </p:cNvSpPr>
+          <p:nvPr>
+            <p:ph type="body" idx="1"/>
+          </p:nvPr>
+        </p:nvSpPr>
+        <p:spPr>
+          <a:xfrm>
+            <a:off x="685800" y="4343400"/>
+            <a:ext cx="5486400" cy="4114800"/>
+          </a:xfrm>
+          <a:prstGeom prst="rect">
+            <a:avLst/>
+          </a:prstGeom>
+        </p:spPr>
+        <p:txBody>
+          <a:bodyPr spcFirstLastPara="1" wrap="square" lIns="91425" tIns="91425" rIns="91425" bIns="91425" anchor="t" anchorCtr="0">
+            <a:noAutofit/>
+          </a:bodyPr>
+          <a:lstStyle/>
+          <a:p>
+            <a:pPr marL="0" lvl="0" indent="0" algn="l" rtl="0">
+              <a:spcBef>
+                <a:spcPts val="0"/>
+              </a:spcBef>
+              <a:spcAft>
+                <a:spcPts val="0"/>
+              </a:spcAft>
+              <a:buNone/>
+            </a:pPr>
+            <a:endParaRPr/>
+          </a:p>
+        </p:txBody>
+      </p:sp>
+    </p:spTree>
+    <p:extLst>
+      <p:ext uri="{BB962C8B-B14F-4D97-AF65-F5344CB8AC3E}">
+        <p14:creationId xmlns:p14="http://schemas.microsoft.com/office/powerpoint/2010/main" val="575857150"/>
       </p:ext>
     </p:extLst>
   </p:cSld>
@@ -2141,6 +2481,11 @@
         </p:txBody>
       </p:sp>
     </p:spTree>
+    <p:extLst>
+      <p:ext uri="{BB962C8B-B14F-4D97-AF65-F5344CB8AC3E}">
+        <p14:creationId xmlns:p14="http://schemas.microsoft.com/office/powerpoint/2010/main" val="2303283748"/>
+      </p:ext>
+    </p:extLst>
   </p:cSld>
   <p:clrMapOvr>
     <a:masterClrMapping/>
@@ -2245,6 +2590,11 @@
         </p:txBody>
       </p:sp>
     </p:spTree>
+    <p:extLst>
+      <p:ext uri="{BB962C8B-B14F-4D97-AF65-F5344CB8AC3E}">
+        <p14:creationId xmlns:p14="http://schemas.microsoft.com/office/powerpoint/2010/main" val="1306578323"/>
+      </p:ext>
+    </p:extLst>
   </p:cSld>
   <p:clrMapOvr>
     <a:masterClrMapping/>
@@ -2349,6 +2699,11 @@
         </p:txBody>
       </p:sp>
     </p:spTree>
+    <p:extLst>
+      <p:ext uri="{BB962C8B-B14F-4D97-AF65-F5344CB8AC3E}">
+        <p14:creationId xmlns:p14="http://schemas.microsoft.com/office/powerpoint/2010/main" val="541253408"/>
+      </p:ext>
+    </p:extLst>
   </p:cSld>
   <p:clrMapOvr>
     <a:masterClrMapping/>
@@ -16179,7 +16534,7 @@
           <p:cNvPr id="2050" name="Picture 2" descr="Resultado de imagen para open closed principle">
             <a:extLst>
               <a:ext uri="{FF2B5EF4-FFF2-40B4-BE49-F238E27FC236}">
-                <a16:creationId xmlns:a16="http://schemas.microsoft.com/office/drawing/2014/main" id="{13ACAE3B-6BD5-48F5-970E-AF0FE6DDFA4B}"/>
+                <a16:creationId xmlns:a16="http://schemas.microsoft.com/office/drawing/2014/main" xmlns="" id="{13ACAE3B-6BD5-48F5-970E-AF0FE6DDFA4B}"/>
               </a:ext>
             </a:extLst>
           </p:cNvPr>
@@ -16419,7 +16774,7 @@
           <p:cNvPr id="2" name="Picture 1">
             <a:extLst>
               <a:ext uri="{FF2B5EF4-FFF2-40B4-BE49-F238E27FC236}">
-                <a16:creationId xmlns:a16="http://schemas.microsoft.com/office/drawing/2014/main" id="{219DEC4D-474C-4F53-935B-75240B33A462}"/>
+                <a16:creationId xmlns:a16="http://schemas.microsoft.com/office/drawing/2014/main" xmlns="" id="{219DEC4D-474C-4F53-935B-75240B33A462}"/>
               </a:ext>
             </a:extLst>
           </p:cNvPr>
@@ -16449,7 +16804,7 @@
           <p:cNvPr id="3" name="Picture 2">
             <a:extLst>
               <a:ext uri="{FF2B5EF4-FFF2-40B4-BE49-F238E27FC236}">
-                <a16:creationId xmlns:a16="http://schemas.microsoft.com/office/drawing/2014/main" id="{781A4C4F-E014-4A9C-B177-BEE6BC5C4ED7}"/>
+                <a16:creationId xmlns:a16="http://schemas.microsoft.com/office/drawing/2014/main" xmlns="" id="{781A4C4F-E014-4A9C-B177-BEE6BC5C4ED7}"/>
               </a:ext>
             </a:extLst>
           </p:cNvPr>
@@ -16672,7 +17027,7 @@
           <p:cNvPr id="4" name="Picture 3">
             <a:extLst>
               <a:ext uri="{FF2B5EF4-FFF2-40B4-BE49-F238E27FC236}">
-                <a16:creationId xmlns:a16="http://schemas.microsoft.com/office/drawing/2014/main" id="{E31152C4-61FB-4512-AE35-284ACFA30CA7}"/>
+                <a16:creationId xmlns:a16="http://schemas.microsoft.com/office/drawing/2014/main" xmlns="" id="{E31152C4-61FB-4512-AE35-284ACFA30CA7}"/>
               </a:ext>
             </a:extLst>
           </p:cNvPr>
@@ -16702,7 +17057,7 @@
           <p:cNvPr id="5" name="Arrow: Right 4">
             <a:extLst>
               <a:ext uri="{FF2B5EF4-FFF2-40B4-BE49-F238E27FC236}">
-                <a16:creationId xmlns:a16="http://schemas.microsoft.com/office/drawing/2014/main" id="{0C99756B-3B25-43AA-8217-B3DDF0F59CB9}"/>
+                <a16:creationId xmlns:a16="http://schemas.microsoft.com/office/drawing/2014/main" xmlns="" id="{0C99756B-3B25-43AA-8217-B3DDF0F59CB9}"/>
               </a:ext>
             </a:extLst>
           </p:cNvPr>
@@ -16941,7 +17296,7 @@
           <p:cNvPr id="2" name="Picture 1">
             <a:extLst>
               <a:ext uri="{FF2B5EF4-FFF2-40B4-BE49-F238E27FC236}">
-                <a16:creationId xmlns:a16="http://schemas.microsoft.com/office/drawing/2014/main" id="{6D7C6010-5806-430A-B09E-714898F8CFC6}"/>
+                <a16:creationId xmlns:a16="http://schemas.microsoft.com/office/drawing/2014/main" xmlns="" id="{6D7C6010-5806-430A-B09E-714898F8CFC6}"/>
               </a:ext>
             </a:extLst>
           </p:cNvPr>
@@ -17164,7 +17519,7 @@
           <p:cNvPr id="3" name="Picture 2">
             <a:extLst>
               <a:ext uri="{FF2B5EF4-FFF2-40B4-BE49-F238E27FC236}">
-                <a16:creationId xmlns:a16="http://schemas.microsoft.com/office/drawing/2014/main" id="{7551C84C-AA9C-4A4E-A47E-DBAD1F9B0B3F}"/>
+                <a16:creationId xmlns:a16="http://schemas.microsoft.com/office/drawing/2014/main" xmlns="" id="{7551C84C-AA9C-4A4E-A47E-DBAD1F9B0B3F}"/>
               </a:ext>
             </a:extLst>
           </p:cNvPr>
@@ -17272,7 +17627,7 @@
           <p:cNvPr id="6146" name="Picture 2" descr="Imagen relacionada">
             <a:extLst>
               <a:ext uri="{FF2B5EF4-FFF2-40B4-BE49-F238E27FC236}">
-                <a16:creationId xmlns:a16="http://schemas.microsoft.com/office/drawing/2014/main" id="{777E849F-6876-47B5-ABBC-0397DE771949}"/>
+                <a16:creationId xmlns:a16="http://schemas.microsoft.com/office/drawing/2014/main" xmlns="" id="{777E849F-6876-47B5-ABBC-0397DE771949}"/>
               </a:ext>
             </a:extLst>
           </p:cNvPr>
@@ -17317,7 +17672,7 @@
           <p:cNvPr id="6150" name="Picture 6" descr="Resultado de imagen para it's time to coding">
             <a:extLst>
               <a:ext uri="{FF2B5EF4-FFF2-40B4-BE49-F238E27FC236}">
-                <a16:creationId xmlns:a16="http://schemas.microsoft.com/office/drawing/2014/main" id="{088ABA9C-A941-4D21-8A34-792B69D771FF}"/>
+                <a16:creationId xmlns:a16="http://schemas.microsoft.com/office/drawing/2014/main" xmlns="" id="{088ABA9C-A941-4D21-8A34-792B69D771FF}"/>
               </a:ext>
             </a:extLst>
           </p:cNvPr>
@@ -17364,7 +17719,7 @@
           <p:cNvPr id="6152" name="Picture 8" descr="Imagen relacionada">
             <a:extLst>
               <a:ext uri="{FF2B5EF4-FFF2-40B4-BE49-F238E27FC236}">
-                <a16:creationId xmlns:a16="http://schemas.microsoft.com/office/drawing/2014/main" id="{2B0D04E6-BDAE-4D42-B3B0-CE0DE19748C6}"/>
+                <a16:creationId xmlns:a16="http://schemas.microsoft.com/office/drawing/2014/main" xmlns="" id="{2B0D04E6-BDAE-4D42-B3B0-CE0DE19748C6}"/>
               </a:ext>
             </a:extLst>
           </p:cNvPr>
@@ -17411,7 +17766,7 @@
           <p:cNvPr id="8" name="Google Shape;119;p28">
             <a:extLst>
               <a:ext uri="{FF2B5EF4-FFF2-40B4-BE49-F238E27FC236}">
-                <a16:creationId xmlns:a16="http://schemas.microsoft.com/office/drawing/2014/main" id="{10097979-2EAB-4D16-BB1B-760958684724}"/>
+                <a16:creationId xmlns:a16="http://schemas.microsoft.com/office/drawing/2014/main" xmlns="" id="{10097979-2EAB-4D16-BB1B-760958684724}"/>
               </a:ext>
             </a:extLst>
           </p:cNvPr>
@@ -17626,7 +17981,7 @@
           <p:cNvPr id="8" name="Google Shape;119;p28">
             <a:extLst>
               <a:ext uri="{FF2B5EF4-FFF2-40B4-BE49-F238E27FC236}">
-                <a16:creationId xmlns:a16="http://schemas.microsoft.com/office/drawing/2014/main" id="{10097979-2EAB-4D16-BB1B-760958684724}"/>
+                <a16:creationId xmlns:a16="http://schemas.microsoft.com/office/drawing/2014/main" xmlns="" id="{10097979-2EAB-4D16-BB1B-760958684724}"/>
               </a:ext>
             </a:extLst>
           </p:cNvPr>
@@ -17709,7 +18064,7 @@
           <p:cNvPr id="4" name="Picture 3" descr="A close up of a antenna&#10;&#10;Description automatically generated">
             <a:extLst>
               <a:ext uri="{FF2B5EF4-FFF2-40B4-BE49-F238E27FC236}">
-                <a16:creationId xmlns:a16="http://schemas.microsoft.com/office/drawing/2014/main" id="{8930167D-05D4-4036-B108-E66D374AF90C}"/>
+                <a16:creationId xmlns:a16="http://schemas.microsoft.com/office/drawing/2014/main" xmlns="" id="{8930167D-05D4-4036-B108-E66D374AF90C}"/>
               </a:ext>
             </a:extLst>
           </p:cNvPr>
@@ -17739,7 +18094,7 @@
           <p:cNvPr id="10" name="Google Shape;118;p28">
             <a:extLst>
               <a:ext uri="{FF2B5EF4-FFF2-40B4-BE49-F238E27FC236}">
-                <a16:creationId xmlns:a16="http://schemas.microsoft.com/office/drawing/2014/main" id="{97AED5D8-366C-458A-A931-C3DD1F88998C}"/>
+                <a16:creationId xmlns:a16="http://schemas.microsoft.com/office/drawing/2014/main" xmlns="" id="{97AED5D8-366C-458A-A931-C3DD1F88998C}"/>
               </a:ext>
             </a:extLst>
           </p:cNvPr>
@@ -17871,7 +18226,7 @@
           <p:cNvPr id="8" name="Google Shape;119;p28">
             <a:extLst>
               <a:ext uri="{FF2B5EF4-FFF2-40B4-BE49-F238E27FC236}">
-                <a16:creationId xmlns:a16="http://schemas.microsoft.com/office/drawing/2014/main" id="{10097979-2EAB-4D16-BB1B-760958684724}"/>
+                <a16:creationId xmlns:a16="http://schemas.microsoft.com/office/drawing/2014/main" xmlns="" id="{10097979-2EAB-4D16-BB1B-760958684724}"/>
               </a:ext>
             </a:extLst>
           </p:cNvPr>
@@ -17954,7 +18309,7 @@
           <p:cNvPr id="4" name="Picture 3" descr="A close up of a antenna&#10;&#10;Description automatically generated">
             <a:extLst>
               <a:ext uri="{FF2B5EF4-FFF2-40B4-BE49-F238E27FC236}">
-                <a16:creationId xmlns:a16="http://schemas.microsoft.com/office/drawing/2014/main" id="{8930167D-05D4-4036-B108-E66D374AF90C}"/>
+                <a16:creationId xmlns:a16="http://schemas.microsoft.com/office/drawing/2014/main" xmlns="" id="{8930167D-05D4-4036-B108-E66D374AF90C}"/>
               </a:ext>
             </a:extLst>
           </p:cNvPr>
@@ -17984,7 +18339,7 @@
           <p:cNvPr id="10" name="Google Shape;118;p28">
             <a:extLst>
               <a:ext uri="{FF2B5EF4-FFF2-40B4-BE49-F238E27FC236}">
-                <a16:creationId xmlns:a16="http://schemas.microsoft.com/office/drawing/2014/main" id="{97AED5D8-366C-458A-A931-C3DD1F88998C}"/>
+                <a16:creationId xmlns:a16="http://schemas.microsoft.com/office/drawing/2014/main" xmlns="" id="{97AED5D8-366C-458A-A931-C3DD1F88998C}"/>
               </a:ext>
             </a:extLst>
           </p:cNvPr>
@@ -18038,7 +18393,7 @@
           <p:cNvPr id="12" name="Google Shape;118;p28">
             <a:extLst>
               <a:ext uri="{FF2B5EF4-FFF2-40B4-BE49-F238E27FC236}">
-                <a16:creationId xmlns:a16="http://schemas.microsoft.com/office/drawing/2014/main" id="{98731A4F-9B69-46CC-B1A8-F83717DDD68C}"/>
+                <a16:creationId xmlns:a16="http://schemas.microsoft.com/office/drawing/2014/main" xmlns="" id="{98731A4F-9B69-46CC-B1A8-F83717DDD68C}"/>
               </a:ext>
             </a:extLst>
           </p:cNvPr>
@@ -18092,7 +18447,7 @@
           <p:cNvPr id="15" name="Google Shape;118;p28">
             <a:extLst>
               <a:ext uri="{FF2B5EF4-FFF2-40B4-BE49-F238E27FC236}">
-                <a16:creationId xmlns:a16="http://schemas.microsoft.com/office/drawing/2014/main" id="{DAEBD1F0-2432-45D9-BF41-18AF63607761}"/>
+                <a16:creationId xmlns:a16="http://schemas.microsoft.com/office/drawing/2014/main" xmlns="" id="{DAEBD1F0-2432-45D9-BF41-18AF63607761}"/>
               </a:ext>
             </a:extLst>
           </p:cNvPr>
@@ -18175,7 +18530,7 @@
           <p:cNvPr id="1026" name="Picture 2" descr="Image result for emoji thinking">
             <a:extLst>
               <a:ext uri="{FF2B5EF4-FFF2-40B4-BE49-F238E27FC236}">
-                <a16:creationId xmlns:a16="http://schemas.microsoft.com/office/drawing/2014/main" id="{0858F406-86E5-4057-8514-1C10DD75D314}"/>
+                <a16:creationId xmlns:a16="http://schemas.microsoft.com/office/drawing/2014/main" xmlns="" id="{0858F406-86E5-4057-8514-1C10DD75D314}"/>
               </a:ext>
             </a:extLst>
           </p:cNvPr>
@@ -18222,7 +18577,7 @@
           <p:cNvPr id="17" name="Picture 16" descr="A close up of a antenna&#10;&#10;Description automatically generated">
             <a:extLst>
               <a:ext uri="{FF2B5EF4-FFF2-40B4-BE49-F238E27FC236}">
-                <a16:creationId xmlns:a16="http://schemas.microsoft.com/office/drawing/2014/main" id="{7B3A953D-9F37-4000-AD70-7E10FF810530}"/>
+                <a16:creationId xmlns:a16="http://schemas.microsoft.com/office/drawing/2014/main" xmlns="" id="{7B3A953D-9F37-4000-AD70-7E10FF810530}"/>
               </a:ext>
             </a:extLst>
           </p:cNvPr>
@@ -18330,7 +18685,7 @@
           <p:cNvPr id="8" name="Google Shape;119;p28">
             <a:extLst>
               <a:ext uri="{FF2B5EF4-FFF2-40B4-BE49-F238E27FC236}">
-                <a16:creationId xmlns:a16="http://schemas.microsoft.com/office/drawing/2014/main" id="{10097979-2EAB-4D16-BB1B-760958684724}"/>
+                <a16:creationId xmlns:a16="http://schemas.microsoft.com/office/drawing/2014/main" xmlns="" id="{10097979-2EAB-4D16-BB1B-760958684724}"/>
               </a:ext>
             </a:extLst>
           </p:cNvPr>
@@ -18413,7 +18768,7 @@
           <p:cNvPr id="12" name="Google Shape;118;p28">
             <a:extLst>
               <a:ext uri="{FF2B5EF4-FFF2-40B4-BE49-F238E27FC236}">
-                <a16:creationId xmlns:a16="http://schemas.microsoft.com/office/drawing/2014/main" id="{98731A4F-9B69-46CC-B1A8-F83717DDD68C}"/>
+                <a16:creationId xmlns:a16="http://schemas.microsoft.com/office/drawing/2014/main" xmlns="" id="{98731A4F-9B69-46CC-B1A8-F83717DDD68C}"/>
               </a:ext>
             </a:extLst>
           </p:cNvPr>
@@ -18467,7 +18822,7 @@
           <p:cNvPr id="15" name="Google Shape;118;p28">
             <a:extLst>
               <a:ext uri="{FF2B5EF4-FFF2-40B4-BE49-F238E27FC236}">
-                <a16:creationId xmlns:a16="http://schemas.microsoft.com/office/drawing/2014/main" id="{DAEBD1F0-2432-45D9-BF41-18AF63607761}"/>
+                <a16:creationId xmlns:a16="http://schemas.microsoft.com/office/drawing/2014/main" xmlns="" id="{DAEBD1F0-2432-45D9-BF41-18AF63607761}"/>
               </a:ext>
             </a:extLst>
           </p:cNvPr>
@@ -18515,7 +18870,7 @@
           <p:cNvPr id="1026" name="Picture 2" descr="Image result for emoji thinking">
             <a:extLst>
               <a:ext uri="{FF2B5EF4-FFF2-40B4-BE49-F238E27FC236}">
-                <a16:creationId xmlns:a16="http://schemas.microsoft.com/office/drawing/2014/main" id="{0858F406-86E5-4057-8514-1C10DD75D314}"/>
+                <a16:creationId xmlns:a16="http://schemas.microsoft.com/office/drawing/2014/main" xmlns="" id="{0858F406-86E5-4057-8514-1C10DD75D314}"/>
               </a:ext>
             </a:extLst>
           </p:cNvPr>
@@ -18562,7 +18917,7 @@
           <p:cNvPr id="3" name="Picture 2">
             <a:extLst>
               <a:ext uri="{FF2B5EF4-FFF2-40B4-BE49-F238E27FC236}">
-                <a16:creationId xmlns:a16="http://schemas.microsoft.com/office/drawing/2014/main" id="{2E71AEE3-5FF2-42A9-B796-07E7C660803A}"/>
+                <a16:creationId xmlns:a16="http://schemas.microsoft.com/office/drawing/2014/main" xmlns="" id="{2E71AEE3-5FF2-42A9-B796-07E7C660803A}"/>
               </a:ext>
             </a:extLst>
           </p:cNvPr>
@@ -18591,6 +18946,174 @@
     <p:extLst>
       <p:ext uri="{BB962C8B-B14F-4D97-AF65-F5344CB8AC3E}">
         <p14:creationId xmlns:p14="http://schemas.microsoft.com/office/powerpoint/2010/main" val="1501302412"/>
+      </p:ext>
+    </p:extLst>
+  </p:cSld>
+  <p:clrMapOvr>
+    <a:masterClrMapping/>
+  </p:clrMapOvr>
+</p:sld>
+</file>
+
+<file path=ppt/slides/slide19.xml><?xml version="1.0" encoding="utf-8"?>
+<p:sld xmlns:a="http://schemas.openxmlformats.org/drawingml/2006/main" xmlns:r="http://schemas.openxmlformats.org/officeDocument/2006/relationships" xmlns:p="http://schemas.openxmlformats.org/presentationml/2006/main">
+  <p:cSld>
+    <p:spTree>
+      <p:nvGrpSpPr>
+        <p:cNvPr id="1" name="Shape 110"/>
+        <p:cNvGrpSpPr/>
+        <p:nvPr/>
+      </p:nvGrpSpPr>
+      <p:grpSpPr>
+        <a:xfrm>
+          <a:off x="0" y="0"/>
+          <a:ext cx="0" cy="0"/>
+          <a:chOff x="0" y="0"/>
+          <a:chExt cx="0" cy="0"/>
+        </a:xfrm>
+      </p:grpSpPr>
+      <p:pic>
+        <p:nvPicPr>
+          <p:cNvPr id="111" name="Google Shape;111;p27"/>
+          <p:cNvPicPr preferRelativeResize="0"/>
+          <p:nvPr/>
+        </p:nvPicPr>
+        <p:blipFill>
+          <a:blip r:embed="rId3">
+            <a:alphaModFix/>
+          </a:blip>
+          <a:stretch>
+            <a:fillRect/>
+          </a:stretch>
+        </p:blipFill>
+        <p:spPr>
+          <a:xfrm>
+            <a:off x="0" y="0"/>
+            <a:ext cx="9144000" cy="5143505"/>
+          </a:xfrm>
+          <a:prstGeom prst="rect">
+            <a:avLst/>
+          </a:prstGeom>
+          <a:noFill/>
+          <a:ln>
+            <a:noFill/>
+          </a:ln>
+        </p:spPr>
+      </p:pic>
+      <p:sp>
+        <p:nvSpPr>
+          <p:cNvPr id="113" name="Google Shape;113;p27"/>
+          <p:cNvSpPr txBox="1"/>
+          <p:nvPr/>
+        </p:nvSpPr>
+        <p:spPr>
+          <a:xfrm>
+            <a:off x="281506" y="1251900"/>
+            <a:ext cx="8580987" cy="2639700"/>
+          </a:xfrm>
+          <a:prstGeom prst="rect">
+            <a:avLst/>
+          </a:prstGeom>
+          <a:noFill/>
+          <a:ln>
+            <a:noFill/>
+          </a:ln>
+        </p:spPr>
+        <p:txBody>
+          <a:bodyPr spcFirstLastPara="1" wrap="square" lIns="91425" tIns="91425" rIns="91425" bIns="91425" anchor="t" anchorCtr="0">
+            <a:noAutofit/>
+          </a:bodyPr>
+          <a:lstStyle/>
+          <a:p>
+            <a:pPr marL="0" lvl="0" indent="0" algn="r" rtl="0">
+              <a:spcBef>
+                <a:spcPts val="0"/>
+              </a:spcBef>
+              <a:spcAft>
+                <a:spcPts val="0"/>
+              </a:spcAft>
+              <a:buNone/>
+            </a:pPr>
+            <a:endParaRPr lang="en-US" sz="1600" i="1" dirty="0">
+              <a:solidFill>
+                <a:srgbClr val="FFFFFF"/>
+              </a:solidFill>
+              <a:latin typeface="Montserrat"/>
+              <a:ea typeface="Montserrat"/>
+              <a:cs typeface="Montserrat"/>
+              <a:sym typeface="Montserrat"/>
+            </a:endParaRPr>
+          </a:p>
+          <a:p>
+            <a:pPr marL="0" lvl="0" indent="0" algn="r" rtl="0">
+              <a:spcBef>
+                <a:spcPts val="0"/>
+              </a:spcBef>
+              <a:spcAft>
+                <a:spcPts val="0"/>
+              </a:spcAft>
+              <a:buNone/>
+            </a:pPr>
+            <a:endParaRPr lang="en-US" sz="2400" dirty="0">
+              <a:solidFill>
+                <a:srgbClr val="FFFFFF"/>
+              </a:solidFill>
+              <a:latin typeface="Nunito Sans"/>
+              <a:ea typeface="Nunito Sans"/>
+              <a:cs typeface="Nunito Sans"/>
+              <a:sym typeface="Nunito Sans"/>
+            </a:endParaRPr>
+          </a:p>
+          <a:p>
+            <a:pPr marL="0" lvl="0" indent="0" algn="r" rtl="0">
+              <a:spcBef>
+                <a:spcPts val="0"/>
+              </a:spcBef>
+              <a:spcAft>
+                <a:spcPts val="0"/>
+              </a:spcAft>
+              <a:buNone/>
+            </a:pPr>
+            <a:r>
+              <a:rPr lang="en-US" sz="3400" dirty="0" err="1" smtClean="0">
+                <a:solidFill>
+                  <a:srgbClr val="96B51A"/>
+                </a:solidFill>
+                <a:latin typeface="Droid Sans"/>
+                <a:ea typeface="Droid Sans"/>
+                <a:cs typeface="Droid Sans"/>
+                <a:sym typeface="Droid Sans"/>
+              </a:rPr>
+              <a:t>Liskov</a:t>
+            </a:r>
+            <a:r>
+              <a:rPr lang="en-US" sz="3400" dirty="0" smtClean="0">
+                <a:solidFill>
+                  <a:srgbClr val="96B51A"/>
+                </a:solidFill>
+                <a:latin typeface="Droid Sans"/>
+                <a:ea typeface="Droid Sans"/>
+                <a:cs typeface="Droid Sans"/>
+                <a:sym typeface="Droid Sans"/>
+              </a:rPr>
+              <a:t> Substitution Principle</a:t>
+            </a:r>
+            <a:endParaRPr lang="en-US" sz="3400" dirty="0">
+              <a:solidFill>
+                <a:srgbClr val="96B51A"/>
+              </a:solidFill>
+              <a:latin typeface="Droid Sans"/>
+              <a:ea typeface="Droid Sans"/>
+              <a:cs typeface="Droid Sans"/>
+              <a:sym typeface="Droid Sans"/>
+            </a:endParaRPr>
+          </a:p>
+        </p:txBody>
+      </p:sp>
+    </p:spTree>
+    <p:extLst>
+      <p:ext uri="{BB962C8B-B14F-4D97-AF65-F5344CB8AC3E}">
+        <p14:creationId xmlns:p14="http://schemas.microsoft.com/office/powerpoint/2010/main" val="4111395701"/>
       </p:ext>
     </p:extLst>
   </p:cSld>
@@ -18720,7 +19243,7 @@
           <p:cNvPr id="4" name="Google Shape;122;p28">
             <a:extLst>
               <a:ext uri="{FF2B5EF4-FFF2-40B4-BE49-F238E27FC236}">
-                <a16:creationId xmlns:a16="http://schemas.microsoft.com/office/drawing/2014/main" id="{56C16417-71B1-4ADB-831A-8E0578F44DC5}"/>
+                <a16:creationId xmlns:a16="http://schemas.microsoft.com/office/drawing/2014/main" xmlns="" id="{56C16417-71B1-4ADB-831A-8E0578F44DC5}"/>
               </a:ext>
             </a:extLst>
           </p:cNvPr>
@@ -18754,7 +19277,7 @@
           <p:cNvPr id="5" name="Google Shape;123;p28">
             <a:extLst>
               <a:ext uri="{FF2B5EF4-FFF2-40B4-BE49-F238E27FC236}">
-                <a16:creationId xmlns:a16="http://schemas.microsoft.com/office/drawing/2014/main" id="{C1E7D2B6-FD28-462A-91F0-E5F8650EF0DD}"/>
+                <a16:creationId xmlns:a16="http://schemas.microsoft.com/office/drawing/2014/main" xmlns="" id="{C1E7D2B6-FD28-462A-91F0-E5F8650EF0DD}"/>
               </a:ext>
             </a:extLst>
           </p:cNvPr>
@@ -18817,6 +19340,1475 @@
     <p:extLst>
       <p:ext uri="{BB962C8B-B14F-4D97-AF65-F5344CB8AC3E}">
         <p14:creationId xmlns:p14="http://schemas.microsoft.com/office/powerpoint/2010/main" val="1876852938"/>
+      </p:ext>
+    </p:extLst>
+  </p:cSld>
+  <p:clrMapOvr>
+    <a:masterClrMapping/>
+  </p:clrMapOvr>
+</p:sld>
+</file>
+
+<file path=ppt/slides/slide20.xml><?xml version="1.0" encoding="utf-8"?>
+<p:sld xmlns:a="http://schemas.openxmlformats.org/drawingml/2006/main" xmlns:r="http://schemas.openxmlformats.org/officeDocument/2006/relationships" xmlns:p="http://schemas.openxmlformats.org/presentationml/2006/main">
+  <p:cSld>
+    <p:bg>
+      <p:bgPr>
+        <a:solidFill>
+          <a:schemeClr val="tx1"/>
+        </a:solidFill>
+        <a:effectLst/>
+      </p:bgPr>
+    </p:bg>
+    <p:spTree>
+      <p:nvGrpSpPr>
+        <p:cNvPr id="1" name="Shape 117"/>
+        <p:cNvGrpSpPr/>
+        <p:nvPr/>
+      </p:nvGrpSpPr>
+      <p:grpSpPr>
+        <a:xfrm>
+          <a:off x="0" y="0"/>
+          <a:ext cx="0" cy="0"/>
+          <a:chOff x="0" y="0"/>
+          <a:chExt cx="0" cy="0"/>
+        </a:xfrm>
+      </p:grpSpPr>
+      <p:sp>
+        <p:nvSpPr>
+          <p:cNvPr id="120" name="Google Shape;120;p28"/>
+          <p:cNvSpPr/>
+          <p:nvPr/>
+        </p:nvSpPr>
+        <p:spPr>
+          <a:xfrm>
+            <a:off x="-5" y="5118630"/>
+            <a:ext cx="9144000" cy="33600"/>
+          </a:xfrm>
+          <a:prstGeom prst="rect">
+            <a:avLst/>
+          </a:prstGeom>
+          <a:solidFill>
+            <a:srgbClr val="C1D82F"/>
+          </a:solidFill>
+          <a:ln>
+            <a:noFill/>
+          </a:ln>
+        </p:spPr>
+        <p:txBody>
+          <a:bodyPr spcFirstLastPara="1" wrap="square" lIns="91425" tIns="91425" rIns="91425" bIns="91425" anchor="ctr" anchorCtr="0">
+            <a:noAutofit/>
+          </a:bodyPr>
+          <a:lstStyle/>
+          <a:p>
+            <a:pPr marL="0" lvl="0" indent="0" algn="l" rtl="0">
+              <a:spcBef>
+                <a:spcPts val="0"/>
+              </a:spcBef>
+              <a:spcAft>
+                <a:spcPts val="0"/>
+              </a:spcAft>
+              <a:buNone/>
+            </a:pPr>
+            <a:endParaRPr/>
+          </a:p>
+        </p:txBody>
+      </p:sp>
+      <p:sp>
+        <p:nvSpPr>
+          <p:cNvPr id="8" name="Google Shape;119;p28">
+            <a:extLst>
+              <a:ext uri="{FF2B5EF4-FFF2-40B4-BE49-F238E27FC236}">
+                <a16:creationId xmlns:a16="http://schemas.microsoft.com/office/drawing/2014/main" xmlns="" id="{10097979-2EAB-4D16-BB1B-760958684724}"/>
+              </a:ext>
+            </a:extLst>
+          </p:cNvPr>
+          <p:cNvSpPr txBox="1"/>
+          <p:nvPr/>
+        </p:nvSpPr>
+        <p:spPr>
+          <a:xfrm>
+            <a:off x="-4" y="78241"/>
+            <a:ext cx="9144004" cy="661278"/>
+          </a:xfrm>
+          <a:prstGeom prst="rect">
+            <a:avLst/>
+          </a:prstGeom>
+          <a:noFill/>
+          <a:ln>
+            <a:noFill/>
+          </a:ln>
+        </p:spPr>
+        <p:txBody>
+          <a:bodyPr spcFirstLastPara="1" wrap="square" lIns="91425" tIns="91425" rIns="91425" bIns="91425" anchor="t" anchorCtr="0">
+            <a:noAutofit/>
+          </a:bodyPr>
+          <a:lstStyle/>
+          <a:p>
+            <a:pPr marL="0" lvl="0" indent="0" algn="ctr" rtl="0">
+              <a:spcBef>
+                <a:spcPts val="0"/>
+              </a:spcBef>
+              <a:spcAft>
+                <a:spcPts val="0"/>
+              </a:spcAft>
+              <a:buClr>
+                <a:schemeClr val="dk1"/>
+              </a:buClr>
+              <a:buSzPts val="1100"/>
+              <a:buFont typeface="Arial"/>
+              <a:buNone/>
+            </a:pPr>
+            <a:r>
+              <a:rPr lang="es-CO" sz="3200" b="1" dirty="0" err="1" smtClean="0">
+                <a:solidFill>
+                  <a:schemeClr val="lt1"/>
+                </a:solidFill>
+                <a:effectLst>
+                  <a:outerShdw blurRad="38100" dist="38100" dir="2700000" algn="tl">
+                    <a:srgbClr val="000000">
+                      <a:alpha val="43137"/>
+                    </a:srgbClr>
+                  </a:outerShdw>
+                </a:effectLst>
+                <a:latin typeface="Montserrat"/>
+                <a:ea typeface="Montserrat"/>
+                <a:cs typeface="Montserrat"/>
+                <a:sym typeface="Montserrat"/>
+              </a:rPr>
+              <a:t>What</a:t>
+            </a:r>
+            <a:r>
+              <a:rPr lang="es-CO" sz="3200" b="1" dirty="0" smtClean="0">
+                <a:solidFill>
+                  <a:schemeClr val="lt1"/>
+                </a:solidFill>
+                <a:effectLst>
+                  <a:outerShdw blurRad="38100" dist="38100" dir="2700000" algn="tl">
+                    <a:srgbClr val="000000">
+                      <a:alpha val="43137"/>
+                    </a:srgbClr>
+                  </a:outerShdw>
+                </a:effectLst>
+                <a:latin typeface="Montserrat"/>
+                <a:ea typeface="Montserrat"/>
+                <a:cs typeface="Montserrat"/>
+                <a:sym typeface="Montserrat"/>
+              </a:rPr>
+              <a:t> </a:t>
+            </a:r>
+            <a:r>
+              <a:rPr lang="es-CO" sz="3200" b="1" dirty="0" err="1" smtClean="0">
+                <a:solidFill>
+                  <a:schemeClr val="lt1"/>
+                </a:solidFill>
+                <a:effectLst>
+                  <a:outerShdw blurRad="38100" dist="38100" dir="2700000" algn="tl">
+                    <a:srgbClr val="000000">
+                      <a:alpha val="43137"/>
+                    </a:srgbClr>
+                  </a:outerShdw>
+                </a:effectLst>
+                <a:latin typeface="Montserrat"/>
+                <a:ea typeface="Montserrat"/>
+                <a:cs typeface="Montserrat"/>
+                <a:sym typeface="Montserrat"/>
+              </a:rPr>
+              <a:t>is</a:t>
+            </a:r>
+            <a:r>
+              <a:rPr lang="es-CO" sz="3200" b="1" dirty="0" smtClean="0">
+                <a:solidFill>
+                  <a:schemeClr val="lt1"/>
+                </a:solidFill>
+                <a:effectLst>
+                  <a:outerShdw blurRad="38100" dist="38100" dir="2700000" algn="tl">
+                    <a:srgbClr val="000000">
+                      <a:alpha val="43137"/>
+                    </a:srgbClr>
+                  </a:outerShdw>
+                </a:effectLst>
+                <a:latin typeface="Montserrat"/>
+                <a:ea typeface="Montserrat"/>
+                <a:cs typeface="Montserrat"/>
+                <a:sym typeface="Montserrat"/>
+              </a:rPr>
+              <a:t> LSP?</a:t>
+            </a:r>
+            <a:endParaRPr lang="en-US" sz="2000" b="1" dirty="0">
+              <a:solidFill>
+                <a:srgbClr val="C1D82F"/>
+              </a:solidFill>
+              <a:effectLst>
+                <a:outerShdw blurRad="38100" dist="38100" dir="2700000" algn="tl">
+                  <a:srgbClr val="000000">
+                    <a:alpha val="43137"/>
+                  </a:srgbClr>
+                </a:outerShdw>
+              </a:effectLst>
+              <a:latin typeface="Montserrat"/>
+              <a:ea typeface="Montserrat"/>
+              <a:cs typeface="Montserrat"/>
+              <a:sym typeface="Montserrat"/>
+            </a:endParaRPr>
+          </a:p>
+        </p:txBody>
+      </p:sp>
+      <p:sp>
+        <p:nvSpPr>
+          <p:cNvPr id="10" name="Google Shape;118;p28">
+            <a:extLst>
+              <a:ext uri="{FF2B5EF4-FFF2-40B4-BE49-F238E27FC236}">
+                <a16:creationId xmlns:a16="http://schemas.microsoft.com/office/drawing/2014/main" xmlns="" id="{97AED5D8-366C-458A-A931-C3DD1F88998C}"/>
+              </a:ext>
+            </a:extLst>
+          </p:cNvPr>
+          <p:cNvSpPr txBox="1"/>
+          <p:nvPr/>
+        </p:nvSpPr>
+        <p:spPr>
+          <a:xfrm>
+            <a:off x="226337" y="1186103"/>
+            <a:ext cx="4543427" cy="594325"/>
+          </a:xfrm>
+          <a:prstGeom prst="rect">
+            <a:avLst/>
+          </a:prstGeom>
+          <a:noFill/>
+          <a:ln>
+            <a:noFill/>
+          </a:ln>
+        </p:spPr>
+        <p:txBody>
+          <a:bodyPr spcFirstLastPara="1" wrap="square" lIns="91425" tIns="91425" rIns="91425" bIns="91425" anchor="t" anchorCtr="0">
+            <a:noAutofit/>
+          </a:bodyPr>
+          <a:lstStyle/>
+          <a:p>
+            <a:pPr marL="146050" lvl="0" algn="just">
+              <a:buClr>
+                <a:srgbClr val="FFFFFF"/>
+              </a:buClr>
+              <a:buSzPts val="1300"/>
+            </a:pPr>
+            <a:r>
+              <a:rPr lang="en-US" b="1" dirty="0" smtClean="0">
+                <a:solidFill>
+                  <a:schemeClr val="bg1"/>
+                </a:solidFill>
+              </a:rPr>
+              <a:t>Named for Barbara </a:t>
+            </a:r>
+            <a:r>
+              <a:rPr lang="en-US" b="1" dirty="0" err="1" smtClean="0">
+                <a:solidFill>
+                  <a:schemeClr val="bg1"/>
+                </a:solidFill>
+              </a:rPr>
+              <a:t>Liskov</a:t>
+            </a:r>
+            <a:r>
+              <a:rPr lang="en-US" b="1" dirty="0" smtClean="0">
+                <a:solidFill>
+                  <a:schemeClr val="bg1"/>
+                </a:solidFill>
+              </a:rPr>
+              <a:t>, who first described the principle in 1988.</a:t>
+            </a:r>
+          </a:p>
+          <a:p>
+            <a:pPr marL="146050" lvl="0" algn="just">
+              <a:buClr>
+                <a:srgbClr val="FFFFFF"/>
+              </a:buClr>
+              <a:buSzPts val="1300"/>
+            </a:pPr>
+            <a:endParaRPr lang="es-CO" sz="900" b="1" dirty="0">
+              <a:solidFill>
+                <a:schemeClr val="bg1"/>
+              </a:solidFill>
+              <a:sym typeface="Nunito Sans"/>
+            </a:endParaRPr>
+          </a:p>
+          <a:p>
+            <a:pPr marL="146050" lvl="0" algn="just">
+              <a:buClr>
+                <a:srgbClr val="FFFFFF"/>
+              </a:buClr>
+              <a:buSzPts val="1300"/>
+            </a:pPr>
+            <a:endParaRPr lang="es-CO" sz="900" b="1" dirty="0" smtClean="0">
+              <a:solidFill>
+                <a:schemeClr val="bg1"/>
+              </a:solidFill>
+              <a:sym typeface="Nunito Sans"/>
+            </a:endParaRPr>
+          </a:p>
+          <a:p>
+            <a:pPr marL="146050" lvl="0" algn="just">
+              <a:buClr>
+                <a:srgbClr val="FFFFFF"/>
+              </a:buClr>
+              <a:buSzPts val="1300"/>
+            </a:pPr>
+            <a:endParaRPr lang="es-CO" sz="2400" b="1" i="1" dirty="0" smtClean="0">
+              <a:solidFill>
+                <a:schemeClr val="bg1"/>
+              </a:solidFill>
+              <a:sym typeface="Nunito Sans"/>
+            </a:endParaRPr>
+          </a:p>
+          <a:p>
+            <a:pPr marL="146050" lvl="0" algn="just">
+              <a:buClr>
+                <a:srgbClr val="FFFFFF"/>
+              </a:buClr>
+              <a:buSzPts val="1300"/>
+            </a:pPr>
+            <a:endParaRPr lang="es-CO" sz="2400" b="1" i="1" dirty="0">
+              <a:solidFill>
+                <a:schemeClr val="bg1"/>
+              </a:solidFill>
+              <a:sym typeface="Nunito Sans"/>
+            </a:endParaRPr>
+          </a:p>
+          <a:p>
+            <a:pPr marL="146050" lvl="0" algn="just">
+              <a:buClr>
+                <a:srgbClr val="FFFFFF"/>
+              </a:buClr>
+              <a:buSzPts val="1300"/>
+            </a:pPr>
+            <a:r>
+              <a:rPr lang="es-CO" sz="2400" b="1" i="1" dirty="0" smtClean="0">
+                <a:solidFill>
+                  <a:schemeClr val="bg1"/>
+                </a:solidFill>
+                <a:sym typeface="Nunito Sans"/>
+              </a:rPr>
+              <a:t>“</a:t>
+            </a:r>
+            <a:r>
+              <a:rPr lang="es-CO" sz="2400" b="1" i="1" dirty="0" err="1" smtClean="0">
+                <a:solidFill>
+                  <a:schemeClr val="bg1"/>
+                </a:solidFill>
+                <a:sym typeface="Nunito Sans"/>
+              </a:rPr>
+              <a:t>Subtypes</a:t>
+            </a:r>
+            <a:r>
+              <a:rPr lang="es-CO" sz="2400" b="1" i="1" dirty="0" smtClean="0">
+                <a:solidFill>
+                  <a:schemeClr val="bg1"/>
+                </a:solidFill>
+                <a:sym typeface="Nunito Sans"/>
+              </a:rPr>
+              <a:t> </a:t>
+            </a:r>
+            <a:r>
+              <a:rPr lang="es-CO" sz="2400" b="1" i="1" dirty="0" err="1" smtClean="0">
+                <a:solidFill>
+                  <a:schemeClr val="bg1"/>
+                </a:solidFill>
+                <a:sym typeface="Nunito Sans"/>
+              </a:rPr>
+              <a:t>must</a:t>
+            </a:r>
+            <a:r>
+              <a:rPr lang="es-CO" sz="2400" b="1" i="1" dirty="0" smtClean="0">
+                <a:solidFill>
+                  <a:schemeClr val="bg1"/>
+                </a:solidFill>
+                <a:sym typeface="Nunito Sans"/>
+              </a:rPr>
+              <a:t> be </a:t>
+            </a:r>
+            <a:r>
+              <a:rPr lang="es-CO" sz="2400" b="1" i="1" dirty="0" err="1" smtClean="0">
+                <a:solidFill>
+                  <a:schemeClr val="bg1"/>
+                </a:solidFill>
+                <a:sym typeface="Nunito Sans"/>
+              </a:rPr>
+              <a:t>substitable</a:t>
+            </a:r>
+            <a:r>
+              <a:rPr lang="es-CO" sz="2400" b="1" i="1" dirty="0" smtClean="0">
+                <a:solidFill>
+                  <a:schemeClr val="bg1"/>
+                </a:solidFill>
+                <a:sym typeface="Nunito Sans"/>
+              </a:rPr>
+              <a:t> </a:t>
+            </a:r>
+            <a:r>
+              <a:rPr lang="es-CO" sz="2400" b="1" i="1" dirty="0" err="1" smtClean="0">
+                <a:solidFill>
+                  <a:schemeClr val="bg1"/>
+                </a:solidFill>
+                <a:sym typeface="Nunito Sans"/>
+              </a:rPr>
+              <a:t>for</a:t>
+            </a:r>
+            <a:r>
+              <a:rPr lang="es-CO" sz="2400" b="1" i="1" dirty="0" smtClean="0">
+                <a:solidFill>
+                  <a:schemeClr val="bg1"/>
+                </a:solidFill>
+                <a:sym typeface="Nunito Sans"/>
+              </a:rPr>
+              <a:t> </a:t>
+            </a:r>
+            <a:r>
+              <a:rPr lang="es-CO" sz="2400" b="1" i="1" dirty="0" err="1" smtClean="0">
+                <a:solidFill>
+                  <a:schemeClr val="bg1"/>
+                </a:solidFill>
+                <a:sym typeface="Nunito Sans"/>
+              </a:rPr>
+              <a:t>their</a:t>
+            </a:r>
+            <a:r>
+              <a:rPr lang="es-CO" sz="2400" b="1" i="1" dirty="0" smtClean="0">
+                <a:solidFill>
+                  <a:schemeClr val="bg1"/>
+                </a:solidFill>
+                <a:sym typeface="Nunito Sans"/>
+              </a:rPr>
+              <a:t> base </a:t>
+            </a:r>
+            <a:r>
+              <a:rPr lang="es-CO" sz="2400" b="1" i="1" dirty="0" err="1" smtClean="0">
+                <a:solidFill>
+                  <a:schemeClr val="bg1"/>
+                </a:solidFill>
+                <a:sym typeface="Nunito Sans"/>
+              </a:rPr>
+              <a:t>types</a:t>
+            </a:r>
+            <a:r>
+              <a:rPr lang="es-CO" sz="2400" b="1" i="1" dirty="0" smtClean="0">
+                <a:solidFill>
+                  <a:schemeClr val="bg1"/>
+                </a:solidFill>
+                <a:sym typeface="Nunito Sans"/>
+              </a:rPr>
+              <a:t>”</a:t>
+            </a:r>
+            <a:endParaRPr lang="en-US" sz="2400" i="1" dirty="0">
+              <a:solidFill>
+                <a:schemeClr val="bg1"/>
+              </a:solidFill>
+              <a:sym typeface="Nunito Sans"/>
+            </a:endParaRPr>
+          </a:p>
+        </p:txBody>
+      </p:sp>
+      <p:pic>
+        <p:nvPicPr>
+          <p:cNvPr id="2" name="Picture 1"/>
+          <p:cNvPicPr>
+            <a:picLocks noChangeAspect="1"/>
+          </p:cNvPicPr>
+          <p:nvPr/>
+        </p:nvPicPr>
+        <p:blipFill>
+          <a:blip r:embed="rId3">
+            <a:extLst>
+              <a:ext uri="{28A0092B-C50C-407E-A947-70E740481C1C}">
+                <a14:useLocalDpi xmlns:a14="http://schemas.microsoft.com/office/drawing/2010/main" val="0"/>
+              </a:ext>
+            </a:extLst>
+          </a:blip>
+          <a:stretch>
+            <a:fillRect/>
+          </a:stretch>
+        </p:blipFill>
+        <p:spPr>
+          <a:xfrm>
+            <a:off x="4879380" y="1186103"/>
+            <a:ext cx="4264615" cy="3201702"/>
+          </a:xfrm>
+          <a:prstGeom prst="rect">
+            <a:avLst/>
+          </a:prstGeom>
+        </p:spPr>
+      </p:pic>
+    </p:spTree>
+    <p:extLst>
+      <p:ext uri="{BB962C8B-B14F-4D97-AF65-F5344CB8AC3E}">
+        <p14:creationId xmlns:p14="http://schemas.microsoft.com/office/powerpoint/2010/main" val="3159072083"/>
+      </p:ext>
+    </p:extLst>
+  </p:cSld>
+  <p:clrMapOvr>
+    <a:masterClrMapping/>
+  </p:clrMapOvr>
+</p:sld>
+</file>
+
+<file path=ppt/slides/slide21.xml><?xml version="1.0" encoding="utf-8"?>
+<p:sld xmlns:a="http://schemas.openxmlformats.org/drawingml/2006/main" xmlns:r="http://schemas.openxmlformats.org/officeDocument/2006/relationships" xmlns:p="http://schemas.openxmlformats.org/presentationml/2006/main">
+  <p:cSld>
+    <p:bg>
+      <p:bgPr>
+        <a:solidFill>
+          <a:schemeClr val="tx1"/>
+        </a:solidFill>
+        <a:effectLst/>
+      </p:bgPr>
+    </p:bg>
+    <p:spTree>
+      <p:nvGrpSpPr>
+        <p:cNvPr id="1" name="Shape 117"/>
+        <p:cNvGrpSpPr/>
+        <p:nvPr/>
+      </p:nvGrpSpPr>
+      <p:grpSpPr>
+        <a:xfrm>
+          <a:off x="0" y="0"/>
+          <a:ext cx="0" cy="0"/>
+          <a:chOff x="0" y="0"/>
+          <a:chExt cx="0" cy="0"/>
+        </a:xfrm>
+      </p:grpSpPr>
+      <p:sp>
+        <p:nvSpPr>
+          <p:cNvPr id="120" name="Google Shape;120;p28"/>
+          <p:cNvSpPr/>
+          <p:nvPr/>
+        </p:nvSpPr>
+        <p:spPr>
+          <a:xfrm>
+            <a:off x="-5" y="5118630"/>
+            <a:ext cx="9144000" cy="33600"/>
+          </a:xfrm>
+          <a:prstGeom prst="rect">
+            <a:avLst/>
+          </a:prstGeom>
+          <a:solidFill>
+            <a:srgbClr val="C1D82F"/>
+          </a:solidFill>
+          <a:ln>
+            <a:noFill/>
+          </a:ln>
+        </p:spPr>
+        <p:txBody>
+          <a:bodyPr spcFirstLastPara="1" wrap="square" lIns="91425" tIns="91425" rIns="91425" bIns="91425" anchor="ctr" anchorCtr="0">
+            <a:noAutofit/>
+          </a:bodyPr>
+          <a:lstStyle/>
+          <a:p>
+            <a:pPr marL="0" lvl="0" indent="0" algn="l" rtl="0">
+              <a:spcBef>
+                <a:spcPts val="0"/>
+              </a:spcBef>
+              <a:spcAft>
+                <a:spcPts val="0"/>
+              </a:spcAft>
+              <a:buNone/>
+            </a:pPr>
+            <a:endParaRPr/>
+          </a:p>
+        </p:txBody>
+      </p:sp>
+      <p:sp>
+        <p:nvSpPr>
+          <p:cNvPr id="8" name="Google Shape;119;p28">
+            <a:extLst>
+              <a:ext uri="{FF2B5EF4-FFF2-40B4-BE49-F238E27FC236}">
+                <a16:creationId xmlns:a16="http://schemas.microsoft.com/office/drawing/2014/main" xmlns="" id="{10097979-2EAB-4D16-BB1B-760958684724}"/>
+              </a:ext>
+            </a:extLst>
+          </p:cNvPr>
+          <p:cNvSpPr txBox="1"/>
+          <p:nvPr/>
+        </p:nvSpPr>
+        <p:spPr>
+          <a:xfrm>
+            <a:off x="-4" y="78241"/>
+            <a:ext cx="9144004" cy="661278"/>
+          </a:xfrm>
+          <a:prstGeom prst="rect">
+            <a:avLst/>
+          </a:prstGeom>
+          <a:noFill/>
+          <a:ln>
+            <a:noFill/>
+          </a:ln>
+        </p:spPr>
+        <p:txBody>
+          <a:bodyPr spcFirstLastPara="1" wrap="square" lIns="91425" tIns="91425" rIns="91425" bIns="91425" anchor="t" anchorCtr="0">
+            <a:noAutofit/>
+          </a:bodyPr>
+          <a:lstStyle/>
+          <a:p>
+            <a:pPr marL="0" lvl="0" indent="0" algn="ctr" rtl="0">
+              <a:spcBef>
+                <a:spcPts val="0"/>
+              </a:spcBef>
+              <a:spcAft>
+                <a:spcPts val="0"/>
+              </a:spcAft>
+              <a:buClr>
+                <a:schemeClr val="dk1"/>
+              </a:buClr>
+              <a:buSzPts val="1100"/>
+              <a:buFont typeface="Arial"/>
+              <a:buNone/>
+            </a:pPr>
+            <a:r>
+              <a:rPr lang="es-CO" sz="3200" b="1" dirty="0" err="1" smtClean="0">
+                <a:solidFill>
+                  <a:schemeClr val="lt1"/>
+                </a:solidFill>
+                <a:effectLst>
+                  <a:outerShdw blurRad="38100" dist="38100" dir="2700000" algn="tl">
+                    <a:srgbClr val="000000">
+                      <a:alpha val="43137"/>
+                    </a:srgbClr>
+                  </a:outerShdw>
+                </a:effectLst>
+                <a:latin typeface="Montserrat"/>
+                <a:ea typeface="Montserrat"/>
+                <a:cs typeface="Montserrat"/>
+                <a:sym typeface="Montserrat"/>
+              </a:rPr>
+              <a:t>What</a:t>
+            </a:r>
+            <a:r>
+              <a:rPr lang="es-CO" sz="3200" b="1" dirty="0" smtClean="0">
+                <a:solidFill>
+                  <a:schemeClr val="lt1"/>
+                </a:solidFill>
+                <a:effectLst>
+                  <a:outerShdw blurRad="38100" dist="38100" dir="2700000" algn="tl">
+                    <a:srgbClr val="000000">
+                      <a:alpha val="43137"/>
+                    </a:srgbClr>
+                  </a:outerShdw>
+                </a:effectLst>
+                <a:latin typeface="Montserrat"/>
+                <a:ea typeface="Montserrat"/>
+                <a:cs typeface="Montserrat"/>
+                <a:sym typeface="Montserrat"/>
+              </a:rPr>
+              <a:t> </a:t>
+            </a:r>
+            <a:r>
+              <a:rPr lang="es-CO" sz="3200" b="1" dirty="0" err="1" smtClean="0">
+                <a:solidFill>
+                  <a:schemeClr val="lt1"/>
+                </a:solidFill>
+                <a:effectLst>
+                  <a:outerShdw blurRad="38100" dist="38100" dir="2700000" algn="tl">
+                    <a:srgbClr val="000000">
+                      <a:alpha val="43137"/>
+                    </a:srgbClr>
+                  </a:outerShdw>
+                </a:effectLst>
+                <a:latin typeface="Montserrat"/>
+                <a:ea typeface="Montserrat"/>
+                <a:cs typeface="Montserrat"/>
+                <a:sym typeface="Montserrat"/>
+              </a:rPr>
+              <a:t>is</a:t>
+            </a:r>
+            <a:r>
+              <a:rPr lang="es-CO" sz="3200" b="1" dirty="0" smtClean="0">
+                <a:solidFill>
+                  <a:schemeClr val="lt1"/>
+                </a:solidFill>
+                <a:effectLst>
+                  <a:outerShdw blurRad="38100" dist="38100" dir="2700000" algn="tl">
+                    <a:srgbClr val="000000">
+                      <a:alpha val="43137"/>
+                    </a:srgbClr>
+                  </a:outerShdw>
+                </a:effectLst>
+                <a:latin typeface="Montserrat"/>
+                <a:ea typeface="Montserrat"/>
+                <a:cs typeface="Montserrat"/>
+                <a:sym typeface="Montserrat"/>
+              </a:rPr>
+              <a:t> LSP?</a:t>
+            </a:r>
+            <a:endParaRPr lang="en-US" sz="2000" b="1" dirty="0">
+              <a:solidFill>
+                <a:srgbClr val="C1D82F"/>
+              </a:solidFill>
+              <a:effectLst>
+                <a:outerShdw blurRad="38100" dist="38100" dir="2700000" algn="tl">
+                  <a:srgbClr val="000000">
+                    <a:alpha val="43137"/>
+                  </a:srgbClr>
+                </a:outerShdw>
+              </a:effectLst>
+              <a:latin typeface="Montserrat"/>
+              <a:ea typeface="Montserrat"/>
+              <a:cs typeface="Montserrat"/>
+              <a:sym typeface="Montserrat"/>
+            </a:endParaRPr>
+          </a:p>
+        </p:txBody>
+      </p:sp>
+      <p:sp>
+        <p:nvSpPr>
+          <p:cNvPr id="10" name="Google Shape;118;p28">
+            <a:extLst>
+              <a:ext uri="{FF2B5EF4-FFF2-40B4-BE49-F238E27FC236}">
+                <a16:creationId xmlns:a16="http://schemas.microsoft.com/office/drawing/2014/main" xmlns="" id="{97AED5D8-366C-458A-A931-C3DD1F88998C}"/>
+              </a:ext>
+            </a:extLst>
+          </p:cNvPr>
+          <p:cNvSpPr txBox="1"/>
+          <p:nvPr/>
+        </p:nvSpPr>
+        <p:spPr>
+          <a:xfrm>
+            <a:off x="226338" y="1186103"/>
+            <a:ext cx="4299614" cy="594325"/>
+          </a:xfrm>
+          <a:prstGeom prst="rect">
+            <a:avLst/>
+          </a:prstGeom>
+          <a:noFill/>
+          <a:ln>
+            <a:noFill/>
+          </a:ln>
+        </p:spPr>
+        <p:txBody>
+          <a:bodyPr spcFirstLastPara="1" wrap="square" lIns="91425" tIns="91425" rIns="91425" bIns="91425" anchor="t" anchorCtr="0">
+            <a:noAutofit/>
+          </a:bodyPr>
+          <a:lstStyle/>
+          <a:p>
+            <a:pPr marL="146050" lvl="0" algn="just">
+              <a:buClr>
+                <a:srgbClr val="FFFFFF"/>
+              </a:buClr>
+              <a:buSzPts val="1300"/>
+            </a:pPr>
+            <a:r>
+              <a:rPr lang="en-US" b="1" dirty="0" smtClean="0">
+                <a:solidFill>
+                  <a:schemeClr val="bg1"/>
+                </a:solidFill>
+              </a:rPr>
+              <a:t>Always </a:t>
+            </a:r>
+            <a:r>
+              <a:rPr lang="en-US" b="1" dirty="0" smtClean="0">
+                <a:solidFill>
+                  <a:schemeClr val="bg1"/>
+                </a:solidFill>
+              </a:rPr>
+              <a:t>for inheritance we read and use the IS-A to describe child classes.</a:t>
+            </a:r>
+          </a:p>
+          <a:p>
+            <a:pPr marL="146050" lvl="0" algn="just">
+              <a:buClr>
+                <a:srgbClr val="FFFFFF"/>
+              </a:buClr>
+              <a:buSzPts val="1300"/>
+            </a:pPr>
+            <a:endParaRPr lang="es-CO" b="1" dirty="0">
+              <a:solidFill>
+                <a:schemeClr val="bg1"/>
+              </a:solidFill>
+            </a:endParaRPr>
+          </a:p>
+          <a:p>
+            <a:pPr marL="146050" lvl="0" algn="just">
+              <a:buClr>
+                <a:srgbClr val="FFFFFF"/>
+              </a:buClr>
+              <a:buSzPts val="1300"/>
+            </a:pPr>
+            <a:r>
+              <a:rPr lang="es-CO" b="1" dirty="0" smtClean="0">
+                <a:solidFill>
+                  <a:schemeClr val="bg1"/>
+                </a:solidFill>
+              </a:rPr>
+              <a:t>LSP </a:t>
+            </a:r>
+            <a:r>
+              <a:rPr lang="es-CO" b="1" dirty="0" err="1" smtClean="0">
+                <a:solidFill>
+                  <a:schemeClr val="bg1"/>
+                </a:solidFill>
+              </a:rPr>
+              <a:t>suggest</a:t>
+            </a:r>
+            <a:r>
+              <a:rPr lang="es-CO" b="1" dirty="0" smtClean="0">
+                <a:solidFill>
+                  <a:schemeClr val="bg1"/>
+                </a:solidFill>
+              </a:rPr>
+              <a:t> </a:t>
+            </a:r>
+            <a:r>
+              <a:rPr lang="es-CO" b="1" dirty="0" err="1" smtClean="0">
+                <a:solidFill>
+                  <a:schemeClr val="bg1"/>
+                </a:solidFill>
+              </a:rPr>
+              <a:t>that</a:t>
+            </a:r>
+            <a:r>
+              <a:rPr lang="es-CO" b="1" dirty="0" smtClean="0">
+                <a:solidFill>
+                  <a:schemeClr val="bg1"/>
+                </a:solidFill>
+              </a:rPr>
+              <a:t> </a:t>
+            </a:r>
+            <a:r>
+              <a:rPr lang="es-CO" b="1" dirty="0" err="1" smtClean="0">
+                <a:solidFill>
+                  <a:schemeClr val="bg1"/>
+                </a:solidFill>
+              </a:rPr>
+              <a:t>we</a:t>
+            </a:r>
+            <a:r>
+              <a:rPr lang="es-CO" b="1" dirty="0" smtClean="0">
+                <a:solidFill>
+                  <a:schemeClr val="bg1"/>
+                </a:solidFill>
+              </a:rPr>
+              <a:t> </a:t>
+            </a:r>
+            <a:r>
+              <a:rPr lang="es-CO" b="1" dirty="0" err="1" smtClean="0">
+                <a:solidFill>
+                  <a:schemeClr val="bg1"/>
+                </a:solidFill>
+              </a:rPr>
+              <a:t>should</a:t>
+            </a:r>
+            <a:r>
+              <a:rPr lang="es-CO" b="1" dirty="0" smtClean="0">
+                <a:solidFill>
+                  <a:schemeClr val="bg1"/>
+                </a:solidFill>
+              </a:rPr>
+              <a:t> </a:t>
+            </a:r>
+            <a:r>
+              <a:rPr lang="es-CO" b="1" dirty="0" err="1" smtClean="0">
+                <a:solidFill>
+                  <a:schemeClr val="bg1"/>
+                </a:solidFill>
+              </a:rPr>
+              <a:t>replace</a:t>
+            </a:r>
+            <a:r>
+              <a:rPr lang="es-CO" b="1" dirty="0" smtClean="0">
+                <a:solidFill>
+                  <a:schemeClr val="bg1"/>
+                </a:solidFill>
+              </a:rPr>
+              <a:t> </a:t>
+            </a:r>
+            <a:r>
+              <a:rPr lang="es-CO" b="1" dirty="0" err="1" smtClean="0">
+                <a:solidFill>
+                  <a:schemeClr val="bg1"/>
+                </a:solidFill>
+              </a:rPr>
+              <a:t>this</a:t>
+            </a:r>
+            <a:r>
+              <a:rPr lang="es-CO" b="1" dirty="0" smtClean="0">
+                <a:solidFill>
+                  <a:schemeClr val="bg1"/>
+                </a:solidFill>
+              </a:rPr>
+              <a:t> </a:t>
+            </a:r>
+            <a:r>
+              <a:rPr lang="es-CO" b="1" dirty="0" err="1" smtClean="0">
+                <a:solidFill>
+                  <a:schemeClr val="bg1"/>
+                </a:solidFill>
+              </a:rPr>
+              <a:t>with</a:t>
+            </a:r>
+            <a:r>
+              <a:rPr lang="es-CO" b="1" dirty="0" smtClean="0">
+                <a:solidFill>
+                  <a:schemeClr val="bg1"/>
+                </a:solidFill>
+              </a:rPr>
+              <a:t> IS-SUBSTITABLE-FOR</a:t>
+            </a:r>
+            <a:endParaRPr lang="en-US" b="1" dirty="0" smtClean="0">
+              <a:solidFill>
+                <a:schemeClr val="bg1"/>
+              </a:solidFill>
+            </a:endParaRPr>
+          </a:p>
+          <a:p>
+            <a:pPr marL="146050" lvl="0" algn="just">
+              <a:buClr>
+                <a:srgbClr val="FFFFFF"/>
+              </a:buClr>
+              <a:buSzPts val="1300"/>
+            </a:pPr>
+            <a:endParaRPr lang="es-CO" sz="900" b="1" dirty="0">
+              <a:solidFill>
+                <a:schemeClr val="bg1"/>
+              </a:solidFill>
+              <a:sym typeface="Nunito Sans"/>
+            </a:endParaRPr>
+          </a:p>
+          <a:p>
+            <a:pPr marL="146050" lvl="0" algn="just">
+              <a:buClr>
+                <a:srgbClr val="FFFFFF"/>
+              </a:buClr>
+              <a:buSzPts val="1300"/>
+            </a:pPr>
+            <a:endParaRPr lang="es-CO" sz="900" b="1" dirty="0" smtClean="0">
+              <a:solidFill>
+                <a:schemeClr val="bg1"/>
+              </a:solidFill>
+              <a:sym typeface="Nunito Sans"/>
+            </a:endParaRPr>
+          </a:p>
+          <a:p>
+            <a:pPr marL="146050" lvl="0" algn="just">
+              <a:buClr>
+                <a:srgbClr val="FFFFFF"/>
+              </a:buClr>
+              <a:buSzPts val="1300"/>
+            </a:pPr>
+            <a:endParaRPr lang="es-CO" sz="2400" b="1" i="1" dirty="0" smtClean="0">
+              <a:solidFill>
+                <a:schemeClr val="bg1"/>
+              </a:solidFill>
+              <a:sym typeface="Nunito Sans"/>
+            </a:endParaRPr>
+          </a:p>
+          <a:p>
+            <a:pPr marL="146050" lvl="0" algn="just">
+              <a:buClr>
+                <a:srgbClr val="FFFFFF"/>
+              </a:buClr>
+              <a:buSzPts val="1300"/>
+            </a:pPr>
+            <a:r>
+              <a:rPr lang="es-CO" sz="2400" b="1" i="1" dirty="0" err="1" smtClean="0">
+                <a:solidFill>
+                  <a:schemeClr val="bg1"/>
+                </a:solidFill>
+                <a:sym typeface="Nunito Sans"/>
+              </a:rPr>
+              <a:t>Also</a:t>
+            </a:r>
+            <a:r>
+              <a:rPr lang="es-CO" sz="2400" b="1" i="1" dirty="0" smtClean="0">
+                <a:solidFill>
+                  <a:schemeClr val="bg1"/>
+                </a:solidFill>
+                <a:sym typeface="Nunito Sans"/>
+              </a:rPr>
+              <a:t>, </a:t>
+            </a:r>
+            <a:r>
+              <a:rPr lang="es-CO" sz="2400" b="1" i="1" dirty="0" err="1" smtClean="0">
+                <a:solidFill>
+                  <a:schemeClr val="bg1"/>
+                </a:solidFill>
+                <a:sym typeface="Nunito Sans"/>
+              </a:rPr>
+              <a:t>frequently</a:t>
+            </a:r>
+            <a:r>
+              <a:rPr lang="es-CO" sz="2400" b="1" i="1" dirty="0" smtClean="0">
+                <a:solidFill>
+                  <a:schemeClr val="bg1"/>
+                </a:solidFill>
+                <a:sym typeface="Nunito Sans"/>
+              </a:rPr>
+              <a:t> uses </a:t>
+            </a:r>
+            <a:r>
+              <a:rPr lang="es-CO" sz="2400" b="1" i="1" dirty="0" err="1" smtClean="0">
+                <a:solidFill>
+                  <a:schemeClr val="bg1"/>
+                </a:solidFill>
+                <a:sym typeface="Nunito Sans"/>
+              </a:rPr>
+              <a:t>unit</a:t>
+            </a:r>
+            <a:r>
+              <a:rPr lang="es-CO" sz="2400" b="1" i="1" dirty="0" smtClean="0">
+                <a:solidFill>
+                  <a:schemeClr val="bg1"/>
+                </a:solidFill>
+                <a:sym typeface="Nunito Sans"/>
+              </a:rPr>
+              <a:t> test to </a:t>
+            </a:r>
+            <a:r>
+              <a:rPr lang="es-CO" sz="2400" b="1" i="1" dirty="0" err="1" smtClean="0">
+                <a:solidFill>
+                  <a:schemeClr val="bg1"/>
+                </a:solidFill>
+                <a:sym typeface="Nunito Sans"/>
+              </a:rPr>
+              <a:t>specify</a:t>
+            </a:r>
+            <a:r>
+              <a:rPr lang="es-CO" sz="2400" b="1" i="1" dirty="0" smtClean="0">
+                <a:solidFill>
+                  <a:schemeClr val="bg1"/>
+                </a:solidFill>
+                <a:sym typeface="Nunito Sans"/>
+              </a:rPr>
+              <a:t> </a:t>
+            </a:r>
+            <a:r>
+              <a:rPr lang="es-CO" sz="2400" b="1" i="1" dirty="0" err="1" smtClean="0">
+                <a:solidFill>
+                  <a:schemeClr val="bg1"/>
+                </a:solidFill>
+                <a:sym typeface="Nunito Sans"/>
+              </a:rPr>
+              <a:t>expected</a:t>
+            </a:r>
+            <a:r>
+              <a:rPr lang="es-CO" sz="2400" b="1" i="1" dirty="0" smtClean="0">
+                <a:solidFill>
+                  <a:schemeClr val="bg1"/>
+                </a:solidFill>
+                <a:sym typeface="Nunito Sans"/>
+              </a:rPr>
+              <a:t> </a:t>
+            </a:r>
+            <a:r>
+              <a:rPr lang="es-CO" sz="2400" b="1" i="1" dirty="0" err="1" smtClean="0">
+                <a:solidFill>
+                  <a:schemeClr val="bg1"/>
+                </a:solidFill>
+                <a:sym typeface="Nunito Sans"/>
+              </a:rPr>
+              <a:t>behaviour</a:t>
+            </a:r>
+            <a:r>
+              <a:rPr lang="es-CO" sz="2400" b="1" i="1" dirty="0" smtClean="0">
+                <a:solidFill>
+                  <a:schemeClr val="bg1"/>
+                </a:solidFill>
+                <a:sym typeface="Nunito Sans"/>
+              </a:rPr>
+              <a:t> of a </a:t>
+            </a:r>
+            <a:r>
+              <a:rPr lang="es-CO" sz="2400" b="1" i="1" dirty="0" err="1" smtClean="0">
+                <a:solidFill>
+                  <a:schemeClr val="bg1"/>
+                </a:solidFill>
+                <a:sym typeface="Nunito Sans"/>
+              </a:rPr>
+              <a:t>method</a:t>
+            </a:r>
+            <a:r>
+              <a:rPr lang="es-CO" sz="2400" b="1" i="1" dirty="0" smtClean="0">
+                <a:solidFill>
+                  <a:schemeClr val="bg1"/>
+                </a:solidFill>
+                <a:sym typeface="Nunito Sans"/>
+              </a:rPr>
+              <a:t> </a:t>
+            </a:r>
+            <a:r>
+              <a:rPr lang="es-CO" sz="2400" b="1" i="1" dirty="0" err="1" smtClean="0">
+                <a:solidFill>
+                  <a:schemeClr val="bg1"/>
+                </a:solidFill>
+                <a:sym typeface="Nunito Sans"/>
+              </a:rPr>
+              <a:t>or</a:t>
+            </a:r>
+            <a:r>
+              <a:rPr lang="es-CO" sz="2400" b="1" i="1" dirty="0" smtClean="0">
+                <a:solidFill>
+                  <a:schemeClr val="bg1"/>
+                </a:solidFill>
+                <a:sym typeface="Nunito Sans"/>
+              </a:rPr>
+              <a:t> </a:t>
+            </a:r>
+            <a:r>
+              <a:rPr lang="es-CO" sz="2400" b="1" i="1" dirty="0" err="1" smtClean="0">
+                <a:solidFill>
+                  <a:schemeClr val="bg1"/>
+                </a:solidFill>
+                <a:sym typeface="Nunito Sans"/>
+              </a:rPr>
+              <a:t>class</a:t>
+            </a:r>
+            <a:r>
+              <a:rPr lang="es-CO" sz="2400" b="1" i="1" dirty="0" smtClean="0">
+                <a:solidFill>
+                  <a:schemeClr val="bg1"/>
+                </a:solidFill>
+                <a:sym typeface="Nunito Sans"/>
+              </a:rPr>
+              <a:t>.</a:t>
+            </a:r>
+            <a:endParaRPr lang="es-CO" sz="2400" b="1" i="1" dirty="0">
+              <a:solidFill>
+                <a:schemeClr val="bg1"/>
+              </a:solidFill>
+              <a:sym typeface="Nunito Sans"/>
+            </a:endParaRPr>
+          </a:p>
+        </p:txBody>
+      </p:sp>
+      <p:sp>
+        <p:nvSpPr>
+          <p:cNvPr id="3" name="TextBox 2"/>
+          <p:cNvSpPr txBox="1"/>
+          <p:nvPr/>
+        </p:nvSpPr>
+        <p:spPr>
+          <a:xfrm>
+            <a:off x="5900840" y="1401203"/>
+            <a:ext cx="2720617" cy="2462213"/>
+          </a:xfrm>
+          <a:prstGeom prst="rect">
+            <a:avLst/>
+          </a:prstGeom>
+          <a:noFill/>
+        </p:spPr>
+        <p:txBody>
+          <a:bodyPr wrap="none" rtlCol="0">
+            <a:spAutoFit/>
+          </a:bodyPr>
+          <a:lstStyle/>
+          <a:p>
+            <a:r>
+              <a:rPr lang="es-CO" dirty="0" err="1">
+                <a:solidFill>
+                  <a:schemeClr val="bg1"/>
+                </a:solidFill>
+              </a:rPr>
+              <a:t>f</a:t>
+            </a:r>
+            <a:r>
+              <a:rPr lang="es-CO" dirty="0" err="1" smtClean="0">
+                <a:solidFill>
+                  <a:schemeClr val="bg1"/>
+                </a:solidFill>
+              </a:rPr>
+              <a:t>oreach</a:t>
+            </a:r>
+            <a:r>
+              <a:rPr lang="es-CO" dirty="0" smtClean="0">
+                <a:solidFill>
+                  <a:schemeClr val="bg1"/>
+                </a:solidFill>
+              </a:rPr>
+              <a:t> (</a:t>
+            </a:r>
+            <a:r>
+              <a:rPr lang="es-CO" dirty="0" err="1" smtClean="0">
+                <a:solidFill>
+                  <a:schemeClr val="bg1"/>
+                </a:solidFill>
+              </a:rPr>
+              <a:t>var</a:t>
+            </a:r>
+            <a:r>
+              <a:rPr lang="es-CO" dirty="0" smtClean="0">
+                <a:solidFill>
+                  <a:schemeClr val="bg1"/>
+                </a:solidFill>
+              </a:rPr>
+              <a:t> </a:t>
+            </a:r>
+            <a:r>
+              <a:rPr lang="es-CO" dirty="0" err="1" smtClean="0">
+                <a:solidFill>
+                  <a:schemeClr val="bg1"/>
+                </a:solidFill>
+              </a:rPr>
+              <a:t>emp</a:t>
+            </a:r>
+            <a:r>
+              <a:rPr lang="es-CO" dirty="0" smtClean="0">
+                <a:solidFill>
+                  <a:schemeClr val="bg1"/>
+                </a:solidFill>
+              </a:rPr>
+              <a:t> in </a:t>
+            </a:r>
+            <a:r>
+              <a:rPr lang="es-CO" dirty="0" err="1" smtClean="0">
+                <a:solidFill>
+                  <a:schemeClr val="bg1"/>
+                </a:solidFill>
+              </a:rPr>
+              <a:t>Employees</a:t>
+            </a:r>
+            <a:r>
+              <a:rPr lang="es-CO" dirty="0" smtClean="0">
+                <a:solidFill>
+                  <a:schemeClr val="bg1"/>
+                </a:solidFill>
+              </a:rPr>
+              <a:t>)</a:t>
+            </a:r>
+          </a:p>
+          <a:p>
+            <a:r>
+              <a:rPr lang="es-CO" dirty="0" smtClean="0">
+                <a:solidFill>
+                  <a:schemeClr val="bg1"/>
+                </a:solidFill>
+              </a:rPr>
+              <a:t>{</a:t>
+            </a:r>
+          </a:p>
+          <a:p>
+            <a:r>
+              <a:rPr lang="es-CO" dirty="0" smtClean="0">
+                <a:solidFill>
+                  <a:schemeClr val="bg1"/>
+                </a:solidFill>
+              </a:rPr>
+              <a:t>     </a:t>
+            </a:r>
+            <a:r>
+              <a:rPr lang="es-CO" dirty="0" err="1" smtClean="0">
+                <a:solidFill>
+                  <a:schemeClr val="bg1"/>
+                </a:solidFill>
+              </a:rPr>
+              <a:t>if</a:t>
+            </a:r>
+            <a:r>
+              <a:rPr lang="es-CO" dirty="0" smtClean="0">
+                <a:solidFill>
+                  <a:schemeClr val="bg1"/>
+                </a:solidFill>
+              </a:rPr>
+              <a:t> (</a:t>
+            </a:r>
+            <a:r>
+              <a:rPr lang="es-CO" dirty="0" err="1" smtClean="0">
+                <a:solidFill>
+                  <a:schemeClr val="bg1"/>
+                </a:solidFill>
+              </a:rPr>
+              <a:t>emp</a:t>
+            </a:r>
+            <a:r>
+              <a:rPr lang="es-CO" dirty="0" smtClean="0">
+                <a:solidFill>
+                  <a:schemeClr val="bg1"/>
+                </a:solidFill>
+              </a:rPr>
+              <a:t> </a:t>
+            </a:r>
+            <a:r>
+              <a:rPr lang="es-CO" dirty="0" err="1" smtClean="0">
+                <a:solidFill>
+                  <a:schemeClr val="bg1"/>
+                </a:solidFill>
+              </a:rPr>
+              <a:t>is</a:t>
+            </a:r>
+            <a:r>
+              <a:rPr lang="es-CO" dirty="0" smtClean="0">
+                <a:solidFill>
+                  <a:schemeClr val="bg1"/>
+                </a:solidFill>
+              </a:rPr>
+              <a:t> Manager)</a:t>
+            </a:r>
+          </a:p>
+          <a:p>
+            <a:r>
+              <a:rPr lang="es-CO" dirty="0" smtClean="0">
+                <a:solidFill>
+                  <a:schemeClr val="bg1"/>
+                </a:solidFill>
+              </a:rPr>
+              <a:t>     {</a:t>
+            </a:r>
+          </a:p>
+          <a:p>
+            <a:r>
+              <a:rPr lang="es-CO" dirty="0">
+                <a:solidFill>
+                  <a:schemeClr val="bg1"/>
+                </a:solidFill>
+              </a:rPr>
+              <a:t> </a:t>
+            </a:r>
+            <a:r>
+              <a:rPr lang="es-CO" dirty="0" smtClean="0">
+                <a:solidFill>
+                  <a:schemeClr val="bg1"/>
+                </a:solidFill>
+              </a:rPr>
+              <a:t>        ……</a:t>
+            </a:r>
+          </a:p>
+          <a:p>
+            <a:r>
+              <a:rPr lang="es-CO" dirty="0" smtClean="0">
+                <a:solidFill>
+                  <a:schemeClr val="bg1"/>
+                </a:solidFill>
+              </a:rPr>
+              <a:t>      }</a:t>
+            </a:r>
+          </a:p>
+          <a:p>
+            <a:r>
+              <a:rPr lang="es-CO" dirty="0" smtClean="0">
+                <a:solidFill>
+                  <a:schemeClr val="bg1"/>
+                </a:solidFill>
+              </a:rPr>
+              <a:t>     </a:t>
+            </a:r>
+            <a:r>
+              <a:rPr lang="es-CO" dirty="0" err="1" smtClean="0">
+                <a:solidFill>
+                  <a:schemeClr val="bg1"/>
+                </a:solidFill>
+              </a:rPr>
+              <a:t>if</a:t>
+            </a:r>
+            <a:r>
+              <a:rPr lang="es-CO" dirty="0" smtClean="0">
+                <a:solidFill>
+                  <a:schemeClr val="bg1"/>
+                </a:solidFill>
+              </a:rPr>
+              <a:t> (</a:t>
+            </a:r>
+            <a:r>
+              <a:rPr lang="es-CO" dirty="0" err="1" smtClean="0">
+                <a:solidFill>
+                  <a:schemeClr val="bg1"/>
+                </a:solidFill>
+              </a:rPr>
+              <a:t>emp</a:t>
+            </a:r>
+            <a:r>
+              <a:rPr lang="es-CO" dirty="0" smtClean="0">
+                <a:solidFill>
+                  <a:schemeClr val="bg1"/>
+                </a:solidFill>
+              </a:rPr>
+              <a:t> </a:t>
+            </a:r>
+            <a:r>
+              <a:rPr lang="es-CO" dirty="0" err="1">
+                <a:solidFill>
+                  <a:schemeClr val="bg1"/>
+                </a:solidFill>
+              </a:rPr>
+              <a:t>is</a:t>
+            </a:r>
+            <a:r>
+              <a:rPr lang="es-CO" dirty="0">
+                <a:solidFill>
+                  <a:schemeClr val="bg1"/>
+                </a:solidFill>
+              </a:rPr>
+              <a:t> </a:t>
+            </a:r>
+            <a:r>
+              <a:rPr lang="es-CO" dirty="0" err="1" smtClean="0">
+                <a:solidFill>
+                  <a:schemeClr val="bg1"/>
+                </a:solidFill>
+              </a:rPr>
+              <a:t>External</a:t>
+            </a:r>
+            <a:r>
+              <a:rPr lang="es-CO" dirty="0" smtClean="0">
+                <a:solidFill>
+                  <a:schemeClr val="bg1"/>
+                </a:solidFill>
+              </a:rPr>
+              <a:t>)</a:t>
+            </a:r>
+            <a:endParaRPr lang="es-CO" dirty="0">
+              <a:solidFill>
+                <a:schemeClr val="bg1"/>
+              </a:solidFill>
+            </a:endParaRPr>
+          </a:p>
+          <a:p>
+            <a:r>
+              <a:rPr lang="es-CO" dirty="0">
+                <a:solidFill>
+                  <a:schemeClr val="bg1"/>
+                </a:solidFill>
+              </a:rPr>
+              <a:t>     {</a:t>
+            </a:r>
+          </a:p>
+          <a:p>
+            <a:r>
+              <a:rPr lang="es-CO" dirty="0">
+                <a:solidFill>
+                  <a:schemeClr val="bg1"/>
+                </a:solidFill>
+              </a:rPr>
+              <a:t>         ……</a:t>
+            </a:r>
+          </a:p>
+          <a:p>
+            <a:r>
+              <a:rPr lang="es-CO" dirty="0">
+                <a:solidFill>
+                  <a:schemeClr val="bg1"/>
+                </a:solidFill>
+              </a:rPr>
+              <a:t>      }</a:t>
+            </a:r>
+            <a:endParaRPr lang="en-US" dirty="0">
+              <a:solidFill>
+                <a:schemeClr val="bg1"/>
+              </a:solidFill>
+            </a:endParaRPr>
+          </a:p>
+          <a:p>
+            <a:r>
+              <a:rPr lang="es-CO" dirty="0" smtClean="0">
+                <a:solidFill>
+                  <a:schemeClr val="bg1"/>
+                </a:solidFill>
+              </a:rPr>
+              <a:t>}</a:t>
+            </a:r>
+            <a:endParaRPr lang="en-US" dirty="0">
+              <a:solidFill>
+                <a:schemeClr val="bg1"/>
+              </a:solidFill>
+            </a:endParaRPr>
+          </a:p>
+        </p:txBody>
+      </p:sp>
+    </p:spTree>
+    <p:extLst>
+      <p:ext uri="{BB962C8B-B14F-4D97-AF65-F5344CB8AC3E}">
+        <p14:creationId xmlns:p14="http://schemas.microsoft.com/office/powerpoint/2010/main" val="487621438"/>
       </p:ext>
     </p:extLst>
   </p:cSld>
@@ -19343,7 +21335,7 @@
           <p:cNvPr id="1026" name="Picture 2" descr="Imagen relacionada">
             <a:extLst>
               <a:ext uri="{FF2B5EF4-FFF2-40B4-BE49-F238E27FC236}">
-                <a16:creationId xmlns:a16="http://schemas.microsoft.com/office/drawing/2014/main" id="{87666CD8-2CF3-4EAD-BD74-73A57297B6F7}"/>
+                <a16:creationId xmlns:a16="http://schemas.microsoft.com/office/drawing/2014/main" xmlns="" id="{87666CD8-2CF3-4EAD-BD74-73A57297B6F7}"/>
               </a:ext>
             </a:extLst>
           </p:cNvPr>
@@ -19390,7 +21382,7 @@
           <p:cNvPr id="8" name="Google Shape;139;p30">
             <a:extLst>
               <a:ext uri="{FF2B5EF4-FFF2-40B4-BE49-F238E27FC236}">
-                <a16:creationId xmlns:a16="http://schemas.microsoft.com/office/drawing/2014/main" id="{93795D4F-58E2-461F-AE89-6DB514A5D56A}"/>
+                <a16:creationId xmlns:a16="http://schemas.microsoft.com/office/drawing/2014/main" xmlns="" id="{93795D4F-58E2-461F-AE89-6DB514A5D56A}"/>
               </a:ext>
             </a:extLst>
           </p:cNvPr>
@@ -20029,7 +22021,7 @@
           <p:cNvPr id="7" name="Google Shape;139;p30">
             <a:extLst>
               <a:ext uri="{FF2B5EF4-FFF2-40B4-BE49-F238E27FC236}">
-                <a16:creationId xmlns:a16="http://schemas.microsoft.com/office/drawing/2014/main" id="{9B01C66F-73F1-43EB-9D43-A5E9E9C77CAA}"/>
+                <a16:creationId xmlns:a16="http://schemas.microsoft.com/office/drawing/2014/main" xmlns="" id="{9B01C66F-73F1-43EB-9D43-A5E9E9C77CAA}"/>
               </a:ext>
             </a:extLst>
           </p:cNvPr>
@@ -21802,7 +23794,7 @@
           <p:cNvPr id="2050" name="Picture 2" descr="Resultado de imagen para open closed principle">
             <a:extLst>
               <a:ext uri="{FF2B5EF4-FFF2-40B4-BE49-F238E27FC236}">
-                <a16:creationId xmlns:a16="http://schemas.microsoft.com/office/drawing/2014/main" id="{13ACAE3B-6BD5-48F5-970E-AF0FE6DDFA4B}"/>
+                <a16:creationId xmlns:a16="http://schemas.microsoft.com/office/drawing/2014/main" xmlns="" id="{13ACAE3B-6BD5-48F5-970E-AF0FE6DDFA4B}"/>
               </a:ext>
             </a:extLst>
           </p:cNvPr>
@@ -21849,7 +23841,7 @@
           <p:cNvPr id="2" name="TextBox 1">
             <a:extLst>
               <a:ext uri="{FF2B5EF4-FFF2-40B4-BE49-F238E27FC236}">
-                <a16:creationId xmlns:a16="http://schemas.microsoft.com/office/drawing/2014/main" id="{EB6F497E-C107-4D0B-9004-068DCE2F00B0}"/>
+                <a16:creationId xmlns:a16="http://schemas.microsoft.com/office/drawing/2014/main" xmlns="" id="{EB6F497E-C107-4D0B-9004-068DCE2F00B0}"/>
               </a:ext>
             </a:extLst>
           </p:cNvPr>
@@ -22213,7 +24205,7 @@
           <p:cNvPr id="2050" name="Picture 2" descr="Resultado de imagen para open closed principle">
             <a:extLst>
               <a:ext uri="{FF2B5EF4-FFF2-40B4-BE49-F238E27FC236}">
-                <a16:creationId xmlns:a16="http://schemas.microsoft.com/office/drawing/2014/main" id="{13ACAE3B-6BD5-48F5-970E-AF0FE6DDFA4B}"/>
+                <a16:creationId xmlns:a16="http://schemas.microsoft.com/office/drawing/2014/main" xmlns="" id="{13ACAE3B-6BD5-48F5-970E-AF0FE6DDFA4B}"/>
               </a:ext>
             </a:extLst>
           </p:cNvPr>
@@ -22260,7 +24252,7 @@
           <p:cNvPr id="2" name="TextBox 1">
             <a:extLst>
               <a:ext uri="{FF2B5EF4-FFF2-40B4-BE49-F238E27FC236}">
-                <a16:creationId xmlns:a16="http://schemas.microsoft.com/office/drawing/2014/main" id="{EB6F497E-C107-4D0B-9004-068DCE2F00B0}"/>
+                <a16:creationId xmlns:a16="http://schemas.microsoft.com/office/drawing/2014/main" xmlns="" id="{EB6F497E-C107-4D0B-9004-068DCE2F00B0}"/>
               </a:ext>
             </a:extLst>
           </p:cNvPr>
@@ -22299,7 +24291,7 @@
           <p:cNvPr id="3074" name="Picture 2" descr="Resultado de imagen para sad face">
             <a:extLst>
               <a:ext uri="{FF2B5EF4-FFF2-40B4-BE49-F238E27FC236}">
-                <a16:creationId xmlns:a16="http://schemas.microsoft.com/office/drawing/2014/main" id="{451D32A6-F60D-4578-9B86-C9F1E6D50549}"/>
+                <a16:creationId xmlns:a16="http://schemas.microsoft.com/office/drawing/2014/main" xmlns="" id="{451D32A6-F60D-4578-9B86-C9F1E6D50549}"/>
               </a:ext>
             </a:extLst>
           </p:cNvPr>
@@ -22346,7 +24338,7 @@
           <p:cNvPr id="4" name="Thought Bubble: Cloud 3">
             <a:extLst>
               <a:ext uri="{FF2B5EF4-FFF2-40B4-BE49-F238E27FC236}">
-                <a16:creationId xmlns:a16="http://schemas.microsoft.com/office/drawing/2014/main" id="{A636B2C2-85B2-4916-8E29-C9DD0CC70452}"/>
+                <a16:creationId xmlns:a16="http://schemas.microsoft.com/office/drawing/2014/main" xmlns="" id="{A636B2C2-85B2-4916-8E29-C9DD0CC70452}"/>
               </a:ext>
             </a:extLst>
           </p:cNvPr>

</xml_diff>

<commit_message>
[InterfaceSegregation] Third requirement: Include changeWheels behavior,  fixed using IS
</commit_message>
<xml_diff>
--- a/SOLID/SOLID.pptx
+++ b/SOLID/SOLID.pptx
@@ -23483,10 +23483,10 @@
       </p:sp>
       <p:pic>
         <p:nvPicPr>
-          <p:cNvPr id="10" name="Picture 9">
+          <p:cNvPr id="2" name="Picture 1">
             <a:extLst>
               <a:ext uri="{FF2B5EF4-FFF2-40B4-BE49-F238E27FC236}">
-                <a16:creationId xmlns:a16="http://schemas.microsoft.com/office/drawing/2014/main" id="{3EABC14A-0FD6-4B2E-8669-206398EF003A}"/>
+                <a16:creationId xmlns:a16="http://schemas.microsoft.com/office/drawing/2014/main" id="{B09ADA4F-BA54-4B93-8E75-ADF4E40440CF}"/>
               </a:ext>
             </a:extLst>
           </p:cNvPr>
@@ -23503,8 +23503,8 @@
         </p:blipFill>
         <p:spPr>
           <a:xfrm>
-            <a:off x="876299" y="1493044"/>
-            <a:ext cx="7625076" cy="3269457"/>
+            <a:off x="1404258" y="1470555"/>
+            <a:ext cx="6615113" cy="3399433"/>
           </a:xfrm>
           <a:prstGeom prst="rect">
             <a:avLst/>

</xml_diff>

<commit_message>
[InterfaceSegregation] second requirement: include ship violation of IS
</commit_message>
<xml_diff>
--- a/SOLID/SOLID.pptx
+++ b/SOLID/SOLID.pptx
@@ -23483,10 +23483,10 @@
       </p:sp>
       <p:pic>
         <p:nvPicPr>
-          <p:cNvPr id="2" name="Picture 1">
+          <p:cNvPr id="10" name="Picture 9">
             <a:extLst>
               <a:ext uri="{FF2B5EF4-FFF2-40B4-BE49-F238E27FC236}">
-                <a16:creationId xmlns:a16="http://schemas.microsoft.com/office/drawing/2014/main" id="{B09ADA4F-BA54-4B93-8E75-ADF4E40440CF}"/>
+                <a16:creationId xmlns:a16="http://schemas.microsoft.com/office/drawing/2014/main" id="{3EABC14A-0FD6-4B2E-8669-206398EF003A}"/>
               </a:ext>
             </a:extLst>
           </p:cNvPr>
@@ -23503,8 +23503,8 @@
         </p:blipFill>
         <p:spPr>
           <a:xfrm>
-            <a:off x="1404258" y="1470555"/>
-            <a:ext cx="6615113" cy="3399433"/>
+            <a:off x="876299" y="1493044"/>
+            <a:ext cx="7625076" cy="3269457"/>
           </a:xfrm>
           <a:prstGeom prst="rect">
             <a:avLst/>

</xml_diff>

<commit_message>
Changes in the presentation for Interface Segregation Principle
</commit_message>
<xml_diff>
--- a/SOLID/SOLID.pptx
+++ b/SOLID/SOLID.pptx
@@ -33,39 +33,38 @@
     <p:sldId id="279" r:id="rId26"/>
     <p:sldId id="280" r:id="rId27"/>
     <p:sldId id="281" r:id="rId28"/>
-    <p:sldId id="282" r:id="rId29"/>
-    <p:sldId id="283" r:id="rId30"/>
-    <p:sldId id="284" r:id="rId31"/>
-    <p:sldId id="287" r:id="rId32"/>
-    <p:sldId id="289" r:id="rId33"/>
-    <p:sldId id="290" r:id="rId34"/>
-    <p:sldId id="291" r:id="rId35"/>
-    <p:sldId id="292" r:id="rId36"/>
+    <p:sldId id="283" r:id="rId29"/>
+    <p:sldId id="284" r:id="rId30"/>
+    <p:sldId id="287" r:id="rId31"/>
+    <p:sldId id="289" r:id="rId32"/>
+    <p:sldId id="290" r:id="rId33"/>
+    <p:sldId id="291" r:id="rId34"/>
+    <p:sldId id="292" r:id="rId35"/>
   </p:sldIdLst>
   <p:sldSz cx="9144000" cy="5143500" type="screen16x9"/>
   <p:notesSz cx="6858000" cy="9144000"/>
   <p:embeddedFontLst>
     <p:embeddedFont>
       <p:font typeface="Roboto Condensed" panose="02000000000000000000"/>
-      <p:regular r:id="rId40"/>
-      <p:bold r:id="rId41"/>
-      <p:italic r:id="rId42"/>
-      <p:boldItalic r:id="rId43"/>
+      <p:regular r:id="rId39"/>
+      <p:bold r:id="rId40"/>
+      <p:italic r:id="rId41"/>
+      <p:boldItalic r:id="rId42"/>
     </p:embeddedFont>
     <p:embeddedFont>
       <p:font typeface="Calibri" panose="020F0502020204030204"/>
-      <p:regular r:id="rId44"/>
+      <p:regular r:id="rId43"/>
     </p:embeddedFont>
     <p:embeddedFont>
       <p:font typeface="Montserrat" panose="00000500000000000000"/>
-      <p:regular r:id="rId45"/>
-      <p:bold r:id="rId46"/>
-      <p:italic r:id="rId47"/>
-      <p:boldItalic r:id="rId48"/>
+      <p:regular r:id="rId44"/>
+      <p:bold r:id="rId45"/>
+      <p:italic r:id="rId46"/>
+      <p:boldItalic r:id="rId47"/>
     </p:embeddedFont>
     <p:embeddedFont>
       <p:font typeface="Nunito Sans" panose="00000500000000000000"/>
-      <p:regular r:id="rId49"/>
+      <p:regular r:id="rId48"/>
     </p:embeddedFont>
   </p:embeddedFontLst>
   <p:defaultTextStyle>
@@ -297,6 +296,11 @@
       </a:defRPr>
     </a:lvl9pPr>
   </p:defaultTextStyle>
+  <p:extLst>
+    <p:ext uri="{505F2C04-C923-438B-8C0F-E0CD2BADF298}">
+      <wppc:fontMiss xmlns:wppc="http://www.wps.cn/officeDocument/PresentationCustomData" type="true"/>
+    </p:ext>
+  </p:extLst>
 </p:presentation>
 </file>
 
@@ -2702,6 +2706,110 @@
   <p:cSld>
     <p:spTree>
       <p:nvGrpSpPr>
+        <p:cNvPr id="1" name="Shape 107"/>
+        <p:cNvGrpSpPr/>
+        <p:nvPr/>
+      </p:nvGrpSpPr>
+      <p:grpSpPr>
+        <a:xfrm>
+          <a:off x="0" y="0"/>
+          <a:ext cx="0" cy="0"/>
+          <a:chOff x="0" y="0"/>
+          <a:chExt cx="0" cy="0"/>
+        </a:xfrm>
+      </p:grpSpPr>
+      <p:sp>
+        <p:nvSpPr>
+          <p:cNvPr id="108" name="Google Shape;108;g297a9bff03_0_66:notes"/>
+          <p:cNvSpPr>
+            <a:spLocks noGrp="1" noRot="1" noChangeAspect="1"/>
+          </p:cNvSpPr>
+          <p:nvPr>
+            <p:ph type="sldImg" idx="2"/>
+          </p:nvPr>
+        </p:nvSpPr>
+        <p:spPr>
+          <a:xfrm>
+            <a:off x="381000" y="685800"/>
+            <a:ext cx="6096000" cy="3429000"/>
+          </a:xfrm>
+          <a:custGeom>
+            <a:avLst/>
+            <a:gdLst/>
+            <a:ahLst/>
+            <a:cxnLst/>
+            <a:rect l="l" t="t" r="r" b="b"/>
+            <a:pathLst>
+              <a:path w="120000" h="120000" extrusionOk="0">
+                <a:moveTo>
+                  <a:pt x="0" y="0"/>
+                </a:moveTo>
+                <a:lnTo>
+                  <a:pt x="120000" y="0"/>
+                </a:lnTo>
+                <a:lnTo>
+                  <a:pt x="120000" y="120000"/>
+                </a:lnTo>
+                <a:lnTo>
+                  <a:pt x="0" y="120000"/>
+                </a:lnTo>
+                <a:close/>
+              </a:path>
+            </a:pathLst>
+          </a:custGeom>
+        </p:spPr>
+      </p:sp>
+      <p:sp>
+        <p:nvSpPr>
+          <p:cNvPr id="109" name="Google Shape;109;g297a9bff03_0_66:notes"/>
+          <p:cNvSpPr txBox="1">
+            <a:spLocks noGrp="1"/>
+          </p:cNvSpPr>
+          <p:nvPr>
+            <p:ph type="body" idx="1"/>
+          </p:nvPr>
+        </p:nvSpPr>
+        <p:spPr>
+          <a:xfrm>
+            <a:off x="685800" y="4343400"/>
+            <a:ext cx="5486400" cy="4114800"/>
+          </a:xfrm>
+          <a:prstGeom prst="rect">
+            <a:avLst/>
+          </a:prstGeom>
+        </p:spPr>
+        <p:txBody>
+          <a:bodyPr spcFirstLastPara="1" wrap="square" lIns="91425" tIns="91425" rIns="91425" bIns="91425" anchor="t" anchorCtr="0">
+            <a:noAutofit/>
+          </a:bodyPr>
+          <a:lstStyle/>
+          <a:p>
+            <a:pPr marL="0" lvl="0" indent="0" algn="l" rtl="0">
+              <a:spcBef>
+                <a:spcPts val="0"/>
+              </a:spcBef>
+              <a:spcAft>
+                <a:spcPts val="0"/>
+              </a:spcAft>
+              <a:buNone/>
+            </a:pPr>
+            <a:endParaRPr dirty="0"/>
+          </a:p>
+        </p:txBody>
+      </p:sp>
+    </p:spTree>
+  </p:cSld>
+  <p:clrMapOvr>
+    <a:masterClrMapping/>
+  </p:clrMapOvr>
+</p:notes>
+</file>
+
+<file path=ppt/notesSlides/notesSlide28.xml><?xml version="1.0" encoding="utf-8"?>
+<p:notes xmlns:a="http://schemas.openxmlformats.org/drawingml/2006/main" xmlns:r="http://schemas.openxmlformats.org/officeDocument/2006/relationships" xmlns:p="http://schemas.openxmlformats.org/presentationml/2006/main" showMasterPhAnim="0" showMasterSp="0">
+  <p:cSld>
+    <p:spTree>
+      <p:nvGrpSpPr>
         <p:cNvPr id="1" name="Shape 114"/>
         <p:cNvGrpSpPr/>
         <p:nvPr/>
@@ -2789,110 +2897,6 @@
               </a:spcAft>
               <a:buNone/>
             </a:pPr>
-          </a:p>
-        </p:txBody>
-      </p:sp>
-    </p:spTree>
-  </p:cSld>
-  <p:clrMapOvr>
-    <a:masterClrMapping/>
-  </p:clrMapOvr>
-</p:notes>
-</file>
-
-<file path=ppt/notesSlides/notesSlide28.xml><?xml version="1.0" encoding="utf-8"?>
-<p:notes xmlns:a="http://schemas.openxmlformats.org/drawingml/2006/main" xmlns:r="http://schemas.openxmlformats.org/officeDocument/2006/relationships" xmlns:p="http://schemas.openxmlformats.org/presentationml/2006/main" showMasterPhAnim="0" showMasterSp="0">
-  <p:cSld>
-    <p:spTree>
-      <p:nvGrpSpPr>
-        <p:cNvPr id="1" name="Shape 107"/>
-        <p:cNvGrpSpPr/>
-        <p:nvPr/>
-      </p:nvGrpSpPr>
-      <p:grpSpPr>
-        <a:xfrm>
-          <a:off x="0" y="0"/>
-          <a:ext cx="0" cy="0"/>
-          <a:chOff x="0" y="0"/>
-          <a:chExt cx="0" cy="0"/>
-        </a:xfrm>
-      </p:grpSpPr>
-      <p:sp>
-        <p:nvSpPr>
-          <p:cNvPr id="108" name="Google Shape;108;g297a9bff03_0_66:notes"/>
-          <p:cNvSpPr>
-            <a:spLocks noGrp="1" noRot="1" noChangeAspect="1"/>
-          </p:cNvSpPr>
-          <p:nvPr>
-            <p:ph type="sldImg" idx="2"/>
-          </p:nvPr>
-        </p:nvSpPr>
-        <p:spPr>
-          <a:xfrm>
-            <a:off x="381000" y="685800"/>
-            <a:ext cx="6096000" cy="3429000"/>
-          </a:xfrm>
-          <a:custGeom>
-            <a:avLst/>
-            <a:gdLst/>
-            <a:ahLst/>
-            <a:cxnLst/>
-            <a:rect l="l" t="t" r="r" b="b"/>
-            <a:pathLst>
-              <a:path w="120000" h="120000" extrusionOk="0">
-                <a:moveTo>
-                  <a:pt x="0" y="0"/>
-                </a:moveTo>
-                <a:lnTo>
-                  <a:pt x="120000" y="0"/>
-                </a:lnTo>
-                <a:lnTo>
-                  <a:pt x="120000" y="120000"/>
-                </a:lnTo>
-                <a:lnTo>
-                  <a:pt x="0" y="120000"/>
-                </a:lnTo>
-                <a:close/>
-              </a:path>
-            </a:pathLst>
-          </a:custGeom>
-        </p:spPr>
-      </p:sp>
-      <p:sp>
-        <p:nvSpPr>
-          <p:cNvPr id="109" name="Google Shape;109;g297a9bff03_0_66:notes"/>
-          <p:cNvSpPr txBox="1">
-            <a:spLocks noGrp="1"/>
-          </p:cNvSpPr>
-          <p:nvPr>
-            <p:ph type="body" idx="1"/>
-          </p:nvPr>
-        </p:nvSpPr>
-        <p:spPr>
-          <a:xfrm>
-            <a:off x="685800" y="4343400"/>
-            <a:ext cx="5486400" cy="4114800"/>
-          </a:xfrm>
-          <a:prstGeom prst="rect">
-            <a:avLst/>
-          </a:prstGeom>
-        </p:spPr>
-        <p:txBody>
-          <a:bodyPr spcFirstLastPara="1" wrap="square" lIns="91425" tIns="91425" rIns="91425" bIns="91425" anchor="t" anchorCtr="0">
-            <a:noAutofit/>
-          </a:bodyPr>
-          <a:lstStyle/>
-          <a:p>
-            <a:pPr marL="0" lvl="0" indent="0" algn="l" rtl="0">
-              <a:spcBef>
-                <a:spcPts val="0"/>
-              </a:spcBef>
-              <a:spcAft>
-                <a:spcPts val="0"/>
-              </a:spcAft>
-              <a:buNone/>
-            </a:pPr>
-            <a:endParaRPr dirty="0"/>
           </a:p>
         </p:txBody>
       </p:sp>
@@ -3214,109 +3218,6 @@
 </file>
 
 <file path=ppt/notesSlides/notesSlide31.xml><?xml version="1.0" encoding="utf-8"?>
-<p:notes xmlns:a="http://schemas.openxmlformats.org/drawingml/2006/main" xmlns:r="http://schemas.openxmlformats.org/officeDocument/2006/relationships" xmlns:p="http://schemas.openxmlformats.org/presentationml/2006/main" showMasterPhAnim="0" showMasterSp="0">
-  <p:cSld>
-    <p:spTree>
-      <p:nvGrpSpPr>
-        <p:cNvPr id="1" name="Shape 114"/>
-        <p:cNvGrpSpPr/>
-        <p:nvPr/>
-      </p:nvGrpSpPr>
-      <p:grpSpPr>
-        <a:xfrm>
-          <a:off x="0" y="0"/>
-          <a:ext cx="0" cy="0"/>
-          <a:chOff x="0" y="0"/>
-          <a:chExt cx="0" cy="0"/>
-        </a:xfrm>
-      </p:grpSpPr>
-      <p:sp>
-        <p:nvSpPr>
-          <p:cNvPr id="115" name="Google Shape;115;g297a9bff03_0_0:notes"/>
-          <p:cNvSpPr>
-            <a:spLocks noGrp="1" noRot="1" noChangeAspect="1"/>
-          </p:cNvSpPr>
-          <p:nvPr>
-            <p:ph type="sldImg" idx="2"/>
-          </p:nvPr>
-        </p:nvSpPr>
-        <p:spPr>
-          <a:xfrm>
-            <a:off x="381000" y="685800"/>
-            <a:ext cx="6096000" cy="3429000"/>
-          </a:xfrm>
-          <a:custGeom>
-            <a:avLst/>
-            <a:gdLst/>
-            <a:ahLst/>
-            <a:cxnLst/>
-            <a:rect l="l" t="t" r="r" b="b"/>
-            <a:pathLst>
-              <a:path w="120000" h="120000" extrusionOk="0">
-                <a:moveTo>
-                  <a:pt x="0" y="0"/>
-                </a:moveTo>
-                <a:lnTo>
-                  <a:pt x="120000" y="0"/>
-                </a:lnTo>
-                <a:lnTo>
-                  <a:pt x="120000" y="120000"/>
-                </a:lnTo>
-                <a:lnTo>
-                  <a:pt x="0" y="120000"/>
-                </a:lnTo>
-                <a:close/>
-              </a:path>
-            </a:pathLst>
-          </a:custGeom>
-        </p:spPr>
-      </p:sp>
-      <p:sp>
-        <p:nvSpPr>
-          <p:cNvPr id="116" name="Google Shape;116;g297a9bff03_0_0:notes"/>
-          <p:cNvSpPr txBox="1">
-            <a:spLocks noGrp="1"/>
-          </p:cNvSpPr>
-          <p:nvPr>
-            <p:ph type="body" idx="1"/>
-          </p:nvPr>
-        </p:nvSpPr>
-        <p:spPr>
-          <a:xfrm>
-            <a:off x="685800" y="4343400"/>
-            <a:ext cx="5486400" cy="4114800"/>
-          </a:xfrm>
-          <a:prstGeom prst="rect">
-            <a:avLst/>
-          </a:prstGeom>
-        </p:spPr>
-        <p:txBody>
-          <a:bodyPr spcFirstLastPara="1" wrap="square" lIns="91425" tIns="91425" rIns="91425" bIns="91425" anchor="t" anchorCtr="0">
-            <a:noAutofit/>
-          </a:bodyPr>
-          <a:lstStyle/>
-          <a:p>
-            <a:pPr marL="0" lvl="0" indent="0" algn="l" rtl="0">
-              <a:spcBef>
-                <a:spcPts val="0"/>
-              </a:spcBef>
-              <a:spcAft>
-                <a:spcPts val="0"/>
-              </a:spcAft>
-              <a:buNone/>
-            </a:pPr>
-          </a:p>
-        </p:txBody>
-      </p:sp>
-    </p:spTree>
-  </p:cSld>
-  <p:clrMapOvr>
-    <a:masterClrMapping/>
-  </p:clrMapOvr>
-</p:notes>
-</file>
-
-<file path=ppt/notesSlides/notesSlide32.xml><?xml version="1.0" encoding="utf-8"?>
 <p:notes xmlns:a="http://schemas.openxmlformats.org/drawingml/2006/main" xmlns:r="http://schemas.openxmlformats.org/officeDocument/2006/relationships" xmlns:p="http://schemas.openxmlformats.org/presentationml/2006/main" showMasterPhAnim="0" showMasterSp="0">
   <p:cSld>
     <p:spTree>
@@ -21614,7 +21515,55 @@
                 <a:cs typeface="Droid Sans"/>
                 <a:sym typeface="Droid Sans"/>
               </a:rPr>
-              <a:t>Interface Segregai </a:t>
+              <a:t>Interface Segrega</a:t>
+            </a:r>
+            <a:r>
+              <a:rPr lang="es-CO" altLang="en-US" sz="3400">
+                <a:solidFill>
+                  <a:srgbClr val="96B51A"/>
+                </a:solidFill>
+                <a:latin typeface="Droid Sans"/>
+                <a:ea typeface="Droid Sans"/>
+                <a:cs typeface="Droid Sans"/>
+                <a:sym typeface="Droid Sans"/>
+              </a:rPr>
+              <a:t>t</a:t>
+            </a:r>
+            <a:r>
+              <a:rPr lang="en-US" sz="3400">
+                <a:solidFill>
+                  <a:srgbClr val="96B51A"/>
+                </a:solidFill>
+                <a:latin typeface="Droid Sans"/>
+                <a:ea typeface="Droid Sans"/>
+                <a:cs typeface="Droid Sans"/>
+                <a:sym typeface="Droid Sans"/>
+              </a:rPr>
+              <a:t>i</a:t>
+            </a:r>
+            <a:r>
+              <a:rPr lang="es-CO" altLang="en-US" sz="3400">
+                <a:solidFill>
+                  <a:srgbClr val="96B51A"/>
+                </a:solidFill>
+                <a:latin typeface="Droid Sans"/>
+                <a:ea typeface="Droid Sans"/>
+                <a:cs typeface="Droid Sans"/>
+                <a:sym typeface="Droid Sans"/>
+              </a:rPr>
+              <a:t>on</a:t>
+            </a:r>
+            <a:r>
+              <a:rPr lang="en-US" sz="3400">
+                <a:solidFill>
+                  <a:srgbClr val="96B51A"/>
+                </a:solidFill>
+                <a:latin typeface="Droid Sans"/>
+                <a:ea typeface="Droid Sans"/>
+                <a:cs typeface="Droid Sans"/>
+                <a:sym typeface="Droid Sans"/>
+              </a:rPr>
+              <a:t> </a:t>
             </a:r>
             <a:r>
               <a:rPr lang="en-US" sz="3400" dirty="0">
@@ -21705,20 +21654,12 @@
               <a:buSzPts val="1300"/>
             </a:pPr>
             <a:r>
-              <a:rPr lang="en-US" dirty="0">
+              <a:rPr lang="es-CO" altLang="en-US" dirty="0">
                 <a:solidFill>
                   <a:schemeClr val="bg1"/>
                 </a:solidFill>
               </a:rPr>
-              <a:t>The </a:t>
-            </a:r>
-            <a:r>
-              <a:rPr lang="en-US" b="1" dirty="0">
-                <a:solidFill>
-                  <a:schemeClr val="bg1"/>
-                </a:solidFill>
-              </a:rPr>
-              <a:t>interface-segregation principle</a:t>
+              <a:t>A class </a:t>
             </a:r>
             <a:r>
               <a:rPr lang="en-US" dirty="0">
@@ -21726,15 +21667,15 @@
                   <a:schemeClr val="bg1"/>
                 </a:solidFill>
               </a:rPr>
-              <a:t> (</a:t>
+              <a:t>should </a:t>
             </a:r>
             <a:r>
-              <a:rPr lang="en-US" b="1" dirty="0">
+              <a:rPr lang="es-CO" altLang="en-US" dirty="0">
                 <a:solidFill>
                   <a:schemeClr val="bg1"/>
                 </a:solidFill>
               </a:rPr>
-              <a:t>ISP</a:t>
+              <a:t>not </a:t>
             </a:r>
             <a:r>
               <a:rPr lang="en-US" dirty="0">
@@ -21742,7 +21683,7 @@
                   <a:schemeClr val="bg1"/>
                 </a:solidFill>
               </a:rPr>
-              <a:t>) states that no client should be forced to depend on methods it does not use.</a:t>
+              <a:t>be forced to depend on methods it does not use.</a:t>
             </a:r>
             <a:endParaRPr lang="en-US" dirty="0">
               <a:solidFill>
@@ -21786,7 +21727,7 @@
               <a:buChar char="-"/>
             </a:pPr>
             <a:r>
-              <a:rPr lang="en-US" b="1" dirty="0">
+              <a:rPr lang="en-US" dirty="0">
                 <a:solidFill>
                   <a:schemeClr val="bg1"/>
                 </a:solidFill>
@@ -21863,7 +21804,23 @@
                   <a:schemeClr val="bg1"/>
                 </a:solidFill>
               </a:rPr>
-              <a:t>It’s important  to kwon the business domain </a:t>
+              <a:t>It’s important  to </a:t>
+            </a:r>
+            <a:r>
+              <a:rPr lang="es-CO" altLang="en-US" dirty="0">
+                <a:solidFill>
+                  <a:schemeClr val="bg1"/>
+                </a:solidFill>
+              </a:rPr>
+              <a:t>know</a:t>
+            </a:r>
+            <a:r>
+              <a:rPr lang="en-US" dirty="0">
+                <a:solidFill>
+                  <a:schemeClr val="bg1"/>
+                </a:solidFill>
+              </a:rPr>
+              <a:t> the business domain </a:t>
             </a:r>
             <a:endParaRPr lang="en-US" dirty="0">
               <a:solidFill>
@@ -22104,7 +22061,7 @@
       </p:sp>
       <p:pic>
         <p:nvPicPr>
-          <p:cNvPr id="6" name="Picture 4" descr="Resultado de imagen para sad emoji"/>
+          <p:cNvPr id="7" name="Picture 2" descr="Image result for interface segregation principle"/>
           <p:cNvPicPr>
             <a:picLocks noChangeAspect="1" noChangeArrowheads="1"/>
           </p:cNvPicPr>
@@ -22125,48 +22082,7 @@
         </p:blipFill>
         <p:spPr bwMode="auto">
           <a:xfrm>
-            <a:off x="3290478" y="3710085"/>
-            <a:ext cx="1085072" cy="1085072"/>
-          </a:xfrm>
-          <a:prstGeom prst="rect">
-            <a:avLst/>
-          </a:prstGeom>
-          <a:noFill/>
-          <a:extLst>
-            <a:ext uri="{909E8E84-426E-40DD-AFC4-6F175D3DCCD1}">
-              <a14:hiddenFill xmlns:a14="http://schemas.microsoft.com/office/drawing/2010/main">
-                <a:solidFill>
-                  <a:srgbClr val="FFFFFF"/>
-                </a:solidFill>
-              </a14:hiddenFill>
-            </a:ext>
-          </a:extLst>
-        </p:spPr>
-      </p:pic>
-      <p:pic>
-        <p:nvPicPr>
-          <p:cNvPr id="7" name="Picture 2" descr="Image result for interface segregation principle"/>
-          <p:cNvPicPr>
-            <a:picLocks noChangeAspect="1" noChangeArrowheads="1"/>
-          </p:cNvPicPr>
-          <p:nvPr/>
-        </p:nvPicPr>
-        <p:blipFill>
-          <a:blip r:embed="rId2">
-            <a:extLst>
-              <a:ext uri="{28A0092B-C50C-407E-A947-70E740481C1C}">
-                <a14:useLocalDpi xmlns:a14="http://schemas.microsoft.com/office/drawing/2010/main" val="0"/>
-              </a:ext>
-            </a:extLst>
-          </a:blip>
-          <a:srcRect/>
-          <a:stretch>
-            <a:fillRect/>
-          </a:stretch>
-        </p:blipFill>
-        <p:spPr bwMode="auto">
-          <a:xfrm>
-            <a:off x="4702629" y="755586"/>
+            <a:off x="4707709" y="755586"/>
             <a:ext cx="4241348" cy="4241348"/>
           </a:xfrm>
           <a:prstGeom prst="rect">
@@ -22725,7 +22641,7 @@
       </p:sp>
       <p:sp>
         <p:nvSpPr>
-          <p:cNvPr id="7" name="Google Shape;118;p28"/>
+          <p:cNvPr id="8" name="Google Shape;118;p28"/>
           <p:cNvSpPr txBox="1"/>
           <p:nvPr/>
         </p:nvSpPr>
@@ -22804,7 +22720,7 @@
       </p:sp>
       <p:pic>
         <p:nvPicPr>
-          <p:cNvPr id="10" name="Picture 9"/>
+          <p:cNvPr id="9" name="Picture 8"/>
           <p:cNvPicPr>
             <a:picLocks noChangeAspect="1"/>
           </p:cNvPicPr>
@@ -22818,8 +22734,8 @@
         </p:blipFill>
         <p:spPr>
           <a:xfrm>
-            <a:off x="1860946" y="2162174"/>
-            <a:ext cx="5400675" cy="1933575"/>
+            <a:off x="1357313" y="1773345"/>
+            <a:ext cx="6112669" cy="2819576"/>
           </a:xfrm>
           <a:prstGeom prst="rect">
             <a:avLst/>
@@ -23065,346 +22981,6 @@
       </p:sp>
       <p:sp>
         <p:nvSpPr>
-          <p:cNvPr id="8" name="Google Shape;118;p28"/>
-          <p:cNvSpPr txBox="1"/>
-          <p:nvPr/>
-        </p:nvSpPr>
-        <p:spPr>
-          <a:xfrm>
-            <a:off x="250028" y="910325"/>
-            <a:ext cx="8679665" cy="3959663"/>
-          </a:xfrm>
-          <a:prstGeom prst="rect">
-            <a:avLst/>
-          </a:prstGeom>
-          <a:noFill/>
-          <a:ln>
-            <a:noFill/>
-          </a:ln>
-        </p:spPr>
-        <p:txBody>
-          <a:bodyPr spcFirstLastPara="1" wrap="square" lIns="91425" tIns="91425" rIns="91425" bIns="91425" anchor="t" anchorCtr="0">
-            <a:noAutofit/>
-          </a:bodyPr>
-          <a:lstStyle/>
-          <a:p>
-            <a:pPr marL="146050" lvl="0" algn="just">
-              <a:buClr>
-                <a:srgbClr val="FFFFFF"/>
-              </a:buClr>
-              <a:buSzPts val="1300"/>
-            </a:pPr>
-            <a:r>
-              <a:rPr lang="en-US" dirty="0">
-                <a:solidFill>
-                  <a:schemeClr val="bg1"/>
-                </a:solidFill>
-              </a:rPr>
-              <a:t>“</a:t>
-            </a:r>
-            <a:r>
-              <a:rPr lang="en-US" b="1" dirty="0">
-                <a:solidFill>
-                  <a:schemeClr val="bg1"/>
-                </a:solidFill>
-              </a:rPr>
-              <a:t>Do really</a:t>
-            </a:r>
-            <a:r>
-              <a:rPr lang="en-US" dirty="0">
-                <a:solidFill>
-                  <a:schemeClr val="bg1"/>
-                </a:solidFill>
-              </a:rPr>
-              <a:t> </a:t>
-            </a:r>
-            <a:r>
-              <a:rPr lang="en-US" b="1" i="1" dirty="0">
-                <a:solidFill>
-                  <a:schemeClr val="bg1"/>
-                </a:solidFill>
-              </a:rPr>
-              <a:t>need all the methods on this interface I’m using? If not, how can I break them into smaller interfaces?</a:t>
-            </a:r>
-            <a:r>
-              <a:rPr lang="en-US" dirty="0">
-                <a:solidFill>
-                  <a:schemeClr val="bg1"/>
-                </a:solidFill>
-              </a:rPr>
-              <a:t>”.</a:t>
-            </a:r>
-            <a:endParaRPr lang="en-US" b="1" dirty="0">
-              <a:solidFill>
-                <a:schemeClr val="bg1"/>
-              </a:solidFill>
-            </a:endParaRPr>
-          </a:p>
-        </p:txBody>
-      </p:sp>
-      <p:pic>
-        <p:nvPicPr>
-          <p:cNvPr id="9" name="Picture 8"/>
-          <p:cNvPicPr>
-            <a:picLocks noChangeAspect="1"/>
-          </p:cNvPicPr>
-          <p:nvPr/>
-        </p:nvPicPr>
-        <p:blipFill>
-          <a:blip r:embed="rId1"/>
-          <a:stretch>
-            <a:fillRect/>
-          </a:stretch>
-        </p:blipFill>
-        <p:spPr>
-          <a:xfrm>
-            <a:off x="1357313" y="1773345"/>
-            <a:ext cx="6112669" cy="2819576"/>
-          </a:xfrm>
-          <a:prstGeom prst="rect">
-            <a:avLst/>
-          </a:prstGeom>
-        </p:spPr>
-      </p:pic>
-    </p:spTree>
-  </p:cSld>
-  <p:clrMapOvr>
-    <a:masterClrMapping/>
-  </p:clrMapOvr>
-</p:sld>
-</file>
-
-<file path=ppt/slides/slide27.xml><?xml version="1.0" encoding="utf-8"?>
-<p:sld xmlns:a="http://schemas.openxmlformats.org/drawingml/2006/main" xmlns:r="http://schemas.openxmlformats.org/officeDocument/2006/relationships" xmlns:p="http://schemas.openxmlformats.org/presentationml/2006/main">
-  <p:cSld>
-    <p:bg>
-      <p:bgPr>
-        <a:solidFill>
-          <a:srgbClr val="000000"/>
-        </a:solidFill>
-        <a:effectLst/>
-      </p:bgPr>
-    </p:bg>
-    <p:spTree>
-      <p:nvGrpSpPr>
-        <p:cNvPr id="1" name="Shape 117"/>
-        <p:cNvGrpSpPr/>
-        <p:nvPr/>
-      </p:nvGrpSpPr>
-      <p:grpSpPr>
-        <a:xfrm>
-          <a:off x="0" y="0"/>
-          <a:ext cx="0" cy="0"/>
-          <a:chOff x="0" y="0"/>
-          <a:chExt cx="0" cy="0"/>
-        </a:xfrm>
-      </p:grpSpPr>
-      <p:sp>
-        <p:nvSpPr>
-          <p:cNvPr id="118" name="Google Shape;118;p28"/>
-          <p:cNvSpPr txBox="1"/>
-          <p:nvPr/>
-        </p:nvSpPr>
-        <p:spPr>
-          <a:xfrm>
-            <a:off x="437806" y="504631"/>
-            <a:ext cx="4086231" cy="3959663"/>
-          </a:xfrm>
-          <a:prstGeom prst="rect">
-            <a:avLst/>
-          </a:prstGeom>
-          <a:noFill/>
-          <a:ln>
-            <a:noFill/>
-          </a:ln>
-        </p:spPr>
-        <p:txBody>
-          <a:bodyPr spcFirstLastPara="1" wrap="square" lIns="91425" tIns="91425" rIns="91425" bIns="91425" anchor="t" anchorCtr="0">
-            <a:noAutofit/>
-          </a:bodyPr>
-          <a:lstStyle/>
-          <a:p>
-            <a:pPr marL="146050" lvl="0" algn="just">
-              <a:buClr>
-                <a:srgbClr val="FFFFFF"/>
-              </a:buClr>
-              <a:buSzPts val="1300"/>
-            </a:pPr>
-            <a:endParaRPr lang="en-US" b="1" dirty="0">
-              <a:solidFill>
-                <a:schemeClr val="bg1"/>
-              </a:solidFill>
-            </a:endParaRPr>
-          </a:p>
-        </p:txBody>
-      </p:sp>
-      <p:sp>
-        <p:nvSpPr>
-          <p:cNvPr id="119" name="Google Shape;119;p28"/>
-          <p:cNvSpPr txBox="1"/>
-          <p:nvPr/>
-        </p:nvSpPr>
-        <p:spPr>
-          <a:xfrm>
-            <a:off x="0" y="185106"/>
-            <a:ext cx="9122569" cy="639051"/>
-          </a:xfrm>
-          <a:prstGeom prst="rect">
-            <a:avLst/>
-          </a:prstGeom>
-          <a:noFill/>
-          <a:ln>
-            <a:noFill/>
-          </a:ln>
-        </p:spPr>
-        <p:txBody>
-          <a:bodyPr spcFirstLastPara="1" wrap="square" lIns="91425" tIns="91425" rIns="91425" bIns="91425" anchor="t" anchorCtr="0">
-            <a:noAutofit/>
-          </a:bodyPr>
-          <a:lstStyle/>
-          <a:p>
-            <a:pPr lvl="0" algn="ctr">
-              <a:buClr>
-                <a:schemeClr val="dk1"/>
-              </a:buClr>
-              <a:buSzPts val="1100"/>
-            </a:pPr>
-            <a:r>
-              <a:rPr lang="es-CO" sz="3200" b="1" dirty="0">
-                <a:solidFill>
-                  <a:schemeClr val="lt1"/>
-                </a:solidFill>
-                <a:effectLst>
-                  <a:outerShdw blurRad="38100" dist="38100" dir="2700000" algn="tl">
-                    <a:srgbClr val="000000">
-                      <a:alpha val="43137"/>
-                    </a:srgbClr>
-                  </a:outerShdw>
-                </a:effectLst>
-                <a:latin typeface="Montserrat" panose="00000500000000000000"/>
-                <a:ea typeface="Montserrat" panose="00000500000000000000"/>
-                <a:cs typeface="Montserrat" panose="00000500000000000000"/>
-                <a:sym typeface="Montserrat" panose="00000500000000000000"/>
-              </a:rPr>
-              <a:t>Interface </a:t>
-            </a:r>
-            <a:r>
-              <a:rPr lang="es-CO" sz="3200" b="1" dirty="0" err="1">
-                <a:solidFill>
-                  <a:schemeClr val="lt1"/>
-                </a:solidFill>
-                <a:effectLst>
-                  <a:outerShdw blurRad="38100" dist="38100" dir="2700000" algn="tl">
-                    <a:srgbClr val="000000">
-                      <a:alpha val="43137"/>
-                    </a:srgbClr>
-                  </a:outerShdw>
-                </a:effectLst>
-                <a:latin typeface="Montserrat" panose="00000500000000000000"/>
-                <a:ea typeface="Montserrat" panose="00000500000000000000"/>
-                <a:cs typeface="Montserrat" panose="00000500000000000000"/>
-                <a:sym typeface="Montserrat" panose="00000500000000000000"/>
-              </a:rPr>
-              <a:t>Segregation</a:t>
-            </a:r>
-            <a:r>
-              <a:rPr lang="es-CO" sz="3200" b="1" dirty="0">
-                <a:solidFill>
-                  <a:schemeClr val="lt1"/>
-                </a:solidFill>
-                <a:effectLst>
-                  <a:outerShdw blurRad="38100" dist="38100" dir="2700000" algn="tl">
-                    <a:srgbClr val="000000">
-                      <a:alpha val="43137"/>
-                    </a:srgbClr>
-                  </a:outerShdw>
-                </a:effectLst>
-                <a:latin typeface="Montserrat" panose="00000500000000000000"/>
-                <a:ea typeface="Montserrat" panose="00000500000000000000"/>
-                <a:cs typeface="Montserrat" panose="00000500000000000000"/>
-                <a:sym typeface="Montserrat" panose="00000500000000000000"/>
-              </a:rPr>
-              <a:t> </a:t>
-            </a:r>
-            <a:r>
-              <a:rPr lang="es-CO" sz="3200" b="1" dirty="0" err="1">
-                <a:solidFill>
-                  <a:schemeClr val="lt1"/>
-                </a:solidFill>
-                <a:effectLst>
-                  <a:outerShdw blurRad="38100" dist="38100" dir="2700000" algn="tl">
-                    <a:srgbClr val="000000">
-                      <a:alpha val="43137"/>
-                    </a:srgbClr>
-                  </a:outerShdw>
-                </a:effectLst>
-                <a:latin typeface="Montserrat" panose="00000500000000000000"/>
-                <a:ea typeface="Montserrat" panose="00000500000000000000"/>
-                <a:cs typeface="Montserrat" panose="00000500000000000000"/>
-                <a:sym typeface="Montserrat" panose="00000500000000000000"/>
-              </a:rPr>
-              <a:t>Principle</a:t>
-            </a:r>
-            <a:endParaRPr lang="es-CO" sz="2000" b="1" dirty="0">
-              <a:solidFill>
-                <a:srgbClr val="C1D82F"/>
-              </a:solidFill>
-              <a:effectLst>
-                <a:outerShdw blurRad="38100" dist="38100" dir="2700000" algn="tl">
-                  <a:srgbClr val="000000">
-                    <a:alpha val="43137"/>
-                  </a:srgbClr>
-                </a:outerShdw>
-              </a:effectLst>
-              <a:latin typeface="Montserrat" panose="00000500000000000000"/>
-              <a:ea typeface="Montserrat" panose="00000500000000000000"/>
-              <a:cs typeface="Montserrat" panose="00000500000000000000"/>
-              <a:sym typeface="Montserrat" panose="00000500000000000000"/>
-            </a:endParaRPr>
-          </a:p>
-        </p:txBody>
-      </p:sp>
-      <p:sp>
-        <p:nvSpPr>
-          <p:cNvPr id="120" name="Google Shape;120;p28"/>
-          <p:cNvSpPr/>
-          <p:nvPr/>
-        </p:nvSpPr>
-        <p:spPr>
-          <a:xfrm>
-            <a:off x="-5" y="5118630"/>
-            <a:ext cx="9144000" cy="33600"/>
-          </a:xfrm>
-          <a:prstGeom prst="rect">
-            <a:avLst/>
-          </a:prstGeom>
-          <a:solidFill>
-            <a:srgbClr val="C1D82F"/>
-          </a:solidFill>
-          <a:ln>
-            <a:noFill/>
-          </a:ln>
-        </p:spPr>
-        <p:txBody>
-          <a:bodyPr spcFirstLastPara="1" wrap="square" lIns="91425" tIns="91425" rIns="91425" bIns="91425" anchor="ctr" anchorCtr="0">
-            <a:noAutofit/>
-          </a:bodyPr>
-          <a:lstStyle/>
-          <a:p>
-            <a:pPr marL="0" lvl="0" indent="0" algn="l" rtl="0">
-              <a:spcBef>
-                <a:spcPts val="0"/>
-              </a:spcBef>
-              <a:spcAft>
-                <a:spcPts val="0"/>
-              </a:spcAft>
-              <a:buNone/>
-            </a:pPr>
-          </a:p>
-        </p:txBody>
-      </p:sp>
-      <p:sp>
-        <p:nvSpPr>
           <p:cNvPr id="7" name="Google Shape;118;p28"/>
           <p:cNvSpPr txBox="1"/>
           <p:nvPr/>
@@ -23514,7 +23090,7 @@
 </p:sld>
 </file>
 
-<file path=ppt/slides/slide28.xml><?xml version="1.0" encoding="utf-8"?>
+<file path=ppt/slides/slide27.xml><?xml version="1.0" encoding="utf-8"?>
 <p:sld xmlns:a="http://schemas.openxmlformats.org/drawingml/2006/main" xmlns:r="http://schemas.openxmlformats.org/officeDocument/2006/relationships" xmlns:p="http://schemas.openxmlformats.org/presentationml/2006/main">
   <p:cSld>
     <p:spTree>
@@ -23663,7 +23239,7 @@
 </p:sld>
 </file>
 
-<file path=ppt/slides/slide29.xml><?xml version="1.0" encoding="utf-8"?>
+<file path=ppt/slides/slide28.xml><?xml version="1.0" encoding="utf-8"?>
 <p:sld xmlns:a="http://schemas.openxmlformats.org/drawingml/2006/main" xmlns:r="http://schemas.openxmlformats.org/officeDocument/2006/relationships" xmlns:p="http://schemas.openxmlformats.org/presentationml/2006/main">
   <p:cSld>
     <p:bg>
@@ -24045,6 +23621,292 @@
           </a:prstGeom>
         </p:spPr>
       </p:pic>
+    </p:spTree>
+  </p:cSld>
+  <p:clrMapOvr>
+    <a:masterClrMapping/>
+  </p:clrMapOvr>
+</p:sld>
+</file>
+
+<file path=ppt/slides/slide29.xml><?xml version="1.0" encoding="utf-8"?>
+<p:sld xmlns:a="http://schemas.openxmlformats.org/drawingml/2006/main" xmlns:r="http://schemas.openxmlformats.org/officeDocument/2006/relationships" xmlns:p="http://schemas.openxmlformats.org/presentationml/2006/main">
+  <p:cSld>
+    <p:bg>
+      <p:bgPr>
+        <a:solidFill>
+          <a:srgbClr val="000000"/>
+        </a:solidFill>
+        <a:effectLst/>
+      </p:bgPr>
+    </p:bg>
+    <p:spTree>
+      <p:nvGrpSpPr>
+        <p:cNvPr id="1" name="Shape 117"/>
+        <p:cNvGrpSpPr/>
+        <p:nvPr/>
+      </p:nvGrpSpPr>
+      <p:grpSpPr>
+        <a:xfrm>
+          <a:off x="0" y="0"/>
+          <a:ext cx="0" cy="0"/>
+          <a:chOff x="0" y="0"/>
+          <a:chExt cx="0" cy="0"/>
+        </a:xfrm>
+      </p:grpSpPr>
+      <p:sp>
+        <p:nvSpPr>
+          <p:cNvPr id="119" name="Google Shape;119;p28"/>
+          <p:cNvSpPr txBox="1"/>
+          <p:nvPr/>
+        </p:nvSpPr>
+        <p:spPr>
+          <a:xfrm>
+            <a:off x="0" y="185106"/>
+            <a:ext cx="9122569" cy="639051"/>
+          </a:xfrm>
+          <a:prstGeom prst="rect">
+            <a:avLst/>
+          </a:prstGeom>
+          <a:noFill/>
+          <a:ln>
+            <a:noFill/>
+          </a:ln>
+        </p:spPr>
+        <p:txBody>
+          <a:bodyPr spcFirstLastPara="1" wrap="square" lIns="91425" tIns="91425" rIns="91425" bIns="91425" anchor="t" anchorCtr="0">
+            <a:noAutofit/>
+          </a:bodyPr>
+          <a:lstStyle/>
+          <a:p>
+            <a:pPr lvl="0" algn="ctr">
+              <a:buClr>
+                <a:schemeClr val="dk1"/>
+              </a:buClr>
+              <a:buSzPts val="1100"/>
+            </a:pPr>
+            <a:r>
+              <a:rPr lang="es-CO" sz="2000" b="1" dirty="0">
+                <a:solidFill>
+                  <a:srgbClr val="C1D82F"/>
+                </a:solidFill>
+                <a:effectLst>
+                  <a:outerShdw blurRad="38100" dist="38100" dir="2700000" algn="tl">
+                    <a:srgbClr val="000000">
+                      <a:alpha val="43137"/>
+                    </a:srgbClr>
+                  </a:outerShdw>
+                </a:effectLst>
+                <a:latin typeface="Montserrat" panose="00000500000000000000"/>
+                <a:ea typeface="Montserrat" panose="00000500000000000000"/>
+                <a:cs typeface="Montserrat" panose="00000500000000000000"/>
+                <a:sym typeface="Montserrat" panose="00000500000000000000"/>
+              </a:rPr>
+              <a:t>Normal Implementation (Not good)</a:t>
+            </a:r>
+            <a:endParaRPr lang="es-CO" sz="2000" b="1" dirty="0">
+              <a:solidFill>
+                <a:srgbClr val="C1D82F"/>
+              </a:solidFill>
+              <a:effectLst>
+                <a:outerShdw blurRad="38100" dist="38100" dir="2700000" algn="tl">
+                  <a:srgbClr val="000000">
+                    <a:alpha val="43137"/>
+                  </a:srgbClr>
+                </a:outerShdw>
+              </a:effectLst>
+              <a:latin typeface="Montserrat" panose="00000500000000000000"/>
+              <a:ea typeface="Montserrat" panose="00000500000000000000"/>
+              <a:cs typeface="Montserrat" panose="00000500000000000000"/>
+              <a:sym typeface="Montserrat" panose="00000500000000000000"/>
+            </a:endParaRPr>
+          </a:p>
+        </p:txBody>
+      </p:sp>
+      <p:sp>
+        <p:nvSpPr>
+          <p:cNvPr id="120" name="Google Shape;120;p28"/>
+          <p:cNvSpPr/>
+          <p:nvPr/>
+        </p:nvSpPr>
+        <p:spPr>
+          <a:xfrm>
+            <a:off x="-5" y="5118630"/>
+            <a:ext cx="9144000" cy="33600"/>
+          </a:xfrm>
+          <a:prstGeom prst="rect">
+            <a:avLst/>
+          </a:prstGeom>
+          <a:solidFill>
+            <a:srgbClr val="C1D82F"/>
+          </a:solidFill>
+          <a:ln>
+            <a:noFill/>
+          </a:ln>
+        </p:spPr>
+        <p:txBody>
+          <a:bodyPr spcFirstLastPara="1" wrap="square" lIns="91425" tIns="91425" rIns="91425" bIns="91425" anchor="ctr" anchorCtr="0">
+            <a:noAutofit/>
+          </a:bodyPr>
+          <a:lstStyle/>
+          <a:p>
+            <a:pPr marL="0" lvl="0" indent="0" algn="l" rtl="0">
+              <a:spcBef>
+                <a:spcPts val="0"/>
+              </a:spcBef>
+              <a:spcAft>
+                <a:spcPts val="0"/>
+              </a:spcAft>
+              <a:buNone/>
+            </a:pPr>
+          </a:p>
+        </p:txBody>
+      </p:sp>
+      <p:pic>
+        <p:nvPicPr>
+          <p:cNvPr id="4" name="Picture 3"/>
+          <p:cNvPicPr>
+            <a:picLocks noChangeAspect="1"/>
+          </p:cNvPicPr>
+          <p:nvPr/>
+        </p:nvPicPr>
+        <p:blipFill>
+          <a:blip r:embed="rId1"/>
+          <a:srcRect b="34637"/>
+          <a:stretch>
+            <a:fillRect/>
+          </a:stretch>
+        </p:blipFill>
+        <p:spPr>
+          <a:xfrm>
+            <a:off x="2641600" y="824230"/>
+            <a:ext cx="6092825" cy="1743075"/>
+          </a:xfrm>
+          <a:prstGeom prst="rect">
+            <a:avLst/>
+          </a:prstGeom>
+        </p:spPr>
+      </p:pic>
+      <p:sp>
+        <p:nvSpPr>
+          <p:cNvPr id="5" name="Google Shape;118;p28"/>
+          <p:cNvSpPr txBox="1"/>
+          <p:nvPr/>
+        </p:nvSpPr>
+        <p:spPr>
+          <a:xfrm>
+            <a:off x="357505" y="2450465"/>
+            <a:ext cx="7706995" cy="2430780"/>
+          </a:xfrm>
+          <a:prstGeom prst="rect">
+            <a:avLst/>
+          </a:prstGeom>
+          <a:noFill/>
+          <a:ln>
+            <a:noFill/>
+          </a:ln>
+        </p:spPr>
+        <p:txBody>
+          <a:bodyPr spcFirstLastPara="1" wrap="square" lIns="91425" tIns="91425" rIns="91425" bIns="91425" anchor="t" anchorCtr="0">
+            <a:noAutofit/>
+          </a:bodyPr>
+          <a:p>
+            <a:pPr marL="146050" lvl="0" algn="just">
+              <a:buClr>
+                <a:srgbClr val="FFFFFF"/>
+              </a:buClr>
+              <a:buSzPts val="1300"/>
+            </a:pPr>
+            <a:r>
+              <a:rPr lang="es-CO" b="1" dirty="0">
+                <a:solidFill>
+                  <a:schemeClr val="bg1"/>
+                </a:solidFill>
+              </a:rPr>
+              <a:t>Some issues:</a:t>
+            </a:r>
+            <a:endParaRPr lang="en-US" b="1" dirty="0">
+              <a:solidFill>
+                <a:schemeClr val="bg1"/>
+              </a:solidFill>
+            </a:endParaRPr>
+          </a:p>
+          <a:p>
+            <a:pPr marL="146050" lvl="0" algn="just">
+              <a:buClr>
+                <a:srgbClr val="FFFFFF"/>
+              </a:buClr>
+              <a:buSzPts val="1300"/>
+            </a:pPr>
+            <a:endParaRPr lang="en-US" b="1" dirty="0">
+              <a:solidFill>
+                <a:schemeClr val="bg1"/>
+              </a:solidFill>
+            </a:endParaRPr>
+          </a:p>
+          <a:p>
+            <a:pPr marL="431800" lvl="0" indent="-285750" algn="just">
+              <a:buClr>
+                <a:srgbClr val="FFFFFF"/>
+              </a:buClr>
+              <a:buSzPts val="1300"/>
+              <a:buFont typeface="Arial" panose="020B0604020202020204" pitchFamily="34" charset="0"/>
+              <a:buChar char="•"/>
+            </a:pPr>
+            <a:r>
+              <a:rPr lang="es-CO" altLang="en-US" b="1" dirty="0">
+                <a:solidFill>
+                  <a:schemeClr val="bg1"/>
+                </a:solidFill>
+              </a:rPr>
+              <a:t>The classes are strongly coupled. If now I want to store the data in an Oracle or MySQL database I have to modify the code of the Logic class. it means I am forced to make changes in an important and stable class, Logic, because of a modification in a less stable, the way of storing that data.</a:t>
+            </a:r>
+            <a:endParaRPr lang="es-CO" altLang="en-US" b="1" dirty="0">
+              <a:solidFill>
+                <a:schemeClr val="bg1"/>
+              </a:solidFill>
+            </a:endParaRPr>
+          </a:p>
+          <a:p>
+            <a:pPr marL="431800" lvl="0" indent="-285750" algn="just">
+              <a:buClr>
+                <a:srgbClr val="FFFFFF"/>
+              </a:buClr>
+              <a:buSzPts val="1300"/>
+              <a:buFont typeface="Arial" panose="020B0604020202020204" pitchFamily="34" charset="0"/>
+              <a:buChar char="•"/>
+            </a:pPr>
+            <a:endParaRPr lang="es-CO" altLang="en-US" b="1" dirty="0">
+              <a:solidFill>
+                <a:schemeClr val="bg1"/>
+              </a:solidFill>
+            </a:endParaRPr>
+          </a:p>
+          <a:p>
+            <a:pPr marL="431800" lvl="0" indent="-285750" algn="just">
+              <a:buClr>
+                <a:srgbClr val="FFFFFF"/>
+              </a:buClr>
+              <a:buSzPts val="1300"/>
+              <a:buFont typeface="Arial" panose="020B0604020202020204" pitchFamily="34" charset="0"/>
+              <a:buChar char="•"/>
+            </a:pPr>
+            <a:r>
+              <a:rPr lang="es-CO" altLang="en-US" b="1" dirty="0">
+                <a:solidFill>
+                  <a:schemeClr val="bg1"/>
+                </a:solidFill>
+              </a:rPr>
+              <a:t>Difficulty to test. I can not easily test the 'operation' method of the 'Logic' class without using the database.</a:t>
+            </a:r>
+            <a:endParaRPr lang="es-CO" altLang="en-US" b="1" dirty="0">
+              <a:solidFill>
+                <a:schemeClr val="bg1"/>
+              </a:solidFill>
+            </a:endParaRPr>
+          </a:p>
+        </p:txBody>
+      </p:sp>
     </p:spTree>
   </p:cSld>
   <p:clrMapOvr>
@@ -24275,292 +24137,6 @@
                 <a:cs typeface="Montserrat" panose="00000500000000000000"/>
                 <a:sym typeface="Montserrat" panose="00000500000000000000"/>
               </a:rPr>
-              <a:t>Normal Implementation (Not good)</a:t>
-            </a:r>
-            <a:endParaRPr lang="es-CO" sz="2000" b="1" dirty="0">
-              <a:solidFill>
-                <a:srgbClr val="C1D82F"/>
-              </a:solidFill>
-              <a:effectLst>
-                <a:outerShdw blurRad="38100" dist="38100" dir="2700000" algn="tl">
-                  <a:srgbClr val="000000">
-                    <a:alpha val="43137"/>
-                  </a:srgbClr>
-                </a:outerShdw>
-              </a:effectLst>
-              <a:latin typeface="Montserrat" panose="00000500000000000000"/>
-              <a:ea typeface="Montserrat" panose="00000500000000000000"/>
-              <a:cs typeface="Montserrat" panose="00000500000000000000"/>
-              <a:sym typeface="Montserrat" panose="00000500000000000000"/>
-            </a:endParaRPr>
-          </a:p>
-        </p:txBody>
-      </p:sp>
-      <p:sp>
-        <p:nvSpPr>
-          <p:cNvPr id="120" name="Google Shape;120;p28"/>
-          <p:cNvSpPr/>
-          <p:nvPr/>
-        </p:nvSpPr>
-        <p:spPr>
-          <a:xfrm>
-            <a:off x="-5" y="5118630"/>
-            <a:ext cx="9144000" cy="33600"/>
-          </a:xfrm>
-          <a:prstGeom prst="rect">
-            <a:avLst/>
-          </a:prstGeom>
-          <a:solidFill>
-            <a:srgbClr val="C1D82F"/>
-          </a:solidFill>
-          <a:ln>
-            <a:noFill/>
-          </a:ln>
-        </p:spPr>
-        <p:txBody>
-          <a:bodyPr spcFirstLastPara="1" wrap="square" lIns="91425" tIns="91425" rIns="91425" bIns="91425" anchor="ctr" anchorCtr="0">
-            <a:noAutofit/>
-          </a:bodyPr>
-          <a:lstStyle/>
-          <a:p>
-            <a:pPr marL="0" lvl="0" indent="0" algn="l" rtl="0">
-              <a:spcBef>
-                <a:spcPts val="0"/>
-              </a:spcBef>
-              <a:spcAft>
-                <a:spcPts val="0"/>
-              </a:spcAft>
-              <a:buNone/>
-            </a:pPr>
-          </a:p>
-        </p:txBody>
-      </p:sp>
-      <p:pic>
-        <p:nvPicPr>
-          <p:cNvPr id="4" name="Picture 3"/>
-          <p:cNvPicPr>
-            <a:picLocks noChangeAspect="1"/>
-          </p:cNvPicPr>
-          <p:nvPr/>
-        </p:nvPicPr>
-        <p:blipFill>
-          <a:blip r:embed="rId1"/>
-          <a:srcRect b="34637"/>
-          <a:stretch>
-            <a:fillRect/>
-          </a:stretch>
-        </p:blipFill>
-        <p:spPr>
-          <a:xfrm>
-            <a:off x="2641600" y="824230"/>
-            <a:ext cx="6092825" cy="1743075"/>
-          </a:xfrm>
-          <a:prstGeom prst="rect">
-            <a:avLst/>
-          </a:prstGeom>
-        </p:spPr>
-      </p:pic>
-      <p:sp>
-        <p:nvSpPr>
-          <p:cNvPr id="5" name="Google Shape;118;p28"/>
-          <p:cNvSpPr txBox="1"/>
-          <p:nvPr/>
-        </p:nvSpPr>
-        <p:spPr>
-          <a:xfrm>
-            <a:off x="357505" y="2450465"/>
-            <a:ext cx="7706995" cy="2430780"/>
-          </a:xfrm>
-          <a:prstGeom prst="rect">
-            <a:avLst/>
-          </a:prstGeom>
-          <a:noFill/>
-          <a:ln>
-            <a:noFill/>
-          </a:ln>
-        </p:spPr>
-        <p:txBody>
-          <a:bodyPr spcFirstLastPara="1" wrap="square" lIns="91425" tIns="91425" rIns="91425" bIns="91425" anchor="t" anchorCtr="0">
-            <a:noAutofit/>
-          </a:bodyPr>
-          <a:p>
-            <a:pPr marL="146050" lvl="0" algn="just">
-              <a:buClr>
-                <a:srgbClr val="FFFFFF"/>
-              </a:buClr>
-              <a:buSzPts val="1300"/>
-            </a:pPr>
-            <a:r>
-              <a:rPr lang="es-CO" b="1" dirty="0">
-                <a:solidFill>
-                  <a:schemeClr val="bg1"/>
-                </a:solidFill>
-              </a:rPr>
-              <a:t>Some issues:</a:t>
-            </a:r>
-            <a:endParaRPr lang="en-US" b="1" dirty="0">
-              <a:solidFill>
-                <a:schemeClr val="bg1"/>
-              </a:solidFill>
-            </a:endParaRPr>
-          </a:p>
-          <a:p>
-            <a:pPr marL="146050" lvl="0" algn="just">
-              <a:buClr>
-                <a:srgbClr val="FFFFFF"/>
-              </a:buClr>
-              <a:buSzPts val="1300"/>
-            </a:pPr>
-            <a:endParaRPr lang="en-US" b="1" dirty="0">
-              <a:solidFill>
-                <a:schemeClr val="bg1"/>
-              </a:solidFill>
-            </a:endParaRPr>
-          </a:p>
-          <a:p>
-            <a:pPr marL="431800" lvl="0" indent="-285750" algn="just">
-              <a:buClr>
-                <a:srgbClr val="FFFFFF"/>
-              </a:buClr>
-              <a:buSzPts val="1300"/>
-              <a:buFont typeface="Arial" panose="020B0604020202020204" pitchFamily="34" charset="0"/>
-              <a:buChar char="•"/>
-            </a:pPr>
-            <a:r>
-              <a:rPr lang="es-CO" altLang="en-US" b="1" dirty="0">
-                <a:solidFill>
-                  <a:schemeClr val="bg1"/>
-                </a:solidFill>
-              </a:rPr>
-              <a:t>The classes are strongly coupled. If now I want to store the data in an Oracle or MySQL database I have to modify the code of the Logic class. it means I am forced to make changes in an important and stable class, Logic, because of a modification in a less stable, the way of storing that data.</a:t>
-            </a:r>
-            <a:endParaRPr lang="es-CO" altLang="en-US" b="1" dirty="0">
-              <a:solidFill>
-                <a:schemeClr val="bg1"/>
-              </a:solidFill>
-            </a:endParaRPr>
-          </a:p>
-          <a:p>
-            <a:pPr marL="431800" lvl="0" indent="-285750" algn="just">
-              <a:buClr>
-                <a:srgbClr val="FFFFFF"/>
-              </a:buClr>
-              <a:buSzPts val="1300"/>
-              <a:buFont typeface="Arial" panose="020B0604020202020204" pitchFamily="34" charset="0"/>
-              <a:buChar char="•"/>
-            </a:pPr>
-            <a:endParaRPr lang="es-CO" altLang="en-US" b="1" dirty="0">
-              <a:solidFill>
-                <a:schemeClr val="bg1"/>
-              </a:solidFill>
-            </a:endParaRPr>
-          </a:p>
-          <a:p>
-            <a:pPr marL="431800" lvl="0" indent="-285750" algn="just">
-              <a:buClr>
-                <a:srgbClr val="FFFFFF"/>
-              </a:buClr>
-              <a:buSzPts val="1300"/>
-              <a:buFont typeface="Arial" panose="020B0604020202020204" pitchFamily="34" charset="0"/>
-              <a:buChar char="•"/>
-            </a:pPr>
-            <a:r>
-              <a:rPr lang="es-CO" altLang="en-US" b="1" dirty="0">
-                <a:solidFill>
-                  <a:schemeClr val="bg1"/>
-                </a:solidFill>
-              </a:rPr>
-              <a:t>Difficulty to test. I can not easily test the 'operation' method of the 'Logic' class without using the database.</a:t>
-            </a:r>
-            <a:endParaRPr lang="es-CO" altLang="en-US" b="1" dirty="0">
-              <a:solidFill>
-                <a:schemeClr val="bg1"/>
-              </a:solidFill>
-            </a:endParaRPr>
-          </a:p>
-        </p:txBody>
-      </p:sp>
-    </p:spTree>
-  </p:cSld>
-  <p:clrMapOvr>
-    <a:masterClrMapping/>
-  </p:clrMapOvr>
-</p:sld>
-</file>
-
-<file path=ppt/slides/slide31.xml><?xml version="1.0" encoding="utf-8"?>
-<p:sld xmlns:a="http://schemas.openxmlformats.org/drawingml/2006/main" xmlns:r="http://schemas.openxmlformats.org/officeDocument/2006/relationships" xmlns:p="http://schemas.openxmlformats.org/presentationml/2006/main">
-  <p:cSld>
-    <p:bg>
-      <p:bgPr>
-        <a:solidFill>
-          <a:srgbClr val="000000"/>
-        </a:solidFill>
-        <a:effectLst/>
-      </p:bgPr>
-    </p:bg>
-    <p:spTree>
-      <p:nvGrpSpPr>
-        <p:cNvPr id="1" name="Shape 117"/>
-        <p:cNvGrpSpPr/>
-        <p:nvPr/>
-      </p:nvGrpSpPr>
-      <p:grpSpPr>
-        <a:xfrm>
-          <a:off x="0" y="0"/>
-          <a:ext cx="0" cy="0"/>
-          <a:chOff x="0" y="0"/>
-          <a:chExt cx="0" cy="0"/>
-        </a:xfrm>
-      </p:grpSpPr>
-      <p:sp>
-        <p:nvSpPr>
-          <p:cNvPr id="119" name="Google Shape;119;p28"/>
-          <p:cNvSpPr txBox="1"/>
-          <p:nvPr/>
-        </p:nvSpPr>
-        <p:spPr>
-          <a:xfrm>
-            <a:off x="0" y="185106"/>
-            <a:ext cx="9122569" cy="639051"/>
-          </a:xfrm>
-          <a:prstGeom prst="rect">
-            <a:avLst/>
-          </a:prstGeom>
-          <a:noFill/>
-          <a:ln>
-            <a:noFill/>
-          </a:ln>
-        </p:spPr>
-        <p:txBody>
-          <a:bodyPr spcFirstLastPara="1" wrap="square" lIns="91425" tIns="91425" rIns="91425" bIns="91425" anchor="t" anchorCtr="0">
-            <a:noAutofit/>
-          </a:bodyPr>
-          <a:lstStyle/>
-          <a:p>
-            <a:pPr lvl="0" algn="ctr">
-              <a:buClr>
-                <a:schemeClr val="dk1"/>
-              </a:buClr>
-              <a:buSzPts val="1100"/>
-            </a:pPr>
-            <a:r>
-              <a:rPr lang="es-CO" sz="2000" b="1" dirty="0">
-                <a:solidFill>
-                  <a:srgbClr val="C1D82F"/>
-                </a:solidFill>
-                <a:effectLst>
-                  <a:outerShdw blurRad="38100" dist="38100" dir="2700000" algn="tl">
-                    <a:srgbClr val="000000">
-                      <a:alpha val="43137"/>
-                    </a:srgbClr>
-                  </a:outerShdw>
-                </a:effectLst>
-                <a:latin typeface="Montserrat" panose="00000500000000000000"/>
-                <a:ea typeface="Montserrat" panose="00000500000000000000"/>
-                <a:cs typeface="Montserrat" panose="00000500000000000000"/>
-                <a:sym typeface="Montserrat" panose="00000500000000000000"/>
-              </a:rPr>
               <a:t>Good Implementation </a:t>
             </a:r>
             <a:endParaRPr lang="es-CO" sz="2000" b="1" dirty="0">
@@ -24691,7 +24267,7 @@
 </p:sld>
 </file>
 
-<file path=ppt/slides/slide32.xml><?xml version="1.0" encoding="utf-8"?>
+<file path=ppt/slides/slide31.xml><?xml version="1.0" encoding="utf-8"?>
 <p:sld xmlns:a="http://schemas.openxmlformats.org/drawingml/2006/main" xmlns:r="http://schemas.openxmlformats.org/officeDocument/2006/relationships" xmlns:p="http://schemas.openxmlformats.org/presentationml/2006/main">
   <p:cSld>
     <p:bg>

</xml_diff>

<commit_message>
Dependency Inversion - Modify some slides of the presentation
</commit_message>
<xml_diff>
--- a/SOLID/SOLID.pptx
+++ b/SOLID/SOLID.pptx
@@ -23859,7 +23859,7 @@
                   <a:schemeClr val="bg1"/>
                 </a:solidFill>
               </a:rPr>
-              <a:t>The classes are strongly coupled. If now I want to store the data in an Oracle or MySQL database I have to modify the code of the Logic class. it means I am forced to make changes in an important and stable class, Logic, because of a modification in a less stable, the way of storing that data.</a:t>
+              <a:t>The classes are strongly coupled. If you want to store the data in an Oracle or MySQL database, you have to modify the code of the Logic class. It means you are forced to make changes in an important and stable class (Logic), it just to modify the way of storing that data.</a:t>
             </a:r>
             <a:endParaRPr lang="es-CO" altLang="en-US" b="1" dirty="0">
               <a:solidFill>
@@ -23897,7 +23897,7 @@
                   <a:schemeClr val="bg1"/>
                 </a:solidFill>
               </a:rPr>
-              <a:t>Difficulty to test. I can not easily test the 'operation' method of the 'Logic' class without using the database.</a:t>
+              <a:t>Difficulty to work with unit tests. You can not easily test the 'operation' method of the 'Logic' class without using the database.</a:t>
             </a:r>
             <a:endParaRPr lang="es-CO" altLang="en-US" b="1" dirty="0">
               <a:solidFill>

</xml_diff>

<commit_message>
Dependency Inversion - Remove the Better case. Just have Bad and Good
</commit_message>
<xml_diff>
--- a/SOLID/SOLID.pptx
+++ b/SOLID/SOLID.pptx
@@ -39,32 +39,31 @@
     <p:sldId id="289" r:id="rId32"/>
     <p:sldId id="290" r:id="rId33"/>
     <p:sldId id="291" r:id="rId34"/>
-    <p:sldId id="292" r:id="rId35"/>
   </p:sldIdLst>
   <p:sldSz cx="9144000" cy="5143500" type="screen16x9"/>
   <p:notesSz cx="6858000" cy="9144000"/>
   <p:embeddedFontLst>
     <p:embeddedFont>
       <p:font typeface="Roboto Condensed" panose="02000000000000000000"/>
-      <p:regular r:id="rId39"/>
-      <p:bold r:id="rId40"/>
-      <p:italic r:id="rId41"/>
-      <p:boldItalic r:id="rId42"/>
+      <p:regular r:id="rId38"/>
+      <p:bold r:id="rId39"/>
+      <p:italic r:id="rId40"/>
+      <p:boldItalic r:id="rId41"/>
     </p:embeddedFont>
     <p:embeddedFont>
       <p:font typeface="Calibri" panose="020F0502020204030204"/>
-      <p:regular r:id="rId43"/>
+      <p:regular r:id="rId42"/>
     </p:embeddedFont>
     <p:embeddedFont>
       <p:font typeface="Montserrat" panose="00000500000000000000"/>
-      <p:regular r:id="rId44"/>
-      <p:bold r:id="rId45"/>
-      <p:italic r:id="rId46"/>
-      <p:boldItalic r:id="rId47"/>
+      <p:regular r:id="rId43"/>
+      <p:bold r:id="rId44"/>
+      <p:italic r:id="rId45"/>
+      <p:boldItalic r:id="rId46"/>
     </p:embeddedFont>
     <p:embeddedFont>
       <p:font typeface="Nunito Sans" panose="00000500000000000000"/>
-      <p:regular r:id="rId48"/>
+      <p:regular r:id="rId47"/>
     </p:embeddedFont>
   </p:embeddedFontLst>
   <p:defaultTextStyle>
@@ -3115,109 +3114,6 @@
 </file>
 
 <file path=ppt/notesSlides/notesSlide30.xml><?xml version="1.0" encoding="utf-8"?>
-<p:notes xmlns:a="http://schemas.openxmlformats.org/drawingml/2006/main" xmlns:r="http://schemas.openxmlformats.org/officeDocument/2006/relationships" xmlns:p="http://schemas.openxmlformats.org/presentationml/2006/main" showMasterPhAnim="0" showMasterSp="0">
-  <p:cSld>
-    <p:spTree>
-      <p:nvGrpSpPr>
-        <p:cNvPr id="1" name="Shape 114"/>
-        <p:cNvGrpSpPr/>
-        <p:nvPr/>
-      </p:nvGrpSpPr>
-      <p:grpSpPr>
-        <a:xfrm>
-          <a:off x="0" y="0"/>
-          <a:ext cx="0" cy="0"/>
-          <a:chOff x="0" y="0"/>
-          <a:chExt cx="0" cy="0"/>
-        </a:xfrm>
-      </p:grpSpPr>
-      <p:sp>
-        <p:nvSpPr>
-          <p:cNvPr id="115" name="Google Shape;115;g297a9bff03_0_0:notes"/>
-          <p:cNvSpPr>
-            <a:spLocks noGrp="1" noRot="1" noChangeAspect="1"/>
-          </p:cNvSpPr>
-          <p:nvPr>
-            <p:ph type="sldImg" idx="2"/>
-          </p:nvPr>
-        </p:nvSpPr>
-        <p:spPr>
-          <a:xfrm>
-            <a:off x="381000" y="685800"/>
-            <a:ext cx="6096000" cy="3429000"/>
-          </a:xfrm>
-          <a:custGeom>
-            <a:avLst/>
-            <a:gdLst/>
-            <a:ahLst/>
-            <a:cxnLst/>
-            <a:rect l="l" t="t" r="r" b="b"/>
-            <a:pathLst>
-              <a:path w="120000" h="120000" extrusionOk="0">
-                <a:moveTo>
-                  <a:pt x="0" y="0"/>
-                </a:moveTo>
-                <a:lnTo>
-                  <a:pt x="120000" y="0"/>
-                </a:lnTo>
-                <a:lnTo>
-                  <a:pt x="120000" y="120000"/>
-                </a:lnTo>
-                <a:lnTo>
-                  <a:pt x="0" y="120000"/>
-                </a:lnTo>
-                <a:close/>
-              </a:path>
-            </a:pathLst>
-          </a:custGeom>
-        </p:spPr>
-      </p:sp>
-      <p:sp>
-        <p:nvSpPr>
-          <p:cNvPr id="116" name="Google Shape;116;g297a9bff03_0_0:notes"/>
-          <p:cNvSpPr txBox="1">
-            <a:spLocks noGrp="1"/>
-          </p:cNvSpPr>
-          <p:nvPr>
-            <p:ph type="body" idx="1"/>
-          </p:nvPr>
-        </p:nvSpPr>
-        <p:spPr>
-          <a:xfrm>
-            <a:off x="685800" y="4343400"/>
-            <a:ext cx="5486400" cy="4114800"/>
-          </a:xfrm>
-          <a:prstGeom prst="rect">
-            <a:avLst/>
-          </a:prstGeom>
-        </p:spPr>
-        <p:txBody>
-          <a:bodyPr spcFirstLastPara="1" wrap="square" lIns="91425" tIns="91425" rIns="91425" bIns="91425" anchor="t" anchorCtr="0">
-            <a:noAutofit/>
-          </a:bodyPr>
-          <a:lstStyle/>
-          <a:p>
-            <a:pPr marL="0" lvl="0" indent="0" algn="l" rtl="0">
-              <a:spcBef>
-                <a:spcPts val="0"/>
-              </a:spcBef>
-              <a:spcAft>
-                <a:spcPts val="0"/>
-              </a:spcAft>
-              <a:buNone/>
-            </a:pPr>
-          </a:p>
-        </p:txBody>
-      </p:sp>
-    </p:spTree>
-  </p:cSld>
-  <p:clrMapOvr>
-    <a:masterClrMapping/>
-  </p:clrMapOvr>
-</p:notes>
-</file>
-
-<file path=ppt/notesSlides/notesSlide31.xml><?xml version="1.0" encoding="utf-8"?>
 <p:notes xmlns:a="http://schemas.openxmlformats.org/drawingml/2006/main" xmlns:r="http://schemas.openxmlformats.org/officeDocument/2006/relationships" xmlns:p="http://schemas.openxmlformats.org/presentationml/2006/main" showMasterPhAnim="0" showMasterSp="0">
   <p:cSld>
     <p:spTree>
@@ -24253,209 +24149,6 @@
           <a:xfrm>
             <a:off x="1150620" y="943610"/>
             <a:ext cx="6590665" cy="3256915"/>
-          </a:xfrm>
-          <a:prstGeom prst="rect">
-            <a:avLst/>
-          </a:prstGeom>
-        </p:spPr>
-      </p:pic>
-    </p:spTree>
-  </p:cSld>
-  <p:clrMapOvr>
-    <a:masterClrMapping/>
-  </p:clrMapOvr>
-</p:sld>
-</file>
-
-<file path=ppt/slides/slide31.xml><?xml version="1.0" encoding="utf-8"?>
-<p:sld xmlns:a="http://schemas.openxmlformats.org/drawingml/2006/main" xmlns:r="http://schemas.openxmlformats.org/officeDocument/2006/relationships" xmlns:p="http://schemas.openxmlformats.org/presentationml/2006/main">
-  <p:cSld>
-    <p:bg>
-      <p:bgPr>
-        <a:solidFill>
-          <a:srgbClr val="000000"/>
-        </a:solidFill>
-        <a:effectLst/>
-      </p:bgPr>
-    </p:bg>
-    <p:spTree>
-      <p:nvGrpSpPr>
-        <p:cNvPr id="1" name="Shape 117"/>
-        <p:cNvGrpSpPr/>
-        <p:nvPr/>
-      </p:nvGrpSpPr>
-      <p:grpSpPr>
-        <a:xfrm>
-          <a:off x="0" y="0"/>
-          <a:ext cx="0" cy="0"/>
-          <a:chOff x="0" y="0"/>
-          <a:chExt cx="0" cy="0"/>
-        </a:xfrm>
-      </p:grpSpPr>
-      <p:sp>
-        <p:nvSpPr>
-          <p:cNvPr id="119" name="Google Shape;119;p28"/>
-          <p:cNvSpPr txBox="1"/>
-          <p:nvPr/>
-        </p:nvSpPr>
-        <p:spPr>
-          <a:xfrm>
-            <a:off x="0" y="185106"/>
-            <a:ext cx="9122569" cy="639051"/>
-          </a:xfrm>
-          <a:prstGeom prst="rect">
-            <a:avLst/>
-          </a:prstGeom>
-          <a:noFill/>
-          <a:ln>
-            <a:noFill/>
-          </a:ln>
-        </p:spPr>
-        <p:txBody>
-          <a:bodyPr spcFirstLastPara="1" wrap="square" lIns="91425" tIns="91425" rIns="91425" bIns="91425" anchor="t" anchorCtr="0">
-            <a:noAutofit/>
-          </a:bodyPr>
-          <a:lstStyle/>
-          <a:p>
-            <a:pPr lvl="0" algn="ctr">
-              <a:buClr>
-                <a:schemeClr val="dk1"/>
-              </a:buClr>
-              <a:buSzPts val="1100"/>
-            </a:pPr>
-            <a:r>
-              <a:rPr lang="es-CO" sz="2000" b="1" dirty="0">
-                <a:solidFill>
-                  <a:srgbClr val="C1D82F"/>
-                </a:solidFill>
-                <a:effectLst>
-                  <a:outerShdw blurRad="38100" dist="38100" dir="2700000" algn="tl">
-                    <a:srgbClr val="000000">
-                      <a:alpha val="43137"/>
-                    </a:srgbClr>
-                  </a:outerShdw>
-                </a:effectLst>
-                <a:latin typeface="Montserrat" panose="00000500000000000000"/>
-                <a:ea typeface="Montserrat" panose="00000500000000000000"/>
-                <a:cs typeface="Montserrat" panose="00000500000000000000"/>
-                <a:sym typeface="Montserrat" panose="00000500000000000000"/>
-              </a:rPr>
-              <a:t>Improve Implementation </a:t>
-            </a:r>
-            <a:endParaRPr lang="es-CO" sz="2000" b="1" dirty="0">
-              <a:solidFill>
-                <a:srgbClr val="C1D82F"/>
-              </a:solidFill>
-              <a:effectLst>
-                <a:outerShdw blurRad="38100" dist="38100" dir="2700000" algn="tl">
-                  <a:srgbClr val="000000">
-                    <a:alpha val="43137"/>
-                  </a:srgbClr>
-                </a:outerShdw>
-              </a:effectLst>
-              <a:latin typeface="Montserrat" panose="00000500000000000000"/>
-              <a:ea typeface="Montserrat" panose="00000500000000000000"/>
-              <a:cs typeface="Montserrat" panose="00000500000000000000"/>
-              <a:sym typeface="Montserrat" panose="00000500000000000000"/>
-            </a:endParaRPr>
-          </a:p>
-        </p:txBody>
-      </p:sp>
-      <p:sp>
-        <p:nvSpPr>
-          <p:cNvPr id="120" name="Google Shape;120;p28"/>
-          <p:cNvSpPr/>
-          <p:nvPr/>
-        </p:nvSpPr>
-        <p:spPr>
-          <a:xfrm>
-            <a:off x="-5" y="5118630"/>
-            <a:ext cx="9144000" cy="33600"/>
-          </a:xfrm>
-          <a:prstGeom prst="rect">
-            <a:avLst/>
-          </a:prstGeom>
-          <a:solidFill>
-            <a:srgbClr val="C1D82F"/>
-          </a:solidFill>
-          <a:ln>
-            <a:noFill/>
-          </a:ln>
-        </p:spPr>
-        <p:txBody>
-          <a:bodyPr spcFirstLastPara="1" wrap="square" lIns="91425" tIns="91425" rIns="91425" bIns="91425" anchor="ctr" anchorCtr="0">
-            <a:noAutofit/>
-          </a:bodyPr>
-          <a:lstStyle/>
-          <a:p>
-            <a:pPr marL="0" lvl="0" indent="0" algn="l" rtl="0">
-              <a:spcBef>
-                <a:spcPts val="0"/>
-              </a:spcBef>
-              <a:spcAft>
-                <a:spcPts val="0"/>
-              </a:spcAft>
-              <a:buNone/>
-            </a:pPr>
-          </a:p>
-        </p:txBody>
-      </p:sp>
-      <p:sp>
-        <p:nvSpPr>
-          <p:cNvPr id="5" name="Google Shape;118;p28"/>
-          <p:cNvSpPr txBox="1"/>
-          <p:nvPr/>
-        </p:nvSpPr>
-        <p:spPr>
-          <a:xfrm>
-            <a:off x="357505" y="2450465"/>
-            <a:ext cx="7706995" cy="2430780"/>
-          </a:xfrm>
-          <a:prstGeom prst="rect">
-            <a:avLst/>
-          </a:prstGeom>
-          <a:noFill/>
-          <a:ln>
-            <a:noFill/>
-          </a:ln>
-        </p:spPr>
-        <p:txBody>
-          <a:bodyPr spcFirstLastPara="1" wrap="square" lIns="91425" tIns="91425" rIns="91425" bIns="91425" anchor="t" anchorCtr="0">
-            <a:noAutofit/>
-          </a:bodyPr>
-          <a:p>
-            <a:pPr marL="146050" lvl="0" algn="just">
-              <a:buClr>
-                <a:srgbClr val="FFFFFF"/>
-              </a:buClr>
-              <a:buSzPts val="1300"/>
-            </a:pPr>
-            <a:endParaRPr lang="es-CO" altLang="en-US" b="1" dirty="0">
-              <a:solidFill>
-                <a:schemeClr val="bg1"/>
-              </a:solidFill>
-            </a:endParaRPr>
-          </a:p>
-        </p:txBody>
-      </p:sp>
-      <p:pic>
-        <p:nvPicPr>
-          <p:cNvPr id="3" name="Picture 2"/>
-          <p:cNvPicPr>
-            <a:picLocks noChangeAspect="1"/>
-          </p:cNvPicPr>
-          <p:nvPr/>
-        </p:nvPicPr>
-        <p:blipFill>
-          <a:blip r:embed="rId1"/>
-          <a:stretch>
-            <a:fillRect/>
-          </a:stretch>
-        </p:blipFill>
-        <p:spPr>
-          <a:xfrm>
-            <a:off x="800100" y="828675"/>
-            <a:ext cx="7543165" cy="3485515"/>
           </a:xfrm>
           <a:prstGeom prst="rect">
             <a:avLst/>

</xml_diff>